<commit_message>
updates on CAN Test verified
</commit_message>
<xml_diff>
--- a/stn/stn_test_fw_solution.pptx
+++ b/stn/stn_test_fw_solution.pptx
@@ -10,6 +10,7 @@
     <p:sldId id="260" r:id="rId4"/>
     <p:sldId id="259" r:id="rId5"/>
     <p:sldId id="261" r:id="rId6"/>
+    <p:sldId id="264" r:id="rId7"/>
   </p:sldIdLst>
   <p:sldSz cx="12192000" cy="6858000"/>
   <p:notesSz cx="6858000" cy="9144000"/>
@@ -263,7 +264,7 @@
           <a:p>
             <a:fld id="{AA100CEF-43AD-4927-89A2-F66B823BF21E}" type="datetimeFigureOut">
               <a:rPr lang="zh-CN" altLang="en-US" smtClean="0"/>
-              <a:t>2025/8/5</a:t>
+              <a:t>2025/8/13</a:t>
             </a:fld>
             <a:endParaRPr lang="zh-CN" altLang="en-US"/>
           </a:p>
@@ -461,7 +462,7 @@
           <a:p>
             <a:fld id="{AA100CEF-43AD-4927-89A2-F66B823BF21E}" type="datetimeFigureOut">
               <a:rPr lang="zh-CN" altLang="en-US" smtClean="0"/>
-              <a:t>2025/8/5</a:t>
+              <a:t>2025/8/13</a:t>
             </a:fld>
             <a:endParaRPr lang="zh-CN" altLang="en-US"/>
           </a:p>
@@ -669,7 +670,7 @@
           <a:p>
             <a:fld id="{AA100CEF-43AD-4927-89A2-F66B823BF21E}" type="datetimeFigureOut">
               <a:rPr lang="zh-CN" altLang="en-US" smtClean="0"/>
-              <a:t>2025/8/5</a:t>
+              <a:t>2025/8/13</a:t>
             </a:fld>
             <a:endParaRPr lang="zh-CN" altLang="en-US"/>
           </a:p>
@@ -867,7 +868,7 @@
           <a:p>
             <a:fld id="{AA100CEF-43AD-4927-89A2-F66B823BF21E}" type="datetimeFigureOut">
               <a:rPr lang="zh-CN" altLang="en-US" smtClean="0"/>
-              <a:t>2025/8/5</a:t>
+              <a:t>2025/8/13</a:t>
             </a:fld>
             <a:endParaRPr lang="zh-CN" altLang="en-US"/>
           </a:p>
@@ -1142,7 +1143,7 @@
           <a:p>
             <a:fld id="{AA100CEF-43AD-4927-89A2-F66B823BF21E}" type="datetimeFigureOut">
               <a:rPr lang="zh-CN" altLang="en-US" smtClean="0"/>
-              <a:t>2025/8/5</a:t>
+              <a:t>2025/8/13</a:t>
             </a:fld>
             <a:endParaRPr lang="zh-CN" altLang="en-US"/>
           </a:p>
@@ -1407,7 +1408,7 @@
           <a:p>
             <a:fld id="{AA100CEF-43AD-4927-89A2-F66B823BF21E}" type="datetimeFigureOut">
               <a:rPr lang="zh-CN" altLang="en-US" smtClean="0"/>
-              <a:t>2025/8/5</a:t>
+              <a:t>2025/8/13</a:t>
             </a:fld>
             <a:endParaRPr lang="zh-CN" altLang="en-US"/>
           </a:p>
@@ -1819,7 +1820,7 @@
           <a:p>
             <a:fld id="{AA100CEF-43AD-4927-89A2-F66B823BF21E}" type="datetimeFigureOut">
               <a:rPr lang="zh-CN" altLang="en-US" smtClean="0"/>
-              <a:t>2025/8/5</a:t>
+              <a:t>2025/8/13</a:t>
             </a:fld>
             <a:endParaRPr lang="zh-CN" altLang="en-US"/>
           </a:p>
@@ -1960,7 +1961,7 @@
           <a:p>
             <a:fld id="{AA100CEF-43AD-4927-89A2-F66B823BF21E}" type="datetimeFigureOut">
               <a:rPr lang="zh-CN" altLang="en-US" smtClean="0"/>
-              <a:t>2025/8/5</a:t>
+              <a:t>2025/8/13</a:t>
             </a:fld>
             <a:endParaRPr lang="zh-CN" altLang="en-US"/>
           </a:p>
@@ -2073,7 +2074,7 @@
           <a:p>
             <a:fld id="{AA100CEF-43AD-4927-89A2-F66B823BF21E}" type="datetimeFigureOut">
               <a:rPr lang="zh-CN" altLang="en-US" smtClean="0"/>
-              <a:t>2025/8/5</a:t>
+              <a:t>2025/8/13</a:t>
             </a:fld>
             <a:endParaRPr lang="zh-CN" altLang="en-US"/>
           </a:p>
@@ -2384,7 +2385,7 @@
           <a:p>
             <a:fld id="{AA100CEF-43AD-4927-89A2-F66B823BF21E}" type="datetimeFigureOut">
               <a:rPr lang="zh-CN" altLang="en-US" smtClean="0"/>
-              <a:t>2025/8/5</a:t>
+              <a:t>2025/8/13</a:t>
             </a:fld>
             <a:endParaRPr lang="zh-CN" altLang="en-US"/>
           </a:p>
@@ -2672,7 +2673,7 @@
           <a:p>
             <a:fld id="{AA100CEF-43AD-4927-89A2-F66B823BF21E}" type="datetimeFigureOut">
               <a:rPr lang="zh-CN" altLang="en-US" smtClean="0"/>
-              <a:t>2025/8/5</a:t>
+              <a:t>2025/8/13</a:t>
             </a:fld>
             <a:endParaRPr lang="zh-CN" altLang="en-US"/>
           </a:p>
@@ -2913,7 +2914,7 @@
           <a:p>
             <a:fld id="{AA100CEF-43AD-4927-89A2-F66B823BF21E}" type="datetimeFigureOut">
               <a:rPr lang="zh-CN" altLang="en-US" smtClean="0"/>
-              <a:t>2025/8/5</a:t>
+              <a:t>2025/8/13</a:t>
             </a:fld>
             <a:endParaRPr lang="zh-CN" altLang="en-US"/>
           </a:p>
@@ -9394,6 +9395,1622 @@
 </p:sld>
 </file>
 
+<file path=ppt/slides/slide6.xml><?xml version="1.0" encoding="utf-8"?>
+<p:sld xmlns:a="http://schemas.openxmlformats.org/drawingml/2006/main" xmlns:r="http://schemas.openxmlformats.org/officeDocument/2006/relationships" xmlns:p="http://schemas.openxmlformats.org/presentationml/2006/main">
+  <p:cSld>
+    <p:spTree>
+      <p:nvGrpSpPr>
+        <p:cNvPr id="1" name=""/>
+        <p:cNvGrpSpPr/>
+        <p:nvPr/>
+      </p:nvGrpSpPr>
+      <p:grpSpPr>
+        <a:xfrm>
+          <a:off x="0" y="0"/>
+          <a:ext cx="0" cy="0"/>
+          <a:chOff x="0" y="0"/>
+          <a:chExt cx="0" cy="0"/>
+        </a:xfrm>
+      </p:grpSpPr>
+      <p:sp>
+        <p:nvSpPr>
+          <p:cNvPr id="2" name="流程图: 过程 1">
+            <a:extLst>
+              <a:ext uri="{FF2B5EF4-FFF2-40B4-BE49-F238E27FC236}">
+                <a16:creationId xmlns:a16="http://schemas.microsoft.com/office/drawing/2014/main" id="{56FD0539-1DED-E9EC-7C93-5C2CFCD5B93C}"/>
+              </a:ext>
+            </a:extLst>
+          </p:cNvPr>
+          <p:cNvSpPr/>
+          <p:nvPr/>
+        </p:nvSpPr>
+        <p:spPr>
+          <a:xfrm>
+            <a:off x="2102661" y="3150575"/>
+            <a:ext cx="2425851" cy="1054248"/>
+          </a:xfrm>
+          <a:prstGeom prst="flowChartProcess">
+            <a:avLst/>
+          </a:prstGeom>
+        </p:spPr>
+        <p:style>
+          <a:lnRef idx="2">
+            <a:schemeClr val="accent1">
+              <a:shade val="15000"/>
+            </a:schemeClr>
+          </a:lnRef>
+          <a:fillRef idx="1">
+            <a:schemeClr val="accent1"/>
+          </a:fillRef>
+          <a:effectRef idx="0">
+            <a:schemeClr val="accent1"/>
+          </a:effectRef>
+          <a:fontRef idx="minor">
+            <a:schemeClr val="lt1"/>
+          </a:fontRef>
+        </p:style>
+        <p:txBody>
+          <a:bodyPr rtlCol="0" anchor="ctr"/>
+          <a:lstStyle/>
+          <a:p>
+            <a:pPr algn="ctr"/>
+            <a:r>
+              <a:rPr lang="en-US" altLang="zh-CN" sz="1400" dirty="0"/>
+              <a:t>CORECAN</a:t>
+            </a:r>
+            <a:r>
+              <a:rPr lang="zh-CN" altLang="en-US" sz="1400" dirty="0"/>
+              <a:t>寄存器初始化配置</a:t>
+            </a:r>
+            <a:endParaRPr lang="en-US" altLang="zh-CN" sz="1400" dirty="0"/>
+          </a:p>
+          <a:p>
+            <a:pPr algn="ctr"/>
+            <a:r>
+              <a:rPr lang="zh-CN" altLang="en-US" sz="1400" dirty="0"/>
+              <a:t>包括：</a:t>
+            </a:r>
+            <a:r>
+              <a:rPr lang="en-US" altLang="zh-CN" sz="1400" dirty="0"/>
+              <a:t>INT ENA, CMD, CONFIG, TX_MSG ID, TX_MSG WORD, AMR, ACR…</a:t>
+            </a:r>
+            <a:endParaRPr lang="zh-CN" altLang="en-US" sz="1400" dirty="0"/>
+          </a:p>
+        </p:txBody>
+      </p:sp>
+      <p:sp>
+        <p:nvSpPr>
+          <p:cNvPr id="3" name="流程图: 可选过程 2">
+            <a:extLst>
+              <a:ext uri="{FF2B5EF4-FFF2-40B4-BE49-F238E27FC236}">
+                <a16:creationId xmlns:a16="http://schemas.microsoft.com/office/drawing/2014/main" id="{0783D700-1587-863F-E4C8-E9B368D758D2}"/>
+              </a:ext>
+            </a:extLst>
+          </p:cNvPr>
+          <p:cNvSpPr/>
+          <p:nvPr/>
+        </p:nvSpPr>
+        <p:spPr>
+          <a:xfrm>
+            <a:off x="2102661" y="848437"/>
+            <a:ext cx="2425851" cy="505609"/>
+          </a:xfrm>
+          <a:prstGeom prst="flowChartAlternateProcess">
+            <a:avLst/>
+          </a:prstGeom>
+        </p:spPr>
+        <p:style>
+          <a:lnRef idx="2">
+            <a:schemeClr val="accent1">
+              <a:shade val="15000"/>
+            </a:schemeClr>
+          </a:lnRef>
+          <a:fillRef idx="1">
+            <a:schemeClr val="accent1"/>
+          </a:fillRef>
+          <a:effectRef idx="0">
+            <a:schemeClr val="accent1"/>
+          </a:effectRef>
+          <a:fontRef idx="minor">
+            <a:schemeClr val="lt1"/>
+          </a:fontRef>
+        </p:style>
+        <p:txBody>
+          <a:bodyPr rtlCol="0" anchor="ctr"/>
+          <a:lstStyle/>
+          <a:p>
+            <a:pPr algn="ctr"/>
+            <a:r>
+              <a:rPr lang="zh-CN" altLang="en-US" sz="1400" dirty="0"/>
+              <a:t>读</a:t>
+            </a:r>
+            <a:r>
+              <a:rPr lang="en-US" altLang="zh-CN" sz="1400" dirty="0"/>
+              <a:t>PREADY</a:t>
+            </a:r>
+            <a:r>
+              <a:rPr lang="zh-CN" altLang="en-US" sz="1400" dirty="0"/>
+              <a:t>和</a:t>
+            </a:r>
+            <a:r>
+              <a:rPr lang="en-US" altLang="zh-CN" sz="1400" dirty="0"/>
+              <a:t>INT_N</a:t>
+            </a:r>
+            <a:r>
+              <a:rPr lang="zh-CN" altLang="en-US" sz="1400" dirty="0"/>
+              <a:t>状态</a:t>
+            </a:r>
+          </a:p>
+        </p:txBody>
+      </p:sp>
+      <p:sp>
+        <p:nvSpPr>
+          <p:cNvPr id="4" name="流程图: 决策 3">
+            <a:extLst>
+              <a:ext uri="{FF2B5EF4-FFF2-40B4-BE49-F238E27FC236}">
+                <a16:creationId xmlns:a16="http://schemas.microsoft.com/office/drawing/2014/main" id="{45DECF20-D4FF-E911-7F67-9858F8316860}"/>
+              </a:ext>
+            </a:extLst>
+          </p:cNvPr>
+          <p:cNvSpPr/>
+          <p:nvPr/>
+        </p:nvSpPr>
+        <p:spPr>
+          <a:xfrm>
+            <a:off x="2172586" y="1789732"/>
+            <a:ext cx="2286000" cy="925157"/>
+          </a:xfrm>
+          <a:prstGeom prst="flowChartDecision">
+            <a:avLst/>
+          </a:prstGeom>
+        </p:spPr>
+        <p:style>
+          <a:lnRef idx="2">
+            <a:schemeClr val="accent1">
+              <a:shade val="15000"/>
+            </a:schemeClr>
+          </a:lnRef>
+          <a:fillRef idx="1">
+            <a:schemeClr val="accent1"/>
+          </a:fillRef>
+          <a:effectRef idx="0">
+            <a:schemeClr val="accent1"/>
+          </a:effectRef>
+          <a:fontRef idx="minor">
+            <a:schemeClr val="lt1"/>
+          </a:fontRef>
+        </p:style>
+        <p:txBody>
+          <a:bodyPr rtlCol="0" anchor="ctr"/>
+          <a:lstStyle/>
+          <a:p>
+            <a:pPr algn="ctr"/>
+            <a:r>
+              <a:rPr lang="en-US" altLang="zh-CN" sz="1400" dirty="0"/>
+              <a:t>PREADY==1 &amp;&amp;</a:t>
+            </a:r>
+          </a:p>
+          <a:p>
+            <a:pPr algn="ctr"/>
+            <a:r>
+              <a:rPr lang="en-US" altLang="zh-CN" sz="1400" dirty="0"/>
+              <a:t>INT_N ==1</a:t>
+            </a:r>
+            <a:endParaRPr lang="zh-CN" altLang="en-US" sz="1400" dirty="0"/>
+          </a:p>
+        </p:txBody>
+      </p:sp>
+      <p:sp>
+        <p:nvSpPr>
+          <p:cNvPr id="6" name="流程图: 可选过程 5">
+            <a:extLst>
+              <a:ext uri="{FF2B5EF4-FFF2-40B4-BE49-F238E27FC236}">
+                <a16:creationId xmlns:a16="http://schemas.microsoft.com/office/drawing/2014/main" id="{83CADF3B-09A8-B547-668D-4B4501C46D63}"/>
+              </a:ext>
+            </a:extLst>
+          </p:cNvPr>
+          <p:cNvSpPr/>
+          <p:nvPr/>
+        </p:nvSpPr>
+        <p:spPr>
+          <a:xfrm>
+            <a:off x="2102661" y="4640508"/>
+            <a:ext cx="2425851" cy="505609"/>
+          </a:xfrm>
+          <a:prstGeom prst="flowChartAlternateProcess">
+            <a:avLst/>
+          </a:prstGeom>
+        </p:spPr>
+        <p:style>
+          <a:lnRef idx="2">
+            <a:schemeClr val="accent1">
+              <a:shade val="15000"/>
+            </a:schemeClr>
+          </a:lnRef>
+          <a:fillRef idx="1">
+            <a:schemeClr val="accent1"/>
+          </a:fillRef>
+          <a:effectRef idx="0">
+            <a:schemeClr val="accent1"/>
+          </a:effectRef>
+          <a:fontRef idx="minor">
+            <a:schemeClr val="lt1"/>
+          </a:fontRef>
+        </p:style>
+        <p:txBody>
+          <a:bodyPr rtlCol="0" anchor="ctr"/>
+          <a:lstStyle/>
+          <a:p>
+            <a:pPr algn="ctr"/>
+            <a:r>
+              <a:rPr lang="zh-CN" altLang="en-US" sz="1400" dirty="0"/>
+              <a:t>写</a:t>
+            </a:r>
+            <a:r>
+              <a:rPr lang="en-US" altLang="zh-CN" sz="1400" dirty="0"/>
+              <a:t>TX_MSG_CTRL</a:t>
+            </a:r>
+            <a:r>
+              <a:rPr lang="zh-CN" altLang="en-US" sz="1400" dirty="0"/>
+              <a:t>发送消息</a:t>
+            </a:r>
+          </a:p>
+        </p:txBody>
+      </p:sp>
+      <p:sp>
+        <p:nvSpPr>
+          <p:cNvPr id="7" name="流程图: 可选过程 6">
+            <a:extLst>
+              <a:ext uri="{FF2B5EF4-FFF2-40B4-BE49-F238E27FC236}">
+                <a16:creationId xmlns:a16="http://schemas.microsoft.com/office/drawing/2014/main" id="{42CC5EB9-A8F4-243B-6A9C-89831F4AF5FD}"/>
+              </a:ext>
+            </a:extLst>
+          </p:cNvPr>
+          <p:cNvSpPr/>
+          <p:nvPr/>
+        </p:nvSpPr>
+        <p:spPr>
+          <a:xfrm>
+            <a:off x="6762960" y="789271"/>
+            <a:ext cx="2425851" cy="505609"/>
+          </a:xfrm>
+          <a:prstGeom prst="flowChartAlternateProcess">
+            <a:avLst/>
+          </a:prstGeom>
+        </p:spPr>
+        <p:style>
+          <a:lnRef idx="2">
+            <a:schemeClr val="accent1">
+              <a:shade val="15000"/>
+            </a:schemeClr>
+          </a:lnRef>
+          <a:fillRef idx="1">
+            <a:schemeClr val="accent1"/>
+          </a:fillRef>
+          <a:effectRef idx="0">
+            <a:schemeClr val="accent1"/>
+          </a:effectRef>
+          <a:fontRef idx="minor">
+            <a:schemeClr val="lt1"/>
+          </a:fontRef>
+        </p:style>
+        <p:txBody>
+          <a:bodyPr rtlCol="0" anchor="ctr"/>
+          <a:lstStyle/>
+          <a:p>
+            <a:pPr algn="ctr"/>
+            <a:r>
+              <a:rPr lang="zh-CN" altLang="en-US" sz="1400" dirty="0"/>
+              <a:t>读</a:t>
+            </a:r>
+            <a:r>
+              <a:rPr lang="en-US" altLang="zh-CN" sz="1400" dirty="0"/>
+              <a:t>RX_BUF Status</a:t>
+            </a:r>
+            <a:endParaRPr lang="zh-CN" altLang="en-US" sz="1400" dirty="0"/>
+          </a:p>
+        </p:txBody>
+      </p:sp>
+      <p:sp>
+        <p:nvSpPr>
+          <p:cNvPr id="8" name="流程图: 决策 7">
+            <a:extLst>
+              <a:ext uri="{FF2B5EF4-FFF2-40B4-BE49-F238E27FC236}">
+                <a16:creationId xmlns:a16="http://schemas.microsoft.com/office/drawing/2014/main" id="{C244B802-4886-CB67-CC37-FEE1C8DB3CC9}"/>
+              </a:ext>
+            </a:extLst>
+          </p:cNvPr>
+          <p:cNvSpPr/>
+          <p:nvPr/>
+        </p:nvSpPr>
+        <p:spPr>
+          <a:xfrm>
+            <a:off x="6832885" y="1703447"/>
+            <a:ext cx="2286000" cy="925157"/>
+          </a:xfrm>
+          <a:prstGeom prst="flowChartDecision">
+            <a:avLst/>
+          </a:prstGeom>
+        </p:spPr>
+        <p:style>
+          <a:lnRef idx="2">
+            <a:schemeClr val="accent1">
+              <a:shade val="15000"/>
+            </a:schemeClr>
+          </a:lnRef>
+          <a:fillRef idx="1">
+            <a:schemeClr val="accent1"/>
+          </a:fillRef>
+          <a:effectRef idx="0">
+            <a:schemeClr val="accent1"/>
+          </a:effectRef>
+          <a:fontRef idx="minor">
+            <a:schemeClr val="lt1"/>
+          </a:fontRef>
+        </p:style>
+        <p:txBody>
+          <a:bodyPr rtlCol="0" anchor="ctr"/>
+          <a:lstStyle/>
+          <a:p>
+            <a:pPr algn="ctr"/>
+            <a:r>
+              <a:rPr lang="en-US" altLang="zh-CN" sz="1400" dirty="0"/>
+              <a:t>Status != 0</a:t>
+            </a:r>
+            <a:endParaRPr lang="zh-CN" altLang="en-US" sz="1400" dirty="0"/>
+          </a:p>
+        </p:txBody>
+      </p:sp>
+      <p:sp>
+        <p:nvSpPr>
+          <p:cNvPr id="9" name="流程图: 过程 8">
+            <a:extLst>
+              <a:ext uri="{FF2B5EF4-FFF2-40B4-BE49-F238E27FC236}">
+                <a16:creationId xmlns:a16="http://schemas.microsoft.com/office/drawing/2014/main" id="{546954CC-F487-9034-4FF6-3F33655EDCD7}"/>
+              </a:ext>
+            </a:extLst>
+          </p:cNvPr>
+          <p:cNvSpPr/>
+          <p:nvPr/>
+        </p:nvSpPr>
+        <p:spPr>
+          <a:xfrm>
+            <a:off x="6762960" y="3037171"/>
+            <a:ext cx="2425851" cy="1054247"/>
+          </a:xfrm>
+          <a:prstGeom prst="flowChartProcess">
+            <a:avLst/>
+          </a:prstGeom>
+        </p:spPr>
+        <p:style>
+          <a:lnRef idx="2">
+            <a:schemeClr val="accent1">
+              <a:shade val="15000"/>
+            </a:schemeClr>
+          </a:lnRef>
+          <a:fillRef idx="1">
+            <a:schemeClr val="accent1"/>
+          </a:fillRef>
+          <a:effectRef idx="0">
+            <a:schemeClr val="accent1"/>
+          </a:effectRef>
+          <a:fontRef idx="minor">
+            <a:schemeClr val="lt1"/>
+          </a:fontRef>
+        </p:style>
+        <p:txBody>
+          <a:bodyPr rtlCol="0" anchor="ctr"/>
+          <a:lstStyle/>
+          <a:p>
+            <a:pPr algn="ctr"/>
+            <a:r>
+              <a:rPr lang="zh-CN" altLang="en-US" sz="1400" dirty="0"/>
+              <a:t>读</a:t>
+            </a:r>
+            <a:r>
+              <a:rPr lang="en-US" altLang="zh-CN" sz="1400" dirty="0"/>
+              <a:t>RX_MSG_ID</a:t>
+            </a:r>
+          </a:p>
+          <a:p>
+            <a:pPr algn="ctr"/>
+            <a:r>
+              <a:rPr lang="zh-CN" altLang="en-US" sz="1400" dirty="0"/>
+              <a:t>读</a:t>
+            </a:r>
+            <a:r>
+              <a:rPr lang="en-US" altLang="zh-CN" sz="1400" dirty="0"/>
+              <a:t>RX_MSG_WORD1</a:t>
+            </a:r>
+          </a:p>
+          <a:p>
+            <a:pPr algn="ctr"/>
+            <a:r>
+              <a:rPr lang="zh-CN" altLang="en-US" sz="1400" dirty="0"/>
+              <a:t>读</a:t>
+            </a:r>
+            <a:r>
+              <a:rPr lang="en-US" altLang="zh-CN" sz="1400" dirty="0"/>
+              <a:t>RX_MSG_WORD0</a:t>
+            </a:r>
+          </a:p>
+          <a:p>
+            <a:pPr algn="ctr"/>
+            <a:r>
+              <a:rPr lang="zh-CN" altLang="en-US" sz="1400" dirty="0"/>
+              <a:t>并和</a:t>
+            </a:r>
+            <a:r>
+              <a:rPr lang="en-US" altLang="zh-CN" sz="1400" dirty="0"/>
+              <a:t>TX_MSG</a:t>
+            </a:r>
+            <a:r>
+              <a:rPr lang="zh-CN" altLang="en-US" sz="1400" dirty="0"/>
+              <a:t>比较</a:t>
+            </a:r>
+            <a:endParaRPr lang="en-US" altLang="zh-CN" sz="1400" dirty="0"/>
+          </a:p>
+        </p:txBody>
+      </p:sp>
+      <p:sp>
+        <p:nvSpPr>
+          <p:cNvPr id="11" name="流程图: 决策 10">
+            <a:extLst>
+              <a:ext uri="{FF2B5EF4-FFF2-40B4-BE49-F238E27FC236}">
+                <a16:creationId xmlns:a16="http://schemas.microsoft.com/office/drawing/2014/main" id="{8D0A2266-EF0D-04D6-0D3B-39D274765CB7}"/>
+              </a:ext>
+            </a:extLst>
+          </p:cNvPr>
+          <p:cNvSpPr/>
+          <p:nvPr/>
+        </p:nvSpPr>
+        <p:spPr>
+          <a:xfrm>
+            <a:off x="6832885" y="4499985"/>
+            <a:ext cx="2286000" cy="925157"/>
+          </a:xfrm>
+          <a:prstGeom prst="flowChartDecision">
+            <a:avLst/>
+          </a:prstGeom>
+        </p:spPr>
+        <p:style>
+          <a:lnRef idx="2">
+            <a:schemeClr val="accent1">
+              <a:shade val="15000"/>
+            </a:schemeClr>
+          </a:lnRef>
+          <a:fillRef idx="1">
+            <a:schemeClr val="accent1"/>
+          </a:fillRef>
+          <a:effectRef idx="0">
+            <a:schemeClr val="accent1"/>
+          </a:effectRef>
+          <a:fontRef idx="minor">
+            <a:schemeClr val="lt1"/>
+          </a:fontRef>
+        </p:style>
+        <p:txBody>
+          <a:bodyPr rtlCol="0" anchor="ctr"/>
+          <a:lstStyle/>
+          <a:p>
+            <a:pPr algn="ctr"/>
+            <a:r>
+              <a:rPr lang="en-US" altLang="zh-CN" sz="1400" dirty="0"/>
+              <a:t>RX_MSG==TX_MSG</a:t>
+            </a:r>
+            <a:endParaRPr lang="zh-CN" altLang="en-US" sz="1400" dirty="0"/>
+          </a:p>
+        </p:txBody>
+      </p:sp>
+      <p:sp>
+        <p:nvSpPr>
+          <p:cNvPr id="12" name="流程图: 可选过程 11">
+            <a:extLst>
+              <a:ext uri="{FF2B5EF4-FFF2-40B4-BE49-F238E27FC236}">
+                <a16:creationId xmlns:a16="http://schemas.microsoft.com/office/drawing/2014/main" id="{6D1831DF-C970-E48B-E7E5-B6B0E216190B}"/>
+              </a:ext>
+            </a:extLst>
+          </p:cNvPr>
+          <p:cNvSpPr/>
+          <p:nvPr/>
+        </p:nvSpPr>
+        <p:spPr>
+          <a:xfrm>
+            <a:off x="7484618" y="5833710"/>
+            <a:ext cx="982535" cy="505609"/>
+          </a:xfrm>
+          <a:prstGeom prst="flowChartAlternateProcess">
+            <a:avLst/>
+          </a:prstGeom>
+        </p:spPr>
+        <p:style>
+          <a:lnRef idx="2">
+            <a:schemeClr val="accent1">
+              <a:shade val="15000"/>
+            </a:schemeClr>
+          </a:lnRef>
+          <a:fillRef idx="1">
+            <a:schemeClr val="accent1"/>
+          </a:fillRef>
+          <a:effectRef idx="0">
+            <a:schemeClr val="accent1"/>
+          </a:effectRef>
+          <a:fontRef idx="minor">
+            <a:schemeClr val="lt1"/>
+          </a:fontRef>
+        </p:style>
+        <p:txBody>
+          <a:bodyPr rtlCol="0" anchor="ctr"/>
+          <a:lstStyle/>
+          <a:p>
+            <a:pPr algn="ctr"/>
+            <a:r>
+              <a:rPr lang="zh-CN" altLang="en-US" sz="1400" dirty="0"/>
+              <a:t>测试通过</a:t>
+            </a:r>
+          </a:p>
+        </p:txBody>
+      </p:sp>
+      <p:sp>
+        <p:nvSpPr>
+          <p:cNvPr id="14" name="流程图: 可选过程 13">
+            <a:extLst>
+              <a:ext uri="{FF2B5EF4-FFF2-40B4-BE49-F238E27FC236}">
+                <a16:creationId xmlns:a16="http://schemas.microsoft.com/office/drawing/2014/main" id="{BB7D6C8C-0105-9B95-7914-667A4AF3F41F}"/>
+              </a:ext>
+            </a:extLst>
+          </p:cNvPr>
+          <p:cNvSpPr/>
+          <p:nvPr/>
+        </p:nvSpPr>
+        <p:spPr>
+          <a:xfrm>
+            <a:off x="4752620" y="1999505"/>
+            <a:ext cx="982535" cy="505609"/>
+          </a:xfrm>
+          <a:prstGeom prst="flowChartAlternateProcess">
+            <a:avLst/>
+          </a:prstGeom>
+        </p:spPr>
+        <p:style>
+          <a:lnRef idx="2">
+            <a:schemeClr val="accent1">
+              <a:shade val="15000"/>
+            </a:schemeClr>
+          </a:lnRef>
+          <a:fillRef idx="1">
+            <a:schemeClr val="accent1"/>
+          </a:fillRef>
+          <a:effectRef idx="0">
+            <a:schemeClr val="accent1"/>
+          </a:effectRef>
+          <a:fontRef idx="minor">
+            <a:schemeClr val="lt1"/>
+          </a:fontRef>
+        </p:style>
+        <p:txBody>
+          <a:bodyPr rtlCol="0" anchor="ctr"/>
+          <a:lstStyle/>
+          <a:p>
+            <a:pPr algn="ctr"/>
+            <a:r>
+              <a:rPr lang="zh-CN" altLang="en-US" sz="1400" dirty="0"/>
+              <a:t>测试失败</a:t>
+            </a:r>
+          </a:p>
+        </p:txBody>
+      </p:sp>
+      <p:sp>
+        <p:nvSpPr>
+          <p:cNvPr id="15" name="流程图: 可选过程 14">
+            <a:extLst>
+              <a:ext uri="{FF2B5EF4-FFF2-40B4-BE49-F238E27FC236}">
+                <a16:creationId xmlns:a16="http://schemas.microsoft.com/office/drawing/2014/main" id="{FBA409A6-BEE9-3D2A-E5B9-DA774CA4567C}"/>
+              </a:ext>
+            </a:extLst>
+          </p:cNvPr>
+          <p:cNvSpPr/>
+          <p:nvPr/>
+        </p:nvSpPr>
+        <p:spPr>
+          <a:xfrm>
+            <a:off x="9477921" y="4709758"/>
+            <a:ext cx="982535" cy="505609"/>
+          </a:xfrm>
+          <a:prstGeom prst="flowChartAlternateProcess">
+            <a:avLst/>
+          </a:prstGeom>
+        </p:spPr>
+        <p:style>
+          <a:lnRef idx="2">
+            <a:schemeClr val="accent1">
+              <a:shade val="15000"/>
+            </a:schemeClr>
+          </a:lnRef>
+          <a:fillRef idx="1">
+            <a:schemeClr val="accent1"/>
+          </a:fillRef>
+          <a:effectRef idx="0">
+            <a:schemeClr val="accent1"/>
+          </a:effectRef>
+          <a:fontRef idx="minor">
+            <a:schemeClr val="lt1"/>
+          </a:fontRef>
+        </p:style>
+        <p:txBody>
+          <a:bodyPr rtlCol="0" anchor="ctr"/>
+          <a:lstStyle/>
+          <a:p>
+            <a:pPr algn="ctr"/>
+            <a:r>
+              <a:rPr lang="zh-CN" altLang="en-US" sz="1400" dirty="0"/>
+              <a:t>测试失败</a:t>
+            </a:r>
+          </a:p>
+        </p:txBody>
+      </p:sp>
+      <p:sp>
+        <p:nvSpPr>
+          <p:cNvPr id="16" name="流程图: 可选过程 15">
+            <a:extLst>
+              <a:ext uri="{FF2B5EF4-FFF2-40B4-BE49-F238E27FC236}">
+                <a16:creationId xmlns:a16="http://schemas.microsoft.com/office/drawing/2014/main" id="{70EB19AE-2573-2F78-FB3A-138C9B65F0DC}"/>
+              </a:ext>
+            </a:extLst>
+          </p:cNvPr>
+          <p:cNvSpPr/>
+          <p:nvPr/>
+        </p:nvSpPr>
+        <p:spPr>
+          <a:xfrm>
+            <a:off x="9477921" y="1913220"/>
+            <a:ext cx="982535" cy="505609"/>
+          </a:xfrm>
+          <a:prstGeom prst="flowChartAlternateProcess">
+            <a:avLst/>
+          </a:prstGeom>
+        </p:spPr>
+        <p:style>
+          <a:lnRef idx="2">
+            <a:schemeClr val="accent1">
+              <a:shade val="15000"/>
+            </a:schemeClr>
+          </a:lnRef>
+          <a:fillRef idx="1">
+            <a:schemeClr val="accent1"/>
+          </a:fillRef>
+          <a:effectRef idx="0">
+            <a:schemeClr val="accent1"/>
+          </a:effectRef>
+          <a:fontRef idx="minor">
+            <a:schemeClr val="lt1"/>
+          </a:fontRef>
+        </p:style>
+        <p:txBody>
+          <a:bodyPr rtlCol="0" anchor="ctr"/>
+          <a:lstStyle/>
+          <a:p>
+            <a:pPr algn="ctr"/>
+            <a:r>
+              <a:rPr lang="zh-CN" altLang="en-US" sz="1400" dirty="0"/>
+              <a:t>测试失败</a:t>
+            </a:r>
+          </a:p>
+        </p:txBody>
+      </p:sp>
+      <p:cxnSp>
+        <p:nvCxnSpPr>
+          <p:cNvPr id="18" name="直接箭头连接符 17">
+            <a:extLst>
+              <a:ext uri="{FF2B5EF4-FFF2-40B4-BE49-F238E27FC236}">
+                <a16:creationId xmlns:a16="http://schemas.microsoft.com/office/drawing/2014/main" id="{13E746B9-B7F0-B48E-6F6E-5713A502CC22}"/>
+              </a:ext>
+            </a:extLst>
+          </p:cNvPr>
+          <p:cNvCxnSpPr>
+            <a:stCxn id="3" idx="2"/>
+            <a:endCxn id="4" idx="0"/>
+          </p:cNvCxnSpPr>
+          <p:nvPr/>
+        </p:nvCxnSpPr>
+        <p:spPr>
+          <a:xfrm flipH="1">
+            <a:off x="3315586" y="1354046"/>
+            <a:ext cx="1" cy="435686"/>
+          </a:xfrm>
+          <a:prstGeom prst="straightConnector1">
+            <a:avLst/>
+          </a:prstGeom>
+          <a:ln>
+            <a:tailEnd type="triangle"/>
+          </a:ln>
+        </p:spPr>
+        <p:style>
+          <a:lnRef idx="1">
+            <a:schemeClr val="accent1"/>
+          </a:lnRef>
+          <a:fillRef idx="0">
+            <a:schemeClr val="accent1"/>
+          </a:fillRef>
+          <a:effectRef idx="0">
+            <a:schemeClr val="accent1"/>
+          </a:effectRef>
+          <a:fontRef idx="minor">
+            <a:schemeClr val="tx1"/>
+          </a:fontRef>
+        </p:style>
+      </p:cxnSp>
+      <p:cxnSp>
+        <p:nvCxnSpPr>
+          <p:cNvPr id="22" name="直接箭头连接符 21">
+            <a:extLst>
+              <a:ext uri="{FF2B5EF4-FFF2-40B4-BE49-F238E27FC236}">
+                <a16:creationId xmlns:a16="http://schemas.microsoft.com/office/drawing/2014/main" id="{AEE7DBA9-26FF-18B0-A1EF-4241F45F5AF6}"/>
+              </a:ext>
+            </a:extLst>
+          </p:cNvPr>
+          <p:cNvCxnSpPr>
+            <a:stCxn id="4" idx="2"/>
+            <a:endCxn id="2" idx="0"/>
+          </p:cNvCxnSpPr>
+          <p:nvPr/>
+        </p:nvCxnSpPr>
+        <p:spPr>
+          <a:xfrm>
+            <a:off x="3315586" y="2714889"/>
+            <a:ext cx="1" cy="435686"/>
+          </a:xfrm>
+          <a:prstGeom prst="straightConnector1">
+            <a:avLst/>
+          </a:prstGeom>
+          <a:ln>
+            <a:tailEnd type="triangle"/>
+          </a:ln>
+        </p:spPr>
+        <p:style>
+          <a:lnRef idx="1">
+            <a:schemeClr val="accent1"/>
+          </a:lnRef>
+          <a:fillRef idx="0">
+            <a:schemeClr val="accent1"/>
+          </a:fillRef>
+          <a:effectRef idx="0">
+            <a:schemeClr val="accent1"/>
+          </a:effectRef>
+          <a:fontRef idx="minor">
+            <a:schemeClr val="tx1"/>
+          </a:fontRef>
+        </p:style>
+      </p:cxnSp>
+      <p:cxnSp>
+        <p:nvCxnSpPr>
+          <p:cNvPr id="24" name="直接箭头连接符 23">
+            <a:extLst>
+              <a:ext uri="{FF2B5EF4-FFF2-40B4-BE49-F238E27FC236}">
+                <a16:creationId xmlns:a16="http://schemas.microsoft.com/office/drawing/2014/main" id="{9E86017F-37A9-D0DA-A39C-76EAE1E4806B}"/>
+              </a:ext>
+            </a:extLst>
+          </p:cNvPr>
+          <p:cNvCxnSpPr>
+            <a:stCxn id="2" idx="2"/>
+            <a:endCxn id="6" idx="0"/>
+          </p:cNvCxnSpPr>
+          <p:nvPr/>
+        </p:nvCxnSpPr>
+        <p:spPr>
+          <a:xfrm>
+            <a:off x="3315587" y="4204823"/>
+            <a:ext cx="0" cy="435685"/>
+          </a:xfrm>
+          <a:prstGeom prst="straightConnector1">
+            <a:avLst/>
+          </a:prstGeom>
+          <a:ln>
+            <a:tailEnd type="triangle"/>
+          </a:ln>
+        </p:spPr>
+        <p:style>
+          <a:lnRef idx="1">
+            <a:schemeClr val="accent1"/>
+          </a:lnRef>
+          <a:fillRef idx="0">
+            <a:schemeClr val="accent1"/>
+          </a:fillRef>
+          <a:effectRef idx="0">
+            <a:schemeClr val="accent1"/>
+          </a:effectRef>
+          <a:fontRef idx="minor">
+            <a:schemeClr val="tx1"/>
+          </a:fontRef>
+        </p:style>
+      </p:cxnSp>
+      <p:cxnSp>
+        <p:nvCxnSpPr>
+          <p:cNvPr id="26" name="连接符: 肘形 25">
+            <a:extLst>
+              <a:ext uri="{FF2B5EF4-FFF2-40B4-BE49-F238E27FC236}">
+                <a16:creationId xmlns:a16="http://schemas.microsoft.com/office/drawing/2014/main" id="{C7CCE7A7-B160-8791-D6A7-62A8F1CA95BA}"/>
+              </a:ext>
+            </a:extLst>
+          </p:cNvPr>
+          <p:cNvCxnSpPr>
+            <a:cxnSpLocks/>
+            <a:stCxn id="6" idx="3"/>
+            <a:endCxn id="7" idx="0"/>
+          </p:cNvCxnSpPr>
+          <p:nvPr/>
+        </p:nvCxnSpPr>
+        <p:spPr>
+          <a:xfrm flipV="1">
+            <a:off x="4528512" y="789271"/>
+            <a:ext cx="3447374" cy="4104042"/>
+          </a:xfrm>
+          <a:prstGeom prst="bentConnector4">
+            <a:avLst>
+              <a:gd name="adj1" fmla="val 42751"/>
+              <a:gd name="adj2" fmla="val 105570"/>
+            </a:avLst>
+          </a:prstGeom>
+          <a:ln>
+            <a:tailEnd type="triangle"/>
+          </a:ln>
+        </p:spPr>
+        <p:style>
+          <a:lnRef idx="1">
+            <a:schemeClr val="accent1"/>
+          </a:lnRef>
+          <a:fillRef idx="0">
+            <a:schemeClr val="accent1"/>
+          </a:fillRef>
+          <a:effectRef idx="0">
+            <a:schemeClr val="accent1"/>
+          </a:effectRef>
+          <a:fontRef idx="minor">
+            <a:schemeClr val="tx1"/>
+          </a:fontRef>
+        </p:style>
+      </p:cxnSp>
+      <p:cxnSp>
+        <p:nvCxnSpPr>
+          <p:cNvPr id="35" name="直接箭头连接符 34">
+            <a:extLst>
+              <a:ext uri="{FF2B5EF4-FFF2-40B4-BE49-F238E27FC236}">
+                <a16:creationId xmlns:a16="http://schemas.microsoft.com/office/drawing/2014/main" id="{E1D6AC2C-30D4-2839-EEB4-4FDED941C024}"/>
+              </a:ext>
+            </a:extLst>
+          </p:cNvPr>
+          <p:cNvCxnSpPr>
+            <a:stCxn id="4" idx="3"/>
+            <a:endCxn id="14" idx="1"/>
+          </p:cNvCxnSpPr>
+          <p:nvPr/>
+        </p:nvCxnSpPr>
+        <p:spPr>
+          <a:xfrm flipV="1">
+            <a:off x="4458586" y="2252310"/>
+            <a:ext cx="294034" cy="1"/>
+          </a:xfrm>
+          <a:prstGeom prst="straightConnector1">
+            <a:avLst/>
+          </a:prstGeom>
+          <a:ln>
+            <a:tailEnd type="triangle"/>
+          </a:ln>
+        </p:spPr>
+        <p:style>
+          <a:lnRef idx="1">
+            <a:schemeClr val="accent1"/>
+          </a:lnRef>
+          <a:fillRef idx="0">
+            <a:schemeClr val="accent1"/>
+          </a:fillRef>
+          <a:effectRef idx="0">
+            <a:schemeClr val="accent1"/>
+          </a:effectRef>
+          <a:fontRef idx="minor">
+            <a:schemeClr val="tx1"/>
+          </a:fontRef>
+        </p:style>
+      </p:cxnSp>
+      <p:sp>
+        <p:nvSpPr>
+          <p:cNvPr id="37" name="文本框 36">
+            <a:extLst>
+              <a:ext uri="{FF2B5EF4-FFF2-40B4-BE49-F238E27FC236}">
+                <a16:creationId xmlns:a16="http://schemas.microsoft.com/office/drawing/2014/main" id="{361852C4-8D9E-C88F-DBAA-5039F69DD6DE}"/>
+              </a:ext>
+            </a:extLst>
+          </p:cNvPr>
+          <p:cNvSpPr txBox="1"/>
+          <p:nvPr/>
+        </p:nvSpPr>
+        <p:spPr>
+          <a:xfrm>
+            <a:off x="586815" y="1466566"/>
+            <a:ext cx="1183337" cy="646331"/>
+          </a:xfrm>
+          <a:prstGeom prst="rect">
+            <a:avLst/>
+          </a:prstGeom>
+          <a:noFill/>
+        </p:spPr>
+        <p:txBody>
+          <a:bodyPr wrap="none" rtlCol="0">
+            <a:spAutoFit/>
+          </a:bodyPr>
+          <a:lstStyle/>
+          <a:p>
+            <a:r>
+              <a:rPr lang="en-US" altLang="zh-CN" dirty="0"/>
+              <a:t>4-Iters:</a:t>
+            </a:r>
+          </a:p>
+          <a:p>
+            <a:r>
+              <a:rPr lang="en-US" altLang="zh-CN" dirty="0"/>
+              <a:t>CAN[1…4]</a:t>
+            </a:r>
+            <a:endParaRPr lang="zh-CN" altLang="en-US" dirty="0"/>
+          </a:p>
+        </p:txBody>
+      </p:sp>
+      <p:sp>
+        <p:nvSpPr>
+          <p:cNvPr id="38" name="左大括号 37">
+            <a:extLst>
+              <a:ext uri="{FF2B5EF4-FFF2-40B4-BE49-F238E27FC236}">
+                <a16:creationId xmlns:a16="http://schemas.microsoft.com/office/drawing/2014/main" id="{17DBD6DE-BF8B-A33A-6E79-E335B35FB462}"/>
+              </a:ext>
+            </a:extLst>
+          </p:cNvPr>
+          <p:cNvSpPr/>
+          <p:nvPr/>
+        </p:nvSpPr>
+        <p:spPr>
+          <a:xfrm>
+            <a:off x="1403808" y="870849"/>
+            <a:ext cx="572616" cy="1844040"/>
+          </a:xfrm>
+          <a:prstGeom prst="leftBrace">
+            <a:avLst/>
+          </a:prstGeom>
+        </p:spPr>
+        <p:style>
+          <a:lnRef idx="1">
+            <a:schemeClr val="accent1"/>
+          </a:lnRef>
+          <a:fillRef idx="0">
+            <a:schemeClr val="accent1"/>
+          </a:fillRef>
+          <a:effectRef idx="0">
+            <a:schemeClr val="accent1"/>
+          </a:effectRef>
+          <a:fontRef idx="minor">
+            <a:schemeClr val="tx1"/>
+          </a:fontRef>
+        </p:style>
+        <p:txBody>
+          <a:bodyPr rtlCol="0" anchor="ctr"/>
+          <a:lstStyle/>
+          <a:p>
+            <a:pPr algn="ctr"/>
+            <a:endParaRPr lang="zh-CN" altLang="en-US"/>
+          </a:p>
+        </p:txBody>
+      </p:sp>
+      <p:sp>
+        <p:nvSpPr>
+          <p:cNvPr id="39" name="左大括号 38">
+            <a:extLst>
+              <a:ext uri="{FF2B5EF4-FFF2-40B4-BE49-F238E27FC236}">
+                <a16:creationId xmlns:a16="http://schemas.microsoft.com/office/drawing/2014/main" id="{AACCFB20-3CC0-A5F5-CEAA-B4C8A5EB691D}"/>
+              </a:ext>
+            </a:extLst>
+          </p:cNvPr>
+          <p:cNvSpPr/>
+          <p:nvPr/>
+        </p:nvSpPr>
+        <p:spPr>
+          <a:xfrm>
+            <a:off x="1403808" y="3086105"/>
+            <a:ext cx="572616" cy="1183187"/>
+          </a:xfrm>
+          <a:prstGeom prst="leftBrace">
+            <a:avLst/>
+          </a:prstGeom>
+        </p:spPr>
+        <p:style>
+          <a:lnRef idx="1">
+            <a:schemeClr val="accent1"/>
+          </a:lnRef>
+          <a:fillRef idx="0">
+            <a:schemeClr val="accent1"/>
+          </a:fillRef>
+          <a:effectRef idx="0">
+            <a:schemeClr val="accent1"/>
+          </a:effectRef>
+          <a:fontRef idx="minor">
+            <a:schemeClr val="tx1"/>
+          </a:fontRef>
+        </p:style>
+        <p:txBody>
+          <a:bodyPr rtlCol="0" anchor="ctr"/>
+          <a:lstStyle/>
+          <a:p>
+            <a:pPr algn="ctr"/>
+            <a:endParaRPr lang="zh-CN" altLang="en-US"/>
+          </a:p>
+        </p:txBody>
+      </p:sp>
+      <p:sp>
+        <p:nvSpPr>
+          <p:cNvPr id="42" name="文本框 41">
+            <a:extLst>
+              <a:ext uri="{FF2B5EF4-FFF2-40B4-BE49-F238E27FC236}">
+                <a16:creationId xmlns:a16="http://schemas.microsoft.com/office/drawing/2014/main" id="{1DEC62CB-F693-9F33-BE12-084ED5755AF9}"/>
+              </a:ext>
+            </a:extLst>
+          </p:cNvPr>
+          <p:cNvSpPr txBox="1"/>
+          <p:nvPr/>
+        </p:nvSpPr>
+        <p:spPr>
+          <a:xfrm>
+            <a:off x="755933" y="3335241"/>
+            <a:ext cx="845103" cy="369332"/>
+          </a:xfrm>
+          <a:prstGeom prst="rect">
+            <a:avLst/>
+          </a:prstGeom>
+          <a:noFill/>
+        </p:spPr>
+        <p:txBody>
+          <a:bodyPr wrap="none" rtlCol="0">
+            <a:spAutoFit/>
+          </a:bodyPr>
+          <a:lstStyle/>
+          <a:p>
+            <a:r>
+              <a:rPr lang="en-US" altLang="zh-CN" dirty="0"/>
+              <a:t>4-Iters</a:t>
+            </a:r>
+          </a:p>
+        </p:txBody>
+      </p:sp>
+      <p:sp>
+        <p:nvSpPr>
+          <p:cNvPr id="43" name="左大括号 42">
+            <a:extLst>
+              <a:ext uri="{FF2B5EF4-FFF2-40B4-BE49-F238E27FC236}">
+                <a16:creationId xmlns:a16="http://schemas.microsoft.com/office/drawing/2014/main" id="{C9257AB1-AAD6-607A-9164-74C5C9C728D9}"/>
+              </a:ext>
+            </a:extLst>
+          </p:cNvPr>
+          <p:cNvSpPr/>
+          <p:nvPr/>
+        </p:nvSpPr>
+        <p:spPr>
+          <a:xfrm>
+            <a:off x="1403808" y="4623774"/>
+            <a:ext cx="572616" cy="522344"/>
+          </a:xfrm>
+          <a:prstGeom prst="leftBrace">
+            <a:avLst/>
+          </a:prstGeom>
+        </p:spPr>
+        <p:style>
+          <a:lnRef idx="1">
+            <a:schemeClr val="accent1"/>
+          </a:lnRef>
+          <a:fillRef idx="0">
+            <a:schemeClr val="accent1"/>
+          </a:fillRef>
+          <a:effectRef idx="0">
+            <a:schemeClr val="accent1"/>
+          </a:effectRef>
+          <a:fontRef idx="minor">
+            <a:schemeClr val="tx1"/>
+          </a:fontRef>
+        </p:style>
+        <p:txBody>
+          <a:bodyPr rtlCol="0" anchor="ctr"/>
+          <a:lstStyle/>
+          <a:p>
+            <a:pPr algn="ctr"/>
+            <a:endParaRPr lang="zh-CN" altLang="en-US"/>
+          </a:p>
+        </p:txBody>
+      </p:sp>
+      <p:sp>
+        <p:nvSpPr>
+          <p:cNvPr id="44" name="文本框 43">
+            <a:extLst>
+              <a:ext uri="{FF2B5EF4-FFF2-40B4-BE49-F238E27FC236}">
+                <a16:creationId xmlns:a16="http://schemas.microsoft.com/office/drawing/2014/main" id="{FAFBC812-8E16-9E0A-21BA-171B50647569}"/>
+              </a:ext>
+            </a:extLst>
+          </p:cNvPr>
+          <p:cNvSpPr txBox="1"/>
+          <p:nvPr/>
+        </p:nvSpPr>
+        <p:spPr>
+          <a:xfrm>
+            <a:off x="845013" y="4526709"/>
+            <a:ext cx="845103" cy="369332"/>
+          </a:xfrm>
+          <a:prstGeom prst="rect">
+            <a:avLst/>
+          </a:prstGeom>
+          <a:noFill/>
+        </p:spPr>
+        <p:txBody>
+          <a:bodyPr wrap="none" rtlCol="0">
+            <a:spAutoFit/>
+          </a:bodyPr>
+          <a:lstStyle/>
+          <a:p>
+            <a:r>
+              <a:rPr lang="en-US" altLang="zh-CN" dirty="0"/>
+              <a:t>4-Iters</a:t>
+            </a:r>
+          </a:p>
+        </p:txBody>
+      </p:sp>
+      <p:cxnSp>
+        <p:nvCxnSpPr>
+          <p:cNvPr id="46" name="直接箭头连接符 45">
+            <a:extLst>
+              <a:ext uri="{FF2B5EF4-FFF2-40B4-BE49-F238E27FC236}">
+                <a16:creationId xmlns:a16="http://schemas.microsoft.com/office/drawing/2014/main" id="{B9733E5B-EA7B-EE47-4640-80A9B045C495}"/>
+              </a:ext>
+            </a:extLst>
+          </p:cNvPr>
+          <p:cNvCxnSpPr>
+            <a:stCxn id="7" idx="2"/>
+            <a:endCxn id="8" idx="0"/>
+          </p:cNvCxnSpPr>
+          <p:nvPr/>
+        </p:nvCxnSpPr>
+        <p:spPr>
+          <a:xfrm flipH="1">
+            <a:off x="7975885" y="1294880"/>
+            <a:ext cx="1" cy="408567"/>
+          </a:xfrm>
+          <a:prstGeom prst="straightConnector1">
+            <a:avLst/>
+          </a:prstGeom>
+          <a:ln>
+            <a:tailEnd type="triangle"/>
+          </a:ln>
+        </p:spPr>
+        <p:style>
+          <a:lnRef idx="1">
+            <a:schemeClr val="accent1"/>
+          </a:lnRef>
+          <a:fillRef idx="0">
+            <a:schemeClr val="accent1"/>
+          </a:fillRef>
+          <a:effectRef idx="0">
+            <a:schemeClr val="accent1"/>
+          </a:effectRef>
+          <a:fontRef idx="minor">
+            <a:schemeClr val="tx1"/>
+          </a:fontRef>
+        </p:style>
+      </p:cxnSp>
+      <p:cxnSp>
+        <p:nvCxnSpPr>
+          <p:cNvPr id="48" name="直接箭头连接符 47">
+            <a:extLst>
+              <a:ext uri="{FF2B5EF4-FFF2-40B4-BE49-F238E27FC236}">
+                <a16:creationId xmlns:a16="http://schemas.microsoft.com/office/drawing/2014/main" id="{FA9208A4-3C9A-2A15-449E-4B2CEF3D387F}"/>
+              </a:ext>
+            </a:extLst>
+          </p:cNvPr>
+          <p:cNvCxnSpPr>
+            <a:stCxn id="8" idx="2"/>
+            <a:endCxn id="9" idx="0"/>
+          </p:cNvCxnSpPr>
+          <p:nvPr/>
+        </p:nvCxnSpPr>
+        <p:spPr>
+          <a:xfrm>
+            <a:off x="7975885" y="2628604"/>
+            <a:ext cx="1" cy="408567"/>
+          </a:xfrm>
+          <a:prstGeom prst="straightConnector1">
+            <a:avLst/>
+          </a:prstGeom>
+          <a:ln>
+            <a:tailEnd type="triangle"/>
+          </a:ln>
+        </p:spPr>
+        <p:style>
+          <a:lnRef idx="1">
+            <a:schemeClr val="accent1"/>
+          </a:lnRef>
+          <a:fillRef idx="0">
+            <a:schemeClr val="accent1"/>
+          </a:fillRef>
+          <a:effectRef idx="0">
+            <a:schemeClr val="accent1"/>
+          </a:effectRef>
+          <a:fontRef idx="minor">
+            <a:schemeClr val="tx1"/>
+          </a:fontRef>
+        </p:style>
+      </p:cxnSp>
+      <p:cxnSp>
+        <p:nvCxnSpPr>
+          <p:cNvPr id="50" name="直接箭头连接符 49">
+            <a:extLst>
+              <a:ext uri="{FF2B5EF4-FFF2-40B4-BE49-F238E27FC236}">
+                <a16:creationId xmlns:a16="http://schemas.microsoft.com/office/drawing/2014/main" id="{B83B7D89-2D6B-FD0B-EF89-280BA952710A}"/>
+              </a:ext>
+            </a:extLst>
+          </p:cNvPr>
+          <p:cNvCxnSpPr>
+            <a:stCxn id="9" idx="2"/>
+            <a:endCxn id="11" idx="0"/>
+          </p:cNvCxnSpPr>
+          <p:nvPr/>
+        </p:nvCxnSpPr>
+        <p:spPr>
+          <a:xfrm flipH="1">
+            <a:off x="7975885" y="4091418"/>
+            <a:ext cx="1" cy="408567"/>
+          </a:xfrm>
+          <a:prstGeom prst="straightConnector1">
+            <a:avLst/>
+          </a:prstGeom>
+          <a:ln>
+            <a:tailEnd type="triangle"/>
+          </a:ln>
+        </p:spPr>
+        <p:style>
+          <a:lnRef idx="1">
+            <a:schemeClr val="accent1"/>
+          </a:lnRef>
+          <a:fillRef idx="0">
+            <a:schemeClr val="accent1"/>
+          </a:fillRef>
+          <a:effectRef idx="0">
+            <a:schemeClr val="accent1"/>
+          </a:effectRef>
+          <a:fontRef idx="minor">
+            <a:schemeClr val="tx1"/>
+          </a:fontRef>
+        </p:style>
+      </p:cxnSp>
+      <p:cxnSp>
+        <p:nvCxnSpPr>
+          <p:cNvPr id="52" name="直接箭头连接符 51">
+            <a:extLst>
+              <a:ext uri="{FF2B5EF4-FFF2-40B4-BE49-F238E27FC236}">
+                <a16:creationId xmlns:a16="http://schemas.microsoft.com/office/drawing/2014/main" id="{0A6E8ED0-E63F-8BB3-8187-BEA37483319C}"/>
+              </a:ext>
+            </a:extLst>
+          </p:cNvPr>
+          <p:cNvCxnSpPr>
+            <a:stCxn id="11" idx="2"/>
+            <a:endCxn id="12" idx="0"/>
+          </p:cNvCxnSpPr>
+          <p:nvPr/>
+        </p:nvCxnSpPr>
+        <p:spPr>
+          <a:xfrm>
+            <a:off x="7975885" y="5425142"/>
+            <a:ext cx="1" cy="408568"/>
+          </a:xfrm>
+          <a:prstGeom prst="straightConnector1">
+            <a:avLst/>
+          </a:prstGeom>
+          <a:ln>
+            <a:tailEnd type="triangle"/>
+          </a:ln>
+        </p:spPr>
+        <p:style>
+          <a:lnRef idx="1">
+            <a:schemeClr val="accent1"/>
+          </a:lnRef>
+          <a:fillRef idx="0">
+            <a:schemeClr val="accent1"/>
+          </a:fillRef>
+          <a:effectRef idx="0">
+            <a:schemeClr val="accent1"/>
+          </a:effectRef>
+          <a:fontRef idx="minor">
+            <a:schemeClr val="tx1"/>
+          </a:fontRef>
+        </p:style>
+      </p:cxnSp>
+      <p:cxnSp>
+        <p:nvCxnSpPr>
+          <p:cNvPr id="54" name="直接箭头连接符 53">
+            <a:extLst>
+              <a:ext uri="{FF2B5EF4-FFF2-40B4-BE49-F238E27FC236}">
+                <a16:creationId xmlns:a16="http://schemas.microsoft.com/office/drawing/2014/main" id="{335E9F48-8385-65A5-89B8-72B5547A6EE0}"/>
+              </a:ext>
+            </a:extLst>
+          </p:cNvPr>
+          <p:cNvCxnSpPr>
+            <a:stCxn id="8" idx="3"/>
+            <a:endCxn id="16" idx="1"/>
+          </p:cNvCxnSpPr>
+          <p:nvPr/>
+        </p:nvCxnSpPr>
+        <p:spPr>
+          <a:xfrm flipV="1">
+            <a:off x="9118885" y="2166025"/>
+            <a:ext cx="359036" cy="1"/>
+          </a:xfrm>
+          <a:prstGeom prst="straightConnector1">
+            <a:avLst/>
+          </a:prstGeom>
+          <a:ln>
+            <a:tailEnd type="triangle"/>
+          </a:ln>
+        </p:spPr>
+        <p:style>
+          <a:lnRef idx="1">
+            <a:schemeClr val="accent1"/>
+          </a:lnRef>
+          <a:fillRef idx="0">
+            <a:schemeClr val="accent1"/>
+          </a:fillRef>
+          <a:effectRef idx="0">
+            <a:schemeClr val="accent1"/>
+          </a:effectRef>
+          <a:fontRef idx="minor">
+            <a:schemeClr val="tx1"/>
+          </a:fontRef>
+        </p:style>
+      </p:cxnSp>
+      <p:cxnSp>
+        <p:nvCxnSpPr>
+          <p:cNvPr id="56" name="直接箭头连接符 55">
+            <a:extLst>
+              <a:ext uri="{FF2B5EF4-FFF2-40B4-BE49-F238E27FC236}">
+                <a16:creationId xmlns:a16="http://schemas.microsoft.com/office/drawing/2014/main" id="{E1EBD58A-C64A-90FB-8E10-D7103BFC3541}"/>
+              </a:ext>
+            </a:extLst>
+          </p:cNvPr>
+          <p:cNvCxnSpPr>
+            <a:stCxn id="11" idx="3"/>
+            <a:endCxn id="15" idx="1"/>
+          </p:cNvCxnSpPr>
+          <p:nvPr/>
+        </p:nvCxnSpPr>
+        <p:spPr>
+          <a:xfrm flipV="1">
+            <a:off x="9118885" y="4962563"/>
+            <a:ext cx="359036" cy="1"/>
+          </a:xfrm>
+          <a:prstGeom prst="straightConnector1">
+            <a:avLst/>
+          </a:prstGeom>
+          <a:ln>
+            <a:tailEnd type="triangle"/>
+          </a:ln>
+        </p:spPr>
+        <p:style>
+          <a:lnRef idx="1">
+            <a:schemeClr val="accent1"/>
+          </a:lnRef>
+          <a:fillRef idx="0">
+            <a:schemeClr val="accent1"/>
+          </a:fillRef>
+          <a:effectRef idx="0">
+            <a:schemeClr val="accent1"/>
+          </a:effectRef>
+          <a:fontRef idx="minor">
+            <a:schemeClr val="tx1"/>
+          </a:fontRef>
+        </p:style>
+      </p:cxnSp>
+      <p:sp>
+        <p:nvSpPr>
+          <p:cNvPr id="58" name="文本框 57">
+            <a:extLst>
+              <a:ext uri="{FF2B5EF4-FFF2-40B4-BE49-F238E27FC236}">
+                <a16:creationId xmlns:a16="http://schemas.microsoft.com/office/drawing/2014/main" id="{DEED5D08-8CAB-D372-EA6D-D1819A552DC5}"/>
+              </a:ext>
+            </a:extLst>
+          </p:cNvPr>
+          <p:cNvSpPr txBox="1"/>
+          <p:nvPr/>
+        </p:nvSpPr>
+        <p:spPr>
+          <a:xfrm>
+            <a:off x="3315586" y="2761398"/>
+            <a:ext cx="359264" cy="307777"/>
+          </a:xfrm>
+          <a:prstGeom prst="rect">
+            <a:avLst/>
+          </a:prstGeom>
+          <a:noFill/>
+        </p:spPr>
+        <p:txBody>
+          <a:bodyPr wrap="square" rtlCol="0">
+            <a:spAutoFit/>
+          </a:bodyPr>
+          <a:lstStyle/>
+          <a:p>
+            <a:r>
+              <a:rPr lang="en-US" altLang="zh-CN" sz="1400" dirty="0"/>
+              <a:t>Y</a:t>
+            </a:r>
+            <a:endParaRPr lang="zh-CN" altLang="en-US" dirty="0"/>
+          </a:p>
+        </p:txBody>
+      </p:sp>
+      <p:sp>
+        <p:nvSpPr>
+          <p:cNvPr id="59" name="文本框 58">
+            <a:extLst>
+              <a:ext uri="{FF2B5EF4-FFF2-40B4-BE49-F238E27FC236}">
+                <a16:creationId xmlns:a16="http://schemas.microsoft.com/office/drawing/2014/main" id="{7B8B8121-EE31-E76F-9061-105D4CA5D3DD}"/>
+              </a:ext>
+            </a:extLst>
+          </p:cNvPr>
+          <p:cNvSpPr txBox="1"/>
+          <p:nvPr/>
+        </p:nvSpPr>
+        <p:spPr>
+          <a:xfrm>
+            <a:off x="8008489" y="2624955"/>
+            <a:ext cx="359264" cy="307777"/>
+          </a:xfrm>
+          <a:prstGeom prst="rect">
+            <a:avLst/>
+          </a:prstGeom>
+          <a:noFill/>
+        </p:spPr>
+        <p:txBody>
+          <a:bodyPr wrap="square" rtlCol="0">
+            <a:spAutoFit/>
+          </a:bodyPr>
+          <a:lstStyle/>
+          <a:p>
+            <a:r>
+              <a:rPr lang="en-US" altLang="zh-CN" sz="1400" dirty="0"/>
+              <a:t>Y</a:t>
+            </a:r>
+            <a:endParaRPr lang="zh-CN" altLang="en-US" dirty="0"/>
+          </a:p>
+        </p:txBody>
+      </p:sp>
+      <p:sp>
+        <p:nvSpPr>
+          <p:cNvPr id="60" name="文本框 59">
+            <a:extLst>
+              <a:ext uri="{FF2B5EF4-FFF2-40B4-BE49-F238E27FC236}">
+                <a16:creationId xmlns:a16="http://schemas.microsoft.com/office/drawing/2014/main" id="{0872026A-D90E-1ECA-E3B3-845EADF5E900}"/>
+              </a:ext>
+            </a:extLst>
+          </p:cNvPr>
+          <p:cNvSpPr txBox="1"/>
+          <p:nvPr/>
+        </p:nvSpPr>
+        <p:spPr>
+          <a:xfrm>
+            <a:off x="7975885" y="5467884"/>
+            <a:ext cx="359264" cy="307777"/>
+          </a:xfrm>
+          <a:prstGeom prst="rect">
+            <a:avLst/>
+          </a:prstGeom>
+          <a:noFill/>
+        </p:spPr>
+        <p:txBody>
+          <a:bodyPr wrap="square" rtlCol="0">
+            <a:spAutoFit/>
+          </a:bodyPr>
+          <a:lstStyle/>
+          <a:p>
+            <a:r>
+              <a:rPr lang="en-US" altLang="zh-CN" sz="1400" dirty="0"/>
+              <a:t>Y</a:t>
+            </a:r>
+            <a:endParaRPr lang="zh-CN" altLang="en-US" dirty="0"/>
+          </a:p>
+        </p:txBody>
+      </p:sp>
+      <p:sp>
+        <p:nvSpPr>
+          <p:cNvPr id="61" name="右大括号 60">
+            <a:extLst>
+              <a:ext uri="{FF2B5EF4-FFF2-40B4-BE49-F238E27FC236}">
+                <a16:creationId xmlns:a16="http://schemas.microsoft.com/office/drawing/2014/main" id="{84D560B0-0826-FD06-CED4-97AA790B2910}"/>
+              </a:ext>
+            </a:extLst>
+          </p:cNvPr>
+          <p:cNvSpPr/>
+          <p:nvPr/>
+        </p:nvSpPr>
+        <p:spPr>
+          <a:xfrm>
+            <a:off x="10547235" y="586599"/>
+            <a:ext cx="316295" cy="5503653"/>
+          </a:xfrm>
+          <a:prstGeom prst="rightBrace">
+            <a:avLst>
+              <a:gd name="adj1" fmla="val 8333"/>
+              <a:gd name="adj2" fmla="val 50105"/>
+            </a:avLst>
+          </a:prstGeom>
+        </p:spPr>
+        <p:style>
+          <a:lnRef idx="1">
+            <a:schemeClr val="accent1"/>
+          </a:lnRef>
+          <a:fillRef idx="0">
+            <a:schemeClr val="accent1"/>
+          </a:fillRef>
+          <a:effectRef idx="0">
+            <a:schemeClr val="accent1"/>
+          </a:effectRef>
+          <a:fontRef idx="minor">
+            <a:schemeClr val="tx1"/>
+          </a:fontRef>
+        </p:style>
+        <p:txBody>
+          <a:bodyPr rtlCol="0" anchor="ctr"/>
+          <a:lstStyle/>
+          <a:p>
+            <a:pPr algn="ctr"/>
+            <a:endParaRPr lang="zh-CN" altLang="en-US"/>
+          </a:p>
+        </p:txBody>
+      </p:sp>
+      <p:sp>
+        <p:nvSpPr>
+          <p:cNvPr id="62" name="文本框 61">
+            <a:extLst>
+              <a:ext uri="{FF2B5EF4-FFF2-40B4-BE49-F238E27FC236}">
+                <a16:creationId xmlns:a16="http://schemas.microsoft.com/office/drawing/2014/main" id="{8358B385-10B2-1BEA-9817-F55AA905BE34}"/>
+              </a:ext>
+            </a:extLst>
+          </p:cNvPr>
+          <p:cNvSpPr txBox="1"/>
+          <p:nvPr/>
+        </p:nvSpPr>
+        <p:spPr>
+          <a:xfrm>
+            <a:off x="10705382" y="2965909"/>
+            <a:ext cx="845103" cy="369332"/>
+          </a:xfrm>
+          <a:prstGeom prst="rect">
+            <a:avLst/>
+          </a:prstGeom>
+          <a:noFill/>
+        </p:spPr>
+        <p:txBody>
+          <a:bodyPr wrap="none" rtlCol="0">
+            <a:spAutoFit/>
+          </a:bodyPr>
+          <a:lstStyle/>
+          <a:p>
+            <a:r>
+              <a:rPr lang="en-US" altLang="zh-CN" dirty="0"/>
+              <a:t>4-Iters</a:t>
+            </a:r>
+          </a:p>
+        </p:txBody>
+      </p:sp>
+    </p:spTree>
+    <p:extLst>
+      <p:ext uri="{BB962C8B-B14F-4D97-AF65-F5344CB8AC3E}">
+        <p14:creationId xmlns:p14="http://schemas.microsoft.com/office/powerpoint/2010/main" val="2232184768"/>
+      </p:ext>
+    </p:extLst>
+  </p:cSld>
+  <p:clrMapOvr>
+    <a:masterClrMapping/>
+  </p:clrMapOvr>
+</p:sld>
+</file>
+
 <file path=ppt/theme/theme1.xml><?xml version="1.0" encoding="utf-8"?>
 <a:theme xmlns:a="http://schemas.openxmlformats.org/drawingml/2006/main" name="Office 主题​​">
   <a:themeElements>

</xml_diff>

<commit_message>
updates on phy package send and receive without onboard test
</commit_message>
<xml_diff>
--- a/stn/stn_test_fw_solution.pptx
+++ b/stn/stn_test_fw_solution.pptx
@@ -9412,1592 +9412,1613 @@
           <a:chExt cx="0" cy="0"/>
         </a:xfrm>
       </p:grpSpPr>
-      <p:sp>
-        <p:nvSpPr>
-          <p:cNvPr id="2" name="流程图: 过程 1">
-            <a:extLst>
-              <a:ext uri="{FF2B5EF4-FFF2-40B4-BE49-F238E27FC236}">
-                <a16:creationId xmlns:a16="http://schemas.microsoft.com/office/drawing/2014/main" id="{56FD0539-1DED-E9EC-7C93-5C2CFCD5B93C}"/>
-              </a:ext>
-            </a:extLst>
-          </p:cNvPr>
-          <p:cNvSpPr/>
+      <p:grpSp>
+        <p:nvGrpSpPr>
+          <p:cNvPr id="63" name="组合 62">
+            <a:extLst>
+              <a:ext uri="{FF2B5EF4-FFF2-40B4-BE49-F238E27FC236}">
+                <a16:creationId xmlns:a16="http://schemas.microsoft.com/office/drawing/2014/main" id="{88802B20-A56D-3451-AF65-3E4A2F88C2C0}"/>
+              </a:ext>
+            </a:extLst>
+          </p:cNvPr>
+          <p:cNvGrpSpPr/>
           <p:nvPr/>
-        </p:nvSpPr>
-        <p:spPr>
+        </p:nvGrpSpPr>
+        <p:grpSpPr>
           <a:xfrm>
-            <a:off x="2102661" y="3150575"/>
-            <a:ext cx="2425851" cy="1054248"/>
+            <a:off x="586815" y="586599"/>
+            <a:ext cx="10963670" cy="5752720"/>
+            <a:chOff x="586815" y="586599"/>
+            <a:chExt cx="10963670" cy="5752720"/>
           </a:xfrm>
-          <a:prstGeom prst="flowChartProcess">
-            <a:avLst/>
-          </a:prstGeom>
-        </p:spPr>
-        <p:style>
-          <a:lnRef idx="2">
-            <a:schemeClr val="accent1">
-              <a:shade val="15000"/>
-            </a:schemeClr>
-          </a:lnRef>
-          <a:fillRef idx="1">
-            <a:schemeClr val="accent1"/>
-          </a:fillRef>
-          <a:effectRef idx="0">
-            <a:schemeClr val="accent1"/>
-          </a:effectRef>
-          <a:fontRef idx="minor">
-            <a:schemeClr val="lt1"/>
-          </a:fontRef>
-        </p:style>
-        <p:txBody>
-          <a:bodyPr rtlCol="0" anchor="ctr"/>
-          <a:lstStyle/>
-          <a:p>
-            <a:pPr algn="ctr"/>
-            <a:r>
-              <a:rPr lang="en-US" altLang="zh-CN" sz="1400" dirty="0"/>
-              <a:t>CORECAN</a:t>
-            </a:r>
-            <a:r>
-              <a:rPr lang="zh-CN" altLang="en-US" sz="1400" dirty="0"/>
-              <a:t>寄存器初始化配置</a:t>
-            </a:r>
-            <a:endParaRPr lang="en-US" altLang="zh-CN" sz="1400" dirty="0"/>
-          </a:p>
-          <a:p>
-            <a:pPr algn="ctr"/>
-            <a:r>
-              <a:rPr lang="zh-CN" altLang="en-US" sz="1400" dirty="0"/>
-              <a:t>包括：</a:t>
-            </a:r>
-            <a:r>
-              <a:rPr lang="en-US" altLang="zh-CN" sz="1400" dirty="0"/>
-              <a:t>INT ENA, CMD, CONFIG, TX_MSG ID, TX_MSG WORD, AMR, ACR…</a:t>
-            </a:r>
-            <a:endParaRPr lang="zh-CN" altLang="en-US" sz="1400" dirty="0"/>
-          </a:p>
-        </p:txBody>
-      </p:sp>
-      <p:sp>
-        <p:nvSpPr>
-          <p:cNvPr id="3" name="流程图: 可选过程 2">
-            <a:extLst>
-              <a:ext uri="{FF2B5EF4-FFF2-40B4-BE49-F238E27FC236}">
-                <a16:creationId xmlns:a16="http://schemas.microsoft.com/office/drawing/2014/main" id="{0783D700-1587-863F-E4C8-E9B368D758D2}"/>
-              </a:ext>
-            </a:extLst>
-          </p:cNvPr>
-          <p:cNvSpPr/>
-          <p:nvPr/>
-        </p:nvSpPr>
-        <p:spPr>
-          <a:xfrm>
-            <a:off x="2102661" y="848437"/>
-            <a:ext cx="2425851" cy="505609"/>
-          </a:xfrm>
-          <a:prstGeom prst="flowChartAlternateProcess">
-            <a:avLst/>
-          </a:prstGeom>
-        </p:spPr>
-        <p:style>
-          <a:lnRef idx="2">
-            <a:schemeClr val="accent1">
-              <a:shade val="15000"/>
-            </a:schemeClr>
-          </a:lnRef>
-          <a:fillRef idx="1">
-            <a:schemeClr val="accent1"/>
-          </a:fillRef>
-          <a:effectRef idx="0">
-            <a:schemeClr val="accent1"/>
-          </a:effectRef>
-          <a:fontRef idx="minor">
-            <a:schemeClr val="lt1"/>
-          </a:fontRef>
-        </p:style>
-        <p:txBody>
-          <a:bodyPr rtlCol="0" anchor="ctr"/>
-          <a:lstStyle/>
-          <a:p>
-            <a:pPr algn="ctr"/>
-            <a:r>
-              <a:rPr lang="zh-CN" altLang="en-US" sz="1400" dirty="0"/>
-              <a:t>读</a:t>
-            </a:r>
-            <a:r>
-              <a:rPr lang="en-US" altLang="zh-CN" sz="1400" dirty="0"/>
-              <a:t>PREADY</a:t>
-            </a:r>
-            <a:r>
-              <a:rPr lang="zh-CN" altLang="en-US" sz="1400" dirty="0"/>
-              <a:t>和</a:t>
-            </a:r>
-            <a:r>
-              <a:rPr lang="en-US" altLang="zh-CN" sz="1400" dirty="0"/>
-              <a:t>INT_N</a:t>
-            </a:r>
-            <a:r>
-              <a:rPr lang="zh-CN" altLang="en-US" sz="1400" dirty="0"/>
-              <a:t>状态</a:t>
-            </a:r>
-          </a:p>
-        </p:txBody>
-      </p:sp>
-      <p:sp>
-        <p:nvSpPr>
-          <p:cNvPr id="4" name="流程图: 决策 3">
-            <a:extLst>
-              <a:ext uri="{FF2B5EF4-FFF2-40B4-BE49-F238E27FC236}">
-                <a16:creationId xmlns:a16="http://schemas.microsoft.com/office/drawing/2014/main" id="{45DECF20-D4FF-E911-7F67-9858F8316860}"/>
-              </a:ext>
-            </a:extLst>
-          </p:cNvPr>
-          <p:cNvSpPr/>
-          <p:nvPr/>
-        </p:nvSpPr>
-        <p:spPr>
-          <a:xfrm>
-            <a:off x="2172586" y="1789732"/>
-            <a:ext cx="2286000" cy="925157"/>
-          </a:xfrm>
-          <a:prstGeom prst="flowChartDecision">
-            <a:avLst/>
-          </a:prstGeom>
-        </p:spPr>
-        <p:style>
-          <a:lnRef idx="2">
-            <a:schemeClr val="accent1">
-              <a:shade val="15000"/>
-            </a:schemeClr>
-          </a:lnRef>
-          <a:fillRef idx="1">
-            <a:schemeClr val="accent1"/>
-          </a:fillRef>
-          <a:effectRef idx="0">
-            <a:schemeClr val="accent1"/>
-          </a:effectRef>
-          <a:fontRef idx="minor">
-            <a:schemeClr val="lt1"/>
-          </a:fontRef>
-        </p:style>
-        <p:txBody>
-          <a:bodyPr rtlCol="0" anchor="ctr"/>
-          <a:lstStyle/>
-          <a:p>
-            <a:pPr algn="ctr"/>
-            <a:r>
-              <a:rPr lang="en-US" altLang="zh-CN" sz="1400" dirty="0"/>
-              <a:t>PREADY==1 &amp;&amp;</a:t>
-            </a:r>
-          </a:p>
-          <a:p>
-            <a:pPr algn="ctr"/>
-            <a:r>
-              <a:rPr lang="en-US" altLang="zh-CN" sz="1400" dirty="0"/>
-              <a:t>INT_N ==1</a:t>
-            </a:r>
-            <a:endParaRPr lang="zh-CN" altLang="en-US" sz="1400" dirty="0"/>
-          </a:p>
-        </p:txBody>
-      </p:sp>
-      <p:sp>
-        <p:nvSpPr>
-          <p:cNvPr id="6" name="流程图: 可选过程 5">
-            <a:extLst>
-              <a:ext uri="{FF2B5EF4-FFF2-40B4-BE49-F238E27FC236}">
-                <a16:creationId xmlns:a16="http://schemas.microsoft.com/office/drawing/2014/main" id="{83CADF3B-09A8-B547-668D-4B4501C46D63}"/>
-              </a:ext>
-            </a:extLst>
-          </p:cNvPr>
-          <p:cNvSpPr/>
-          <p:nvPr/>
-        </p:nvSpPr>
-        <p:spPr>
-          <a:xfrm>
-            <a:off x="2102661" y="4640508"/>
-            <a:ext cx="2425851" cy="505609"/>
-          </a:xfrm>
-          <a:prstGeom prst="flowChartAlternateProcess">
-            <a:avLst/>
-          </a:prstGeom>
-        </p:spPr>
-        <p:style>
-          <a:lnRef idx="2">
-            <a:schemeClr val="accent1">
-              <a:shade val="15000"/>
-            </a:schemeClr>
-          </a:lnRef>
-          <a:fillRef idx="1">
-            <a:schemeClr val="accent1"/>
-          </a:fillRef>
-          <a:effectRef idx="0">
-            <a:schemeClr val="accent1"/>
-          </a:effectRef>
-          <a:fontRef idx="minor">
-            <a:schemeClr val="lt1"/>
-          </a:fontRef>
-        </p:style>
-        <p:txBody>
-          <a:bodyPr rtlCol="0" anchor="ctr"/>
-          <a:lstStyle/>
-          <a:p>
-            <a:pPr algn="ctr"/>
-            <a:r>
-              <a:rPr lang="zh-CN" altLang="en-US" sz="1400" dirty="0"/>
-              <a:t>写</a:t>
-            </a:r>
-            <a:r>
-              <a:rPr lang="en-US" altLang="zh-CN" sz="1400" dirty="0"/>
-              <a:t>TX_MSG_CTRL</a:t>
-            </a:r>
-            <a:r>
-              <a:rPr lang="zh-CN" altLang="en-US" sz="1400" dirty="0"/>
-              <a:t>发送消息</a:t>
-            </a:r>
-          </a:p>
-        </p:txBody>
-      </p:sp>
-      <p:sp>
-        <p:nvSpPr>
-          <p:cNvPr id="7" name="流程图: 可选过程 6">
-            <a:extLst>
-              <a:ext uri="{FF2B5EF4-FFF2-40B4-BE49-F238E27FC236}">
-                <a16:creationId xmlns:a16="http://schemas.microsoft.com/office/drawing/2014/main" id="{42CC5EB9-A8F4-243B-6A9C-89831F4AF5FD}"/>
-              </a:ext>
-            </a:extLst>
-          </p:cNvPr>
-          <p:cNvSpPr/>
-          <p:nvPr/>
-        </p:nvSpPr>
-        <p:spPr>
-          <a:xfrm>
-            <a:off x="6762960" y="789271"/>
-            <a:ext cx="2425851" cy="505609"/>
-          </a:xfrm>
-          <a:prstGeom prst="flowChartAlternateProcess">
-            <a:avLst/>
-          </a:prstGeom>
-        </p:spPr>
-        <p:style>
-          <a:lnRef idx="2">
-            <a:schemeClr val="accent1">
-              <a:shade val="15000"/>
-            </a:schemeClr>
-          </a:lnRef>
-          <a:fillRef idx="1">
-            <a:schemeClr val="accent1"/>
-          </a:fillRef>
-          <a:effectRef idx="0">
-            <a:schemeClr val="accent1"/>
-          </a:effectRef>
-          <a:fontRef idx="minor">
-            <a:schemeClr val="lt1"/>
-          </a:fontRef>
-        </p:style>
-        <p:txBody>
-          <a:bodyPr rtlCol="0" anchor="ctr"/>
-          <a:lstStyle/>
-          <a:p>
-            <a:pPr algn="ctr"/>
-            <a:r>
-              <a:rPr lang="zh-CN" altLang="en-US" sz="1400" dirty="0"/>
-              <a:t>读</a:t>
-            </a:r>
-            <a:r>
-              <a:rPr lang="en-US" altLang="zh-CN" sz="1400" dirty="0"/>
-              <a:t>RX_BUF Status</a:t>
-            </a:r>
-            <a:endParaRPr lang="zh-CN" altLang="en-US" sz="1400" dirty="0"/>
-          </a:p>
-        </p:txBody>
-      </p:sp>
-      <p:sp>
-        <p:nvSpPr>
-          <p:cNvPr id="8" name="流程图: 决策 7">
-            <a:extLst>
-              <a:ext uri="{FF2B5EF4-FFF2-40B4-BE49-F238E27FC236}">
-                <a16:creationId xmlns:a16="http://schemas.microsoft.com/office/drawing/2014/main" id="{C244B802-4886-CB67-CC37-FEE1C8DB3CC9}"/>
-              </a:ext>
-            </a:extLst>
-          </p:cNvPr>
-          <p:cNvSpPr/>
-          <p:nvPr/>
-        </p:nvSpPr>
-        <p:spPr>
-          <a:xfrm>
-            <a:off x="6832885" y="1703447"/>
-            <a:ext cx="2286000" cy="925157"/>
-          </a:xfrm>
-          <a:prstGeom prst="flowChartDecision">
-            <a:avLst/>
-          </a:prstGeom>
-        </p:spPr>
-        <p:style>
-          <a:lnRef idx="2">
-            <a:schemeClr val="accent1">
-              <a:shade val="15000"/>
-            </a:schemeClr>
-          </a:lnRef>
-          <a:fillRef idx="1">
-            <a:schemeClr val="accent1"/>
-          </a:fillRef>
-          <a:effectRef idx="0">
-            <a:schemeClr val="accent1"/>
-          </a:effectRef>
-          <a:fontRef idx="minor">
-            <a:schemeClr val="lt1"/>
-          </a:fontRef>
-        </p:style>
-        <p:txBody>
-          <a:bodyPr rtlCol="0" anchor="ctr"/>
-          <a:lstStyle/>
-          <a:p>
-            <a:pPr algn="ctr"/>
-            <a:r>
-              <a:rPr lang="en-US" altLang="zh-CN" sz="1400" dirty="0"/>
-              <a:t>Status != 0</a:t>
-            </a:r>
-            <a:endParaRPr lang="zh-CN" altLang="en-US" sz="1400" dirty="0"/>
-          </a:p>
-        </p:txBody>
-      </p:sp>
-      <p:sp>
-        <p:nvSpPr>
-          <p:cNvPr id="9" name="流程图: 过程 8">
-            <a:extLst>
-              <a:ext uri="{FF2B5EF4-FFF2-40B4-BE49-F238E27FC236}">
-                <a16:creationId xmlns:a16="http://schemas.microsoft.com/office/drawing/2014/main" id="{546954CC-F487-9034-4FF6-3F33655EDCD7}"/>
-              </a:ext>
-            </a:extLst>
-          </p:cNvPr>
-          <p:cNvSpPr/>
-          <p:nvPr/>
-        </p:nvSpPr>
-        <p:spPr>
-          <a:xfrm>
-            <a:off x="6762960" y="3037171"/>
-            <a:ext cx="2425851" cy="1054247"/>
-          </a:xfrm>
-          <a:prstGeom prst="flowChartProcess">
-            <a:avLst/>
-          </a:prstGeom>
-        </p:spPr>
-        <p:style>
-          <a:lnRef idx="2">
-            <a:schemeClr val="accent1">
-              <a:shade val="15000"/>
-            </a:schemeClr>
-          </a:lnRef>
-          <a:fillRef idx="1">
-            <a:schemeClr val="accent1"/>
-          </a:fillRef>
-          <a:effectRef idx="0">
-            <a:schemeClr val="accent1"/>
-          </a:effectRef>
-          <a:fontRef idx="minor">
-            <a:schemeClr val="lt1"/>
-          </a:fontRef>
-        </p:style>
-        <p:txBody>
-          <a:bodyPr rtlCol="0" anchor="ctr"/>
-          <a:lstStyle/>
-          <a:p>
-            <a:pPr algn="ctr"/>
-            <a:r>
-              <a:rPr lang="zh-CN" altLang="en-US" sz="1400" dirty="0"/>
-              <a:t>读</a:t>
-            </a:r>
-            <a:r>
-              <a:rPr lang="en-US" altLang="zh-CN" sz="1400" dirty="0"/>
-              <a:t>RX_MSG_ID</a:t>
-            </a:r>
-          </a:p>
-          <a:p>
-            <a:pPr algn="ctr"/>
-            <a:r>
-              <a:rPr lang="zh-CN" altLang="en-US" sz="1400" dirty="0"/>
-              <a:t>读</a:t>
-            </a:r>
-            <a:r>
-              <a:rPr lang="en-US" altLang="zh-CN" sz="1400" dirty="0"/>
-              <a:t>RX_MSG_WORD1</a:t>
-            </a:r>
-          </a:p>
-          <a:p>
-            <a:pPr algn="ctr"/>
-            <a:r>
-              <a:rPr lang="zh-CN" altLang="en-US" sz="1400" dirty="0"/>
-              <a:t>读</a:t>
-            </a:r>
-            <a:r>
-              <a:rPr lang="en-US" altLang="zh-CN" sz="1400" dirty="0"/>
-              <a:t>RX_MSG_WORD0</a:t>
-            </a:r>
-          </a:p>
-          <a:p>
-            <a:pPr algn="ctr"/>
-            <a:r>
-              <a:rPr lang="zh-CN" altLang="en-US" sz="1400" dirty="0"/>
-              <a:t>并和</a:t>
-            </a:r>
-            <a:r>
-              <a:rPr lang="en-US" altLang="zh-CN" sz="1400" dirty="0"/>
-              <a:t>TX_MSG</a:t>
-            </a:r>
-            <a:r>
-              <a:rPr lang="zh-CN" altLang="en-US" sz="1400" dirty="0"/>
-              <a:t>比较</a:t>
-            </a:r>
-            <a:endParaRPr lang="en-US" altLang="zh-CN" sz="1400" dirty="0"/>
-          </a:p>
-        </p:txBody>
-      </p:sp>
-      <p:sp>
-        <p:nvSpPr>
-          <p:cNvPr id="11" name="流程图: 决策 10">
-            <a:extLst>
-              <a:ext uri="{FF2B5EF4-FFF2-40B4-BE49-F238E27FC236}">
-                <a16:creationId xmlns:a16="http://schemas.microsoft.com/office/drawing/2014/main" id="{8D0A2266-EF0D-04D6-0D3B-39D274765CB7}"/>
-              </a:ext>
-            </a:extLst>
-          </p:cNvPr>
-          <p:cNvSpPr/>
-          <p:nvPr/>
-        </p:nvSpPr>
-        <p:spPr>
-          <a:xfrm>
-            <a:off x="6832885" y="4499985"/>
-            <a:ext cx="2286000" cy="925157"/>
-          </a:xfrm>
-          <a:prstGeom prst="flowChartDecision">
-            <a:avLst/>
-          </a:prstGeom>
-        </p:spPr>
-        <p:style>
-          <a:lnRef idx="2">
-            <a:schemeClr val="accent1">
-              <a:shade val="15000"/>
-            </a:schemeClr>
-          </a:lnRef>
-          <a:fillRef idx="1">
-            <a:schemeClr val="accent1"/>
-          </a:fillRef>
-          <a:effectRef idx="0">
-            <a:schemeClr val="accent1"/>
-          </a:effectRef>
-          <a:fontRef idx="minor">
-            <a:schemeClr val="lt1"/>
-          </a:fontRef>
-        </p:style>
-        <p:txBody>
-          <a:bodyPr rtlCol="0" anchor="ctr"/>
-          <a:lstStyle/>
-          <a:p>
-            <a:pPr algn="ctr"/>
-            <a:r>
-              <a:rPr lang="en-US" altLang="zh-CN" sz="1400" dirty="0"/>
-              <a:t>RX_MSG==TX_MSG</a:t>
-            </a:r>
-            <a:endParaRPr lang="zh-CN" altLang="en-US" sz="1400" dirty="0"/>
-          </a:p>
-        </p:txBody>
-      </p:sp>
-      <p:sp>
-        <p:nvSpPr>
-          <p:cNvPr id="12" name="流程图: 可选过程 11">
-            <a:extLst>
-              <a:ext uri="{FF2B5EF4-FFF2-40B4-BE49-F238E27FC236}">
-                <a16:creationId xmlns:a16="http://schemas.microsoft.com/office/drawing/2014/main" id="{6D1831DF-C970-E48B-E7E5-B6B0E216190B}"/>
-              </a:ext>
-            </a:extLst>
-          </p:cNvPr>
-          <p:cNvSpPr/>
-          <p:nvPr/>
-        </p:nvSpPr>
-        <p:spPr>
-          <a:xfrm>
-            <a:off x="7484618" y="5833710"/>
-            <a:ext cx="982535" cy="505609"/>
-          </a:xfrm>
-          <a:prstGeom prst="flowChartAlternateProcess">
-            <a:avLst/>
-          </a:prstGeom>
-        </p:spPr>
-        <p:style>
-          <a:lnRef idx="2">
-            <a:schemeClr val="accent1">
-              <a:shade val="15000"/>
-            </a:schemeClr>
-          </a:lnRef>
-          <a:fillRef idx="1">
-            <a:schemeClr val="accent1"/>
-          </a:fillRef>
-          <a:effectRef idx="0">
-            <a:schemeClr val="accent1"/>
-          </a:effectRef>
-          <a:fontRef idx="minor">
-            <a:schemeClr val="lt1"/>
-          </a:fontRef>
-        </p:style>
-        <p:txBody>
-          <a:bodyPr rtlCol="0" anchor="ctr"/>
-          <a:lstStyle/>
-          <a:p>
-            <a:pPr algn="ctr"/>
-            <a:r>
-              <a:rPr lang="zh-CN" altLang="en-US" sz="1400" dirty="0"/>
-              <a:t>测试通过</a:t>
-            </a:r>
-          </a:p>
-        </p:txBody>
-      </p:sp>
-      <p:sp>
-        <p:nvSpPr>
-          <p:cNvPr id="14" name="流程图: 可选过程 13">
-            <a:extLst>
-              <a:ext uri="{FF2B5EF4-FFF2-40B4-BE49-F238E27FC236}">
-                <a16:creationId xmlns:a16="http://schemas.microsoft.com/office/drawing/2014/main" id="{BB7D6C8C-0105-9B95-7914-667A4AF3F41F}"/>
-              </a:ext>
-            </a:extLst>
-          </p:cNvPr>
-          <p:cNvSpPr/>
-          <p:nvPr/>
-        </p:nvSpPr>
-        <p:spPr>
-          <a:xfrm>
-            <a:off x="4752620" y="1999505"/>
-            <a:ext cx="982535" cy="505609"/>
-          </a:xfrm>
-          <a:prstGeom prst="flowChartAlternateProcess">
-            <a:avLst/>
-          </a:prstGeom>
-        </p:spPr>
-        <p:style>
-          <a:lnRef idx="2">
-            <a:schemeClr val="accent1">
-              <a:shade val="15000"/>
-            </a:schemeClr>
-          </a:lnRef>
-          <a:fillRef idx="1">
-            <a:schemeClr val="accent1"/>
-          </a:fillRef>
-          <a:effectRef idx="0">
-            <a:schemeClr val="accent1"/>
-          </a:effectRef>
-          <a:fontRef idx="minor">
-            <a:schemeClr val="lt1"/>
-          </a:fontRef>
-        </p:style>
-        <p:txBody>
-          <a:bodyPr rtlCol="0" anchor="ctr"/>
-          <a:lstStyle/>
-          <a:p>
-            <a:pPr algn="ctr"/>
-            <a:r>
-              <a:rPr lang="zh-CN" altLang="en-US" sz="1400" dirty="0"/>
-              <a:t>测试失败</a:t>
-            </a:r>
-          </a:p>
-        </p:txBody>
-      </p:sp>
-      <p:sp>
-        <p:nvSpPr>
-          <p:cNvPr id="15" name="流程图: 可选过程 14">
-            <a:extLst>
-              <a:ext uri="{FF2B5EF4-FFF2-40B4-BE49-F238E27FC236}">
-                <a16:creationId xmlns:a16="http://schemas.microsoft.com/office/drawing/2014/main" id="{FBA409A6-BEE9-3D2A-E5B9-DA774CA4567C}"/>
-              </a:ext>
-            </a:extLst>
-          </p:cNvPr>
-          <p:cNvSpPr/>
-          <p:nvPr/>
-        </p:nvSpPr>
-        <p:spPr>
-          <a:xfrm>
-            <a:off x="9477921" y="4709758"/>
-            <a:ext cx="982535" cy="505609"/>
-          </a:xfrm>
-          <a:prstGeom prst="flowChartAlternateProcess">
-            <a:avLst/>
-          </a:prstGeom>
-        </p:spPr>
-        <p:style>
-          <a:lnRef idx="2">
-            <a:schemeClr val="accent1">
-              <a:shade val="15000"/>
-            </a:schemeClr>
-          </a:lnRef>
-          <a:fillRef idx="1">
-            <a:schemeClr val="accent1"/>
-          </a:fillRef>
-          <a:effectRef idx="0">
-            <a:schemeClr val="accent1"/>
-          </a:effectRef>
-          <a:fontRef idx="minor">
-            <a:schemeClr val="lt1"/>
-          </a:fontRef>
-        </p:style>
-        <p:txBody>
-          <a:bodyPr rtlCol="0" anchor="ctr"/>
-          <a:lstStyle/>
-          <a:p>
-            <a:pPr algn="ctr"/>
-            <a:r>
-              <a:rPr lang="zh-CN" altLang="en-US" sz="1400" dirty="0"/>
-              <a:t>测试失败</a:t>
-            </a:r>
-          </a:p>
-        </p:txBody>
-      </p:sp>
-      <p:sp>
-        <p:nvSpPr>
-          <p:cNvPr id="16" name="流程图: 可选过程 15">
-            <a:extLst>
-              <a:ext uri="{FF2B5EF4-FFF2-40B4-BE49-F238E27FC236}">
-                <a16:creationId xmlns:a16="http://schemas.microsoft.com/office/drawing/2014/main" id="{70EB19AE-2573-2F78-FB3A-138C9B65F0DC}"/>
-              </a:ext>
-            </a:extLst>
-          </p:cNvPr>
-          <p:cNvSpPr/>
-          <p:nvPr/>
-        </p:nvSpPr>
-        <p:spPr>
-          <a:xfrm>
-            <a:off x="9477921" y="1913220"/>
-            <a:ext cx="982535" cy="505609"/>
-          </a:xfrm>
-          <a:prstGeom prst="flowChartAlternateProcess">
-            <a:avLst/>
-          </a:prstGeom>
-        </p:spPr>
-        <p:style>
-          <a:lnRef idx="2">
-            <a:schemeClr val="accent1">
-              <a:shade val="15000"/>
-            </a:schemeClr>
-          </a:lnRef>
-          <a:fillRef idx="1">
-            <a:schemeClr val="accent1"/>
-          </a:fillRef>
-          <a:effectRef idx="0">
-            <a:schemeClr val="accent1"/>
-          </a:effectRef>
-          <a:fontRef idx="minor">
-            <a:schemeClr val="lt1"/>
-          </a:fontRef>
-        </p:style>
-        <p:txBody>
-          <a:bodyPr rtlCol="0" anchor="ctr"/>
-          <a:lstStyle/>
-          <a:p>
-            <a:pPr algn="ctr"/>
-            <a:r>
-              <a:rPr lang="zh-CN" altLang="en-US" sz="1400" dirty="0"/>
-              <a:t>测试失败</a:t>
-            </a:r>
-          </a:p>
-        </p:txBody>
-      </p:sp>
-      <p:cxnSp>
-        <p:nvCxnSpPr>
-          <p:cNvPr id="18" name="直接箭头连接符 17">
-            <a:extLst>
-              <a:ext uri="{FF2B5EF4-FFF2-40B4-BE49-F238E27FC236}">
-                <a16:creationId xmlns:a16="http://schemas.microsoft.com/office/drawing/2014/main" id="{13E746B9-B7F0-B48E-6F6E-5713A502CC22}"/>
-              </a:ext>
-            </a:extLst>
-          </p:cNvPr>
-          <p:cNvCxnSpPr>
-            <a:stCxn id="3" idx="2"/>
-            <a:endCxn id="4" idx="0"/>
-          </p:cNvCxnSpPr>
-          <p:nvPr/>
-        </p:nvCxnSpPr>
-        <p:spPr>
-          <a:xfrm flipH="1">
-            <a:off x="3315586" y="1354046"/>
-            <a:ext cx="1" cy="435686"/>
-          </a:xfrm>
-          <a:prstGeom prst="straightConnector1">
-            <a:avLst/>
-          </a:prstGeom>
-          <a:ln>
-            <a:tailEnd type="triangle"/>
-          </a:ln>
-        </p:spPr>
-        <p:style>
-          <a:lnRef idx="1">
-            <a:schemeClr val="accent1"/>
-          </a:lnRef>
-          <a:fillRef idx="0">
-            <a:schemeClr val="accent1"/>
-          </a:fillRef>
-          <a:effectRef idx="0">
-            <a:schemeClr val="accent1"/>
-          </a:effectRef>
-          <a:fontRef idx="minor">
-            <a:schemeClr val="tx1"/>
-          </a:fontRef>
-        </p:style>
-      </p:cxnSp>
-      <p:cxnSp>
-        <p:nvCxnSpPr>
-          <p:cNvPr id="22" name="直接箭头连接符 21">
-            <a:extLst>
-              <a:ext uri="{FF2B5EF4-FFF2-40B4-BE49-F238E27FC236}">
-                <a16:creationId xmlns:a16="http://schemas.microsoft.com/office/drawing/2014/main" id="{AEE7DBA9-26FF-18B0-A1EF-4241F45F5AF6}"/>
-              </a:ext>
-            </a:extLst>
-          </p:cNvPr>
-          <p:cNvCxnSpPr>
-            <a:stCxn id="4" idx="2"/>
-            <a:endCxn id="2" idx="0"/>
-          </p:cNvCxnSpPr>
-          <p:nvPr/>
-        </p:nvCxnSpPr>
-        <p:spPr>
-          <a:xfrm>
-            <a:off x="3315586" y="2714889"/>
-            <a:ext cx="1" cy="435686"/>
-          </a:xfrm>
-          <a:prstGeom prst="straightConnector1">
-            <a:avLst/>
-          </a:prstGeom>
-          <a:ln>
-            <a:tailEnd type="triangle"/>
-          </a:ln>
-        </p:spPr>
-        <p:style>
-          <a:lnRef idx="1">
-            <a:schemeClr val="accent1"/>
-          </a:lnRef>
-          <a:fillRef idx="0">
-            <a:schemeClr val="accent1"/>
-          </a:fillRef>
-          <a:effectRef idx="0">
-            <a:schemeClr val="accent1"/>
-          </a:effectRef>
-          <a:fontRef idx="minor">
-            <a:schemeClr val="tx1"/>
-          </a:fontRef>
-        </p:style>
-      </p:cxnSp>
-      <p:cxnSp>
-        <p:nvCxnSpPr>
-          <p:cNvPr id="24" name="直接箭头连接符 23">
-            <a:extLst>
-              <a:ext uri="{FF2B5EF4-FFF2-40B4-BE49-F238E27FC236}">
-                <a16:creationId xmlns:a16="http://schemas.microsoft.com/office/drawing/2014/main" id="{9E86017F-37A9-D0DA-A39C-76EAE1E4806B}"/>
-              </a:ext>
-            </a:extLst>
-          </p:cNvPr>
-          <p:cNvCxnSpPr>
-            <a:stCxn id="2" idx="2"/>
-            <a:endCxn id="6" idx="0"/>
-          </p:cNvCxnSpPr>
-          <p:nvPr/>
-        </p:nvCxnSpPr>
-        <p:spPr>
-          <a:xfrm>
-            <a:off x="3315587" y="4204823"/>
-            <a:ext cx="0" cy="435685"/>
-          </a:xfrm>
-          <a:prstGeom prst="straightConnector1">
-            <a:avLst/>
-          </a:prstGeom>
-          <a:ln>
-            <a:tailEnd type="triangle"/>
-          </a:ln>
-        </p:spPr>
-        <p:style>
-          <a:lnRef idx="1">
-            <a:schemeClr val="accent1"/>
-          </a:lnRef>
-          <a:fillRef idx="0">
-            <a:schemeClr val="accent1"/>
-          </a:fillRef>
-          <a:effectRef idx="0">
-            <a:schemeClr val="accent1"/>
-          </a:effectRef>
-          <a:fontRef idx="minor">
-            <a:schemeClr val="tx1"/>
-          </a:fontRef>
-        </p:style>
-      </p:cxnSp>
-      <p:cxnSp>
-        <p:nvCxnSpPr>
-          <p:cNvPr id="26" name="连接符: 肘形 25">
-            <a:extLst>
-              <a:ext uri="{FF2B5EF4-FFF2-40B4-BE49-F238E27FC236}">
-                <a16:creationId xmlns:a16="http://schemas.microsoft.com/office/drawing/2014/main" id="{C7CCE7A7-B160-8791-D6A7-62A8F1CA95BA}"/>
-              </a:ext>
-            </a:extLst>
-          </p:cNvPr>
-          <p:cNvCxnSpPr>
-            <a:cxnSpLocks/>
-            <a:stCxn id="6" idx="3"/>
-            <a:endCxn id="7" idx="0"/>
-          </p:cNvCxnSpPr>
-          <p:nvPr/>
-        </p:nvCxnSpPr>
-        <p:spPr>
-          <a:xfrm flipV="1">
-            <a:off x="4528512" y="789271"/>
-            <a:ext cx="3447374" cy="4104042"/>
-          </a:xfrm>
-          <a:prstGeom prst="bentConnector4">
-            <a:avLst>
-              <a:gd name="adj1" fmla="val 42751"/>
-              <a:gd name="adj2" fmla="val 105570"/>
-            </a:avLst>
-          </a:prstGeom>
-          <a:ln>
-            <a:tailEnd type="triangle"/>
-          </a:ln>
-        </p:spPr>
-        <p:style>
-          <a:lnRef idx="1">
-            <a:schemeClr val="accent1"/>
-          </a:lnRef>
-          <a:fillRef idx="0">
-            <a:schemeClr val="accent1"/>
-          </a:fillRef>
-          <a:effectRef idx="0">
-            <a:schemeClr val="accent1"/>
-          </a:effectRef>
-          <a:fontRef idx="minor">
-            <a:schemeClr val="tx1"/>
-          </a:fontRef>
-        </p:style>
-      </p:cxnSp>
-      <p:cxnSp>
-        <p:nvCxnSpPr>
-          <p:cNvPr id="35" name="直接箭头连接符 34">
-            <a:extLst>
-              <a:ext uri="{FF2B5EF4-FFF2-40B4-BE49-F238E27FC236}">
-                <a16:creationId xmlns:a16="http://schemas.microsoft.com/office/drawing/2014/main" id="{E1D6AC2C-30D4-2839-EEB4-4FDED941C024}"/>
-              </a:ext>
-            </a:extLst>
-          </p:cNvPr>
-          <p:cNvCxnSpPr>
-            <a:stCxn id="4" idx="3"/>
-            <a:endCxn id="14" idx="1"/>
-          </p:cNvCxnSpPr>
-          <p:nvPr/>
-        </p:nvCxnSpPr>
-        <p:spPr>
-          <a:xfrm flipV="1">
-            <a:off x="4458586" y="2252310"/>
-            <a:ext cx="294034" cy="1"/>
-          </a:xfrm>
-          <a:prstGeom prst="straightConnector1">
-            <a:avLst/>
-          </a:prstGeom>
-          <a:ln>
-            <a:tailEnd type="triangle"/>
-          </a:ln>
-        </p:spPr>
-        <p:style>
-          <a:lnRef idx="1">
-            <a:schemeClr val="accent1"/>
-          </a:lnRef>
-          <a:fillRef idx="0">
-            <a:schemeClr val="accent1"/>
-          </a:fillRef>
-          <a:effectRef idx="0">
-            <a:schemeClr val="accent1"/>
-          </a:effectRef>
-          <a:fontRef idx="minor">
-            <a:schemeClr val="tx1"/>
-          </a:fontRef>
-        </p:style>
-      </p:cxnSp>
-      <p:sp>
-        <p:nvSpPr>
-          <p:cNvPr id="37" name="文本框 36">
-            <a:extLst>
-              <a:ext uri="{FF2B5EF4-FFF2-40B4-BE49-F238E27FC236}">
-                <a16:creationId xmlns:a16="http://schemas.microsoft.com/office/drawing/2014/main" id="{361852C4-8D9E-C88F-DBAA-5039F69DD6DE}"/>
-              </a:ext>
-            </a:extLst>
-          </p:cNvPr>
-          <p:cNvSpPr txBox="1"/>
-          <p:nvPr/>
-        </p:nvSpPr>
-        <p:spPr>
-          <a:xfrm>
-            <a:off x="586815" y="1466566"/>
-            <a:ext cx="1183337" cy="646331"/>
-          </a:xfrm>
-          <a:prstGeom prst="rect">
-            <a:avLst/>
-          </a:prstGeom>
-          <a:noFill/>
-        </p:spPr>
-        <p:txBody>
-          <a:bodyPr wrap="none" rtlCol="0">
-            <a:spAutoFit/>
-          </a:bodyPr>
-          <a:lstStyle/>
-          <a:p>
-            <a:r>
-              <a:rPr lang="en-US" altLang="zh-CN" dirty="0"/>
-              <a:t>4-Iters:</a:t>
-            </a:r>
-          </a:p>
-          <a:p>
-            <a:r>
-              <a:rPr lang="en-US" altLang="zh-CN" dirty="0"/>
-              <a:t>CAN[1…4]</a:t>
-            </a:r>
-            <a:endParaRPr lang="zh-CN" altLang="en-US" dirty="0"/>
-          </a:p>
-        </p:txBody>
-      </p:sp>
-      <p:sp>
-        <p:nvSpPr>
-          <p:cNvPr id="38" name="左大括号 37">
-            <a:extLst>
-              <a:ext uri="{FF2B5EF4-FFF2-40B4-BE49-F238E27FC236}">
-                <a16:creationId xmlns:a16="http://schemas.microsoft.com/office/drawing/2014/main" id="{17DBD6DE-BF8B-A33A-6E79-E335B35FB462}"/>
-              </a:ext>
-            </a:extLst>
-          </p:cNvPr>
-          <p:cNvSpPr/>
-          <p:nvPr/>
-        </p:nvSpPr>
-        <p:spPr>
-          <a:xfrm>
-            <a:off x="1403808" y="870849"/>
-            <a:ext cx="572616" cy="1844040"/>
-          </a:xfrm>
-          <a:prstGeom prst="leftBrace">
-            <a:avLst/>
-          </a:prstGeom>
-        </p:spPr>
-        <p:style>
-          <a:lnRef idx="1">
-            <a:schemeClr val="accent1"/>
-          </a:lnRef>
-          <a:fillRef idx="0">
-            <a:schemeClr val="accent1"/>
-          </a:fillRef>
-          <a:effectRef idx="0">
-            <a:schemeClr val="accent1"/>
-          </a:effectRef>
-          <a:fontRef idx="minor">
-            <a:schemeClr val="tx1"/>
-          </a:fontRef>
-        </p:style>
-        <p:txBody>
-          <a:bodyPr rtlCol="0" anchor="ctr"/>
-          <a:lstStyle/>
-          <a:p>
-            <a:pPr algn="ctr"/>
-            <a:endParaRPr lang="zh-CN" altLang="en-US"/>
-          </a:p>
-        </p:txBody>
-      </p:sp>
-      <p:sp>
-        <p:nvSpPr>
-          <p:cNvPr id="39" name="左大括号 38">
-            <a:extLst>
-              <a:ext uri="{FF2B5EF4-FFF2-40B4-BE49-F238E27FC236}">
-                <a16:creationId xmlns:a16="http://schemas.microsoft.com/office/drawing/2014/main" id="{AACCFB20-3CC0-A5F5-CEAA-B4C8A5EB691D}"/>
-              </a:ext>
-            </a:extLst>
-          </p:cNvPr>
-          <p:cNvSpPr/>
-          <p:nvPr/>
-        </p:nvSpPr>
-        <p:spPr>
-          <a:xfrm>
-            <a:off x="1403808" y="3086105"/>
-            <a:ext cx="572616" cy="1183187"/>
-          </a:xfrm>
-          <a:prstGeom prst="leftBrace">
-            <a:avLst/>
-          </a:prstGeom>
-        </p:spPr>
-        <p:style>
-          <a:lnRef idx="1">
-            <a:schemeClr val="accent1"/>
-          </a:lnRef>
-          <a:fillRef idx="0">
-            <a:schemeClr val="accent1"/>
-          </a:fillRef>
-          <a:effectRef idx="0">
-            <a:schemeClr val="accent1"/>
-          </a:effectRef>
-          <a:fontRef idx="minor">
-            <a:schemeClr val="tx1"/>
-          </a:fontRef>
-        </p:style>
-        <p:txBody>
-          <a:bodyPr rtlCol="0" anchor="ctr"/>
-          <a:lstStyle/>
-          <a:p>
-            <a:pPr algn="ctr"/>
-            <a:endParaRPr lang="zh-CN" altLang="en-US"/>
-          </a:p>
-        </p:txBody>
-      </p:sp>
-      <p:sp>
-        <p:nvSpPr>
-          <p:cNvPr id="42" name="文本框 41">
-            <a:extLst>
-              <a:ext uri="{FF2B5EF4-FFF2-40B4-BE49-F238E27FC236}">
-                <a16:creationId xmlns:a16="http://schemas.microsoft.com/office/drawing/2014/main" id="{1DEC62CB-F693-9F33-BE12-084ED5755AF9}"/>
-              </a:ext>
-            </a:extLst>
-          </p:cNvPr>
-          <p:cNvSpPr txBox="1"/>
-          <p:nvPr/>
-        </p:nvSpPr>
-        <p:spPr>
-          <a:xfrm>
-            <a:off x="755933" y="3335241"/>
-            <a:ext cx="845103" cy="369332"/>
-          </a:xfrm>
-          <a:prstGeom prst="rect">
-            <a:avLst/>
-          </a:prstGeom>
-          <a:noFill/>
-        </p:spPr>
-        <p:txBody>
-          <a:bodyPr wrap="none" rtlCol="0">
-            <a:spAutoFit/>
-          </a:bodyPr>
-          <a:lstStyle/>
-          <a:p>
-            <a:r>
-              <a:rPr lang="en-US" altLang="zh-CN" dirty="0"/>
-              <a:t>4-Iters</a:t>
-            </a:r>
-          </a:p>
-        </p:txBody>
-      </p:sp>
-      <p:sp>
-        <p:nvSpPr>
-          <p:cNvPr id="43" name="左大括号 42">
-            <a:extLst>
-              <a:ext uri="{FF2B5EF4-FFF2-40B4-BE49-F238E27FC236}">
-                <a16:creationId xmlns:a16="http://schemas.microsoft.com/office/drawing/2014/main" id="{C9257AB1-AAD6-607A-9164-74C5C9C728D9}"/>
-              </a:ext>
-            </a:extLst>
-          </p:cNvPr>
-          <p:cNvSpPr/>
-          <p:nvPr/>
-        </p:nvSpPr>
-        <p:spPr>
-          <a:xfrm>
-            <a:off x="1403808" y="4623774"/>
-            <a:ext cx="572616" cy="522344"/>
-          </a:xfrm>
-          <a:prstGeom prst="leftBrace">
-            <a:avLst/>
-          </a:prstGeom>
-        </p:spPr>
-        <p:style>
-          <a:lnRef idx="1">
-            <a:schemeClr val="accent1"/>
-          </a:lnRef>
-          <a:fillRef idx="0">
-            <a:schemeClr val="accent1"/>
-          </a:fillRef>
-          <a:effectRef idx="0">
-            <a:schemeClr val="accent1"/>
-          </a:effectRef>
-          <a:fontRef idx="minor">
-            <a:schemeClr val="tx1"/>
-          </a:fontRef>
-        </p:style>
-        <p:txBody>
-          <a:bodyPr rtlCol="0" anchor="ctr"/>
-          <a:lstStyle/>
-          <a:p>
-            <a:pPr algn="ctr"/>
-            <a:endParaRPr lang="zh-CN" altLang="en-US"/>
-          </a:p>
-        </p:txBody>
-      </p:sp>
-      <p:sp>
-        <p:nvSpPr>
-          <p:cNvPr id="44" name="文本框 43">
-            <a:extLst>
-              <a:ext uri="{FF2B5EF4-FFF2-40B4-BE49-F238E27FC236}">
-                <a16:creationId xmlns:a16="http://schemas.microsoft.com/office/drawing/2014/main" id="{FAFBC812-8E16-9E0A-21BA-171B50647569}"/>
-              </a:ext>
-            </a:extLst>
-          </p:cNvPr>
-          <p:cNvSpPr txBox="1"/>
-          <p:nvPr/>
-        </p:nvSpPr>
-        <p:spPr>
-          <a:xfrm>
-            <a:off x="845013" y="4526709"/>
-            <a:ext cx="845103" cy="369332"/>
-          </a:xfrm>
-          <a:prstGeom prst="rect">
-            <a:avLst/>
-          </a:prstGeom>
-          <a:noFill/>
-        </p:spPr>
-        <p:txBody>
-          <a:bodyPr wrap="none" rtlCol="0">
-            <a:spAutoFit/>
-          </a:bodyPr>
-          <a:lstStyle/>
-          <a:p>
-            <a:r>
-              <a:rPr lang="en-US" altLang="zh-CN" dirty="0"/>
-              <a:t>4-Iters</a:t>
-            </a:r>
-          </a:p>
-        </p:txBody>
-      </p:sp>
-      <p:cxnSp>
-        <p:nvCxnSpPr>
-          <p:cNvPr id="46" name="直接箭头连接符 45">
-            <a:extLst>
-              <a:ext uri="{FF2B5EF4-FFF2-40B4-BE49-F238E27FC236}">
-                <a16:creationId xmlns:a16="http://schemas.microsoft.com/office/drawing/2014/main" id="{B9733E5B-EA7B-EE47-4640-80A9B045C495}"/>
-              </a:ext>
-            </a:extLst>
-          </p:cNvPr>
-          <p:cNvCxnSpPr>
-            <a:stCxn id="7" idx="2"/>
-            <a:endCxn id="8" idx="0"/>
-          </p:cNvCxnSpPr>
-          <p:nvPr/>
-        </p:nvCxnSpPr>
-        <p:spPr>
-          <a:xfrm flipH="1">
-            <a:off x="7975885" y="1294880"/>
-            <a:ext cx="1" cy="408567"/>
-          </a:xfrm>
-          <a:prstGeom prst="straightConnector1">
-            <a:avLst/>
-          </a:prstGeom>
-          <a:ln>
-            <a:tailEnd type="triangle"/>
-          </a:ln>
-        </p:spPr>
-        <p:style>
-          <a:lnRef idx="1">
-            <a:schemeClr val="accent1"/>
-          </a:lnRef>
-          <a:fillRef idx="0">
-            <a:schemeClr val="accent1"/>
-          </a:fillRef>
-          <a:effectRef idx="0">
-            <a:schemeClr val="accent1"/>
-          </a:effectRef>
-          <a:fontRef idx="minor">
-            <a:schemeClr val="tx1"/>
-          </a:fontRef>
-        </p:style>
-      </p:cxnSp>
-      <p:cxnSp>
-        <p:nvCxnSpPr>
-          <p:cNvPr id="48" name="直接箭头连接符 47">
-            <a:extLst>
-              <a:ext uri="{FF2B5EF4-FFF2-40B4-BE49-F238E27FC236}">
-                <a16:creationId xmlns:a16="http://schemas.microsoft.com/office/drawing/2014/main" id="{FA9208A4-3C9A-2A15-449E-4B2CEF3D387F}"/>
-              </a:ext>
-            </a:extLst>
-          </p:cNvPr>
-          <p:cNvCxnSpPr>
-            <a:stCxn id="8" idx="2"/>
-            <a:endCxn id="9" idx="0"/>
-          </p:cNvCxnSpPr>
-          <p:nvPr/>
-        </p:nvCxnSpPr>
-        <p:spPr>
-          <a:xfrm>
-            <a:off x="7975885" y="2628604"/>
-            <a:ext cx="1" cy="408567"/>
-          </a:xfrm>
-          <a:prstGeom prst="straightConnector1">
-            <a:avLst/>
-          </a:prstGeom>
-          <a:ln>
-            <a:tailEnd type="triangle"/>
-          </a:ln>
-        </p:spPr>
-        <p:style>
-          <a:lnRef idx="1">
-            <a:schemeClr val="accent1"/>
-          </a:lnRef>
-          <a:fillRef idx="0">
-            <a:schemeClr val="accent1"/>
-          </a:fillRef>
-          <a:effectRef idx="0">
-            <a:schemeClr val="accent1"/>
-          </a:effectRef>
-          <a:fontRef idx="minor">
-            <a:schemeClr val="tx1"/>
-          </a:fontRef>
-        </p:style>
-      </p:cxnSp>
-      <p:cxnSp>
-        <p:nvCxnSpPr>
-          <p:cNvPr id="50" name="直接箭头连接符 49">
-            <a:extLst>
-              <a:ext uri="{FF2B5EF4-FFF2-40B4-BE49-F238E27FC236}">
-                <a16:creationId xmlns:a16="http://schemas.microsoft.com/office/drawing/2014/main" id="{B83B7D89-2D6B-FD0B-EF89-280BA952710A}"/>
-              </a:ext>
-            </a:extLst>
-          </p:cNvPr>
-          <p:cNvCxnSpPr>
-            <a:stCxn id="9" idx="2"/>
-            <a:endCxn id="11" idx="0"/>
-          </p:cNvCxnSpPr>
-          <p:nvPr/>
-        </p:nvCxnSpPr>
-        <p:spPr>
-          <a:xfrm flipH="1">
-            <a:off x="7975885" y="4091418"/>
-            <a:ext cx="1" cy="408567"/>
-          </a:xfrm>
-          <a:prstGeom prst="straightConnector1">
-            <a:avLst/>
-          </a:prstGeom>
-          <a:ln>
-            <a:tailEnd type="triangle"/>
-          </a:ln>
-        </p:spPr>
-        <p:style>
-          <a:lnRef idx="1">
-            <a:schemeClr val="accent1"/>
-          </a:lnRef>
-          <a:fillRef idx="0">
-            <a:schemeClr val="accent1"/>
-          </a:fillRef>
-          <a:effectRef idx="0">
-            <a:schemeClr val="accent1"/>
-          </a:effectRef>
-          <a:fontRef idx="minor">
-            <a:schemeClr val="tx1"/>
-          </a:fontRef>
-        </p:style>
-      </p:cxnSp>
-      <p:cxnSp>
-        <p:nvCxnSpPr>
-          <p:cNvPr id="52" name="直接箭头连接符 51">
-            <a:extLst>
-              <a:ext uri="{FF2B5EF4-FFF2-40B4-BE49-F238E27FC236}">
-                <a16:creationId xmlns:a16="http://schemas.microsoft.com/office/drawing/2014/main" id="{0A6E8ED0-E63F-8BB3-8187-BEA37483319C}"/>
-              </a:ext>
-            </a:extLst>
-          </p:cNvPr>
-          <p:cNvCxnSpPr>
-            <a:stCxn id="11" idx="2"/>
-            <a:endCxn id="12" idx="0"/>
-          </p:cNvCxnSpPr>
-          <p:nvPr/>
-        </p:nvCxnSpPr>
-        <p:spPr>
-          <a:xfrm>
-            <a:off x="7975885" y="5425142"/>
-            <a:ext cx="1" cy="408568"/>
-          </a:xfrm>
-          <a:prstGeom prst="straightConnector1">
-            <a:avLst/>
-          </a:prstGeom>
-          <a:ln>
-            <a:tailEnd type="triangle"/>
-          </a:ln>
-        </p:spPr>
-        <p:style>
-          <a:lnRef idx="1">
-            <a:schemeClr val="accent1"/>
-          </a:lnRef>
-          <a:fillRef idx="0">
-            <a:schemeClr val="accent1"/>
-          </a:fillRef>
-          <a:effectRef idx="0">
-            <a:schemeClr val="accent1"/>
-          </a:effectRef>
-          <a:fontRef idx="minor">
-            <a:schemeClr val="tx1"/>
-          </a:fontRef>
-        </p:style>
-      </p:cxnSp>
-      <p:cxnSp>
-        <p:nvCxnSpPr>
-          <p:cNvPr id="54" name="直接箭头连接符 53">
-            <a:extLst>
-              <a:ext uri="{FF2B5EF4-FFF2-40B4-BE49-F238E27FC236}">
-                <a16:creationId xmlns:a16="http://schemas.microsoft.com/office/drawing/2014/main" id="{335E9F48-8385-65A5-89B8-72B5547A6EE0}"/>
-              </a:ext>
-            </a:extLst>
-          </p:cNvPr>
-          <p:cNvCxnSpPr>
-            <a:stCxn id="8" idx="3"/>
-            <a:endCxn id="16" idx="1"/>
-          </p:cNvCxnSpPr>
-          <p:nvPr/>
-        </p:nvCxnSpPr>
-        <p:spPr>
-          <a:xfrm flipV="1">
-            <a:off x="9118885" y="2166025"/>
-            <a:ext cx="359036" cy="1"/>
-          </a:xfrm>
-          <a:prstGeom prst="straightConnector1">
-            <a:avLst/>
-          </a:prstGeom>
-          <a:ln>
-            <a:tailEnd type="triangle"/>
-          </a:ln>
-        </p:spPr>
-        <p:style>
-          <a:lnRef idx="1">
-            <a:schemeClr val="accent1"/>
-          </a:lnRef>
-          <a:fillRef idx="0">
-            <a:schemeClr val="accent1"/>
-          </a:fillRef>
-          <a:effectRef idx="0">
-            <a:schemeClr val="accent1"/>
-          </a:effectRef>
-          <a:fontRef idx="minor">
-            <a:schemeClr val="tx1"/>
-          </a:fontRef>
-        </p:style>
-      </p:cxnSp>
-      <p:cxnSp>
-        <p:nvCxnSpPr>
-          <p:cNvPr id="56" name="直接箭头连接符 55">
-            <a:extLst>
-              <a:ext uri="{FF2B5EF4-FFF2-40B4-BE49-F238E27FC236}">
-                <a16:creationId xmlns:a16="http://schemas.microsoft.com/office/drawing/2014/main" id="{E1EBD58A-C64A-90FB-8E10-D7103BFC3541}"/>
-              </a:ext>
-            </a:extLst>
-          </p:cNvPr>
-          <p:cNvCxnSpPr>
-            <a:stCxn id="11" idx="3"/>
-            <a:endCxn id="15" idx="1"/>
-          </p:cNvCxnSpPr>
-          <p:nvPr/>
-        </p:nvCxnSpPr>
-        <p:spPr>
-          <a:xfrm flipV="1">
-            <a:off x="9118885" y="4962563"/>
-            <a:ext cx="359036" cy="1"/>
-          </a:xfrm>
-          <a:prstGeom prst="straightConnector1">
-            <a:avLst/>
-          </a:prstGeom>
-          <a:ln>
-            <a:tailEnd type="triangle"/>
-          </a:ln>
-        </p:spPr>
-        <p:style>
-          <a:lnRef idx="1">
-            <a:schemeClr val="accent1"/>
-          </a:lnRef>
-          <a:fillRef idx="0">
-            <a:schemeClr val="accent1"/>
-          </a:fillRef>
-          <a:effectRef idx="0">
-            <a:schemeClr val="accent1"/>
-          </a:effectRef>
-          <a:fontRef idx="minor">
-            <a:schemeClr val="tx1"/>
-          </a:fontRef>
-        </p:style>
-      </p:cxnSp>
-      <p:sp>
-        <p:nvSpPr>
-          <p:cNvPr id="58" name="文本框 57">
-            <a:extLst>
-              <a:ext uri="{FF2B5EF4-FFF2-40B4-BE49-F238E27FC236}">
-                <a16:creationId xmlns:a16="http://schemas.microsoft.com/office/drawing/2014/main" id="{DEED5D08-8CAB-D372-EA6D-D1819A552DC5}"/>
-              </a:ext>
-            </a:extLst>
-          </p:cNvPr>
-          <p:cNvSpPr txBox="1"/>
-          <p:nvPr/>
-        </p:nvSpPr>
-        <p:spPr>
-          <a:xfrm>
-            <a:off x="3315586" y="2761398"/>
-            <a:ext cx="359264" cy="307777"/>
-          </a:xfrm>
-          <a:prstGeom prst="rect">
-            <a:avLst/>
-          </a:prstGeom>
-          <a:noFill/>
-        </p:spPr>
-        <p:txBody>
-          <a:bodyPr wrap="square" rtlCol="0">
-            <a:spAutoFit/>
-          </a:bodyPr>
-          <a:lstStyle/>
-          <a:p>
-            <a:r>
-              <a:rPr lang="en-US" altLang="zh-CN" sz="1400" dirty="0"/>
-              <a:t>Y</a:t>
-            </a:r>
-            <a:endParaRPr lang="zh-CN" altLang="en-US" dirty="0"/>
-          </a:p>
-        </p:txBody>
-      </p:sp>
-      <p:sp>
-        <p:nvSpPr>
-          <p:cNvPr id="59" name="文本框 58">
-            <a:extLst>
-              <a:ext uri="{FF2B5EF4-FFF2-40B4-BE49-F238E27FC236}">
-                <a16:creationId xmlns:a16="http://schemas.microsoft.com/office/drawing/2014/main" id="{7B8B8121-EE31-E76F-9061-105D4CA5D3DD}"/>
-              </a:ext>
-            </a:extLst>
-          </p:cNvPr>
-          <p:cNvSpPr txBox="1"/>
-          <p:nvPr/>
-        </p:nvSpPr>
-        <p:spPr>
-          <a:xfrm>
-            <a:off x="8008489" y="2624955"/>
-            <a:ext cx="359264" cy="307777"/>
-          </a:xfrm>
-          <a:prstGeom prst="rect">
-            <a:avLst/>
-          </a:prstGeom>
-          <a:noFill/>
-        </p:spPr>
-        <p:txBody>
-          <a:bodyPr wrap="square" rtlCol="0">
-            <a:spAutoFit/>
-          </a:bodyPr>
-          <a:lstStyle/>
-          <a:p>
-            <a:r>
-              <a:rPr lang="en-US" altLang="zh-CN" sz="1400" dirty="0"/>
-              <a:t>Y</a:t>
-            </a:r>
-            <a:endParaRPr lang="zh-CN" altLang="en-US" dirty="0"/>
-          </a:p>
-        </p:txBody>
-      </p:sp>
-      <p:sp>
-        <p:nvSpPr>
-          <p:cNvPr id="60" name="文本框 59">
-            <a:extLst>
-              <a:ext uri="{FF2B5EF4-FFF2-40B4-BE49-F238E27FC236}">
-                <a16:creationId xmlns:a16="http://schemas.microsoft.com/office/drawing/2014/main" id="{0872026A-D90E-1ECA-E3B3-845EADF5E900}"/>
-              </a:ext>
-            </a:extLst>
-          </p:cNvPr>
-          <p:cNvSpPr txBox="1"/>
-          <p:nvPr/>
-        </p:nvSpPr>
-        <p:spPr>
-          <a:xfrm>
-            <a:off x="7975885" y="5467884"/>
-            <a:ext cx="359264" cy="307777"/>
-          </a:xfrm>
-          <a:prstGeom prst="rect">
-            <a:avLst/>
-          </a:prstGeom>
-          <a:noFill/>
-        </p:spPr>
-        <p:txBody>
-          <a:bodyPr wrap="square" rtlCol="0">
-            <a:spAutoFit/>
-          </a:bodyPr>
-          <a:lstStyle/>
-          <a:p>
-            <a:r>
-              <a:rPr lang="en-US" altLang="zh-CN" sz="1400" dirty="0"/>
-              <a:t>Y</a:t>
-            </a:r>
-            <a:endParaRPr lang="zh-CN" altLang="en-US" dirty="0"/>
-          </a:p>
-        </p:txBody>
-      </p:sp>
-      <p:sp>
-        <p:nvSpPr>
-          <p:cNvPr id="61" name="右大括号 60">
-            <a:extLst>
-              <a:ext uri="{FF2B5EF4-FFF2-40B4-BE49-F238E27FC236}">
-                <a16:creationId xmlns:a16="http://schemas.microsoft.com/office/drawing/2014/main" id="{84D560B0-0826-FD06-CED4-97AA790B2910}"/>
-              </a:ext>
-            </a:extLst>
-          </p:cNvPr>
-          <p:cNvSpPr/>
-          <p:nvPr/>
-        </p:nvSpPr>
-        <p:spPr>
-          <a:xfrm>
-            <a:off x="10547235" y="586599"/>
-            <a:ext cx="316295" cy="5503653"/>
-          </a:xfrm>
-          <a:prstGeom prst="rightBrace">
-            <a:avLst>
-              <a:gd name="adj1" fmla="val 8333"/>
-              <a:gd name="adj2" fmla="val 50105"/>
-            </a:avLst>
-          </a:prstGeom>
-        </p:spPr>
-        <p:style>
-          <a:lnRef idx="1">
-            <a:schemeClr val="accent1"/>
-          </a:lnRef>
-          <a:fillRef idx="0">
-            <a:schemeClr val="accent1"/>
-          </a:fillRef>
-          <a:effectRef idx="0">
-            <a:schemeClr val="accent1"/>
-          </a:effectRef>
-          <a:fontRef idx="minor">
-            <a:schemeClr val="tx1"/>
-          </a:fontRef>
-        </p:style>
-        <p:txBody>
-          <a:bodyPr rtlCol="0" anchor="ctr"/>
-          <a:lstStyle/>
-          <a:p>
-            <a:pPr algn="ctr"/>
-            <a:endParaRPr lang="zh-CN" altLang="en-US"/>
-          </a:p>
-        </p:txBody>
-      </p:sp>
-      <p:sp>
-        <p:nvSpPr>
-          <p:cNvPr id="62" name="文本框 61">
-            <a:extLst>
-              <a:ext uri="{FF2B5EF4-FFF2-40B4-BE49-F238E27FC236}">
-                <a16:creationId xmlns:a16="http://schemas.microsoft.com/office/drawing/2014/main" id="{8358B385-10B2-1BEA-9817-F55AA905BE34}"/>
-              </a:ext>
-            </a:extLst>
-          </p:cNvPr>
-          <p:cNvSpPr txBox="1"/>
-          <p:nvPr/>
-        </p:nvSpPr>
-        <p:spPr>
-          <a:xfrm>
-            <a:off x="10705382" y="2965909"/>
-            <a:ext cx="845103" cy="369332"/>
-          </a:xfrm>
-          <a:prstGeom prst="rect">
-            <a:avLst/>
-          </a:prstGeom>
-          <a:noFill/>
-        </p:spPr>
-        <p:txBody>
-          <a:bodyPr wrap="none" rtlCol="0">
-            <a:spAutoFit/>
-          </a:bodyPr>
-          <a:lstStyle/>
-          <a:p>
-            <a:r>
-              <a:rPr lang="en-US" altLang="zh-CN" dirty="0"/>
-              <a:t>4-Iters</a:t>
-            </a:r>
-          </a:p>
-        </p:txBody>
-      </p:sp>
+        </p:grpSpPr>
+        <p:sp>
+          <p:nvSpPr>
+            <p:cNvPr id="2" name="流程图: 过程 1">
+              <a:extLst>
+                <a:ext uri="{FF2B5EF4-FFF2-40B4-BE49-F238E27FC236}">
+                  <a16:creationId xmlns:a16="http://schemas.microsoft.com/office/drawing/2014/main" id="{56FD0539-1DED-E9EC-7C93-5C2CFCD5B93C}"/>
+                </a:ext>
+              </a:extLst>
+            </p:cNvPr>
+            <p:cNvSpPr/>
+            <p:nvPr/>
+          </p:nvSpPr>
+          <p:spPr>
+            <a:xfrm>
+              <a:off x="2102661" y="3150575"/>
+              <a:ext cx="2425851" cy="1054248"/>
+            </a:xfrm>
+            <a:prstGeom prst="flowChartProcess">
+              <a:avLst/>
+            </a:prstGeom>
+          </p:spPr>
+          <p:style>
+            <a:lnRef idx="2">
+              <a:schemeClr val="accent1">
+                <a:shade val="15000"/>
+              </a:schemeClr>
+            </a:lnRef>
+            <a:fillRef idx="1">
+              <a:schemeClr val="accent1"/>
+            </a:fillRef>
+            <a:effectRef idx="0">
+              <a:schemeClr val="accent1"/>
+            </a:effectRef>
+            <a:fontRef idx="minor">
+              <a:schemeClr val="lt1"/>
+            </a:fontRef>
+          </p:style>
+          <p:txBody>
+            <a:bodyPr rtlCol="0" anchor="ctr"/>
+            <a:lstStyle/>
+            <a:p>
+              <a:pPr algn="ctr"/>
+              <a:r>
+                <a:rPr lang="en-US" altLang="zh-CN" sz="1400" dirty="0"/>
+                <a:t>CORECAN</a:t>
+              </a:r>
+              <a:r>
+                <a:rPr lang="zh-CN" altLang="en-US" sz="1400" dirty="0"/>
+                <a:t>寄存器初始化配置</a:t>
+              </a:r>
+              <a:endParaRPr lang="en-US" altLang="zh-CN" sz="1400" dirty="0"/>
+            </a:p>
+            <a:p>
+              <a:pPr algn="ctr"/>
+              <a:r>
+                <a:rPr lang="zh-CN" altLang="en-US" sz="1400" dirty="0"/>
+                <a:t>包括：</a:t>
+              </a:r>
+              <a:r>
+                <a:rPr lang="en-US" altLang="zh-CN" sz="1400" dirty="0"/>
+                <a:t>INT ENA, CMD, CONFIG, TX_MSG ID, TX_MSG WORD, AMR, ACR…</a:t>
+              </a:r>
+              <a:endParaRPr lang="zh-CN" altLang="en-US" sz="1400" dirty="0"/>
+            </a:p>
+          </p:txBody>
+        </p:sp>
+        <p:sp>
+          <p:nvSpPr>
+            <p:cNvPr id="3" name="流程图: 可选过程 2">
+              <a:extLst>
+                <a:ext uri="{FF2B5EF4-FFF2-40B4-BE49-F238E27FC236}">
+                  <a16:creationId xmlns:a16="http://schemas.microsoft.com/office/drawing/2014/main" id="{0783D700-1587-863F-E4C8-E9B368D758D2}"/>
+                </a:ext>
+              </a:extLst>
+            </p:cNvPr>
+            <p:cNvSpPr/>
+            <p:nvPr/>
+          </p:nvSpPr>
+          <p:spPr>
+            <a:xfrm>
+              <a:off x="2102661" y="848437"/>
+              <a:ext cx="2425851" cy="505609"/>
+            </a:xfrm>
+            <a:prstGeom prst="flowChartAlternateProcess">
+              <a:avLst/>
+            </a:prstGeom>
+          </p:spPr>
+          <p:style>
+            <a:lnRef idx="2">
+              <a:schemeClr val="accent1">
+                <a:shade val="15000"/>
+              </a:schemeClr>
+            </a:lnRef>
+            <a:fillRef idx="1">
+              <a:schemeClr val="accent1"/>
+            </a:fillRef>
+            <a:effectRef idx="0">
+              <a:schemeClr val="accent1"/>
+            </a:effectRef>
+            <a:fontRef idx="minor">
+              <a:schemeClr val="lt1"/>
+            </a:fontRef>
+          </p:style>
+          <p:txBody>
+            <a:bodyPr rtlCol="0" anchor="ctr"/>
+            <a:lstStyle/>
+            <a:p>
+              <a:pPr algn="ctr"/>
+              <a:r>
+                <a:rPr lang="zh-CN" altLang="en-US" sz="1400" dirty="0"/>
+                <a:t>读</a:t>
+              </a:r>
+              <a:r>
+                <a:rPr lang="en-US" altLang="zh-CN" sz="1400" dirty="0"/>
+                <a:t>PREADY</a:t>
+              </a:r>
+              <a:r>
+                <a:rPr lang="zh-CN" altLang="en-US" sz="1400" dirty="0"/>
+                <a:t>和</a:t>
+              </a:r>
+              <a:r>
+                <a:rPr lang="en-US" altLang="zh-CN" sz="1400" dirty="0"/>
+                <a:t>INT_N</a:t>
+              </a:r>
+              <a:r>
+                <a:rPr lang="zh-CN" altLang="en-US" sz="1400" dirty="0"/>
+                <a:t>状态</a:t>
+              </a:r>
+            </a:p>
+          </p:txBody>
+        </p:sp>
+        <p:sp>
+          <p:nvSpPr>
+            <p:cNvPr id="4" name="流程图: 决策 3">
+              <a:extLst>
+                <a:ext uri="{FF2B5EF4-FFF2-40B4-BE49-F238E27FC236}">
+                  <a16:creationId xmlns:a16="http://schemas.microsoft.com/office/drawing/2014/main" id="{45DECF20-D4FF-E911-7F67-9858F8316860}"/>
+                </a:ext>
+              </a:extLst>
+            </p:cNvPr>
+            <p:cNvSpPr/>
+            <p:nvPr/>
+          </p:nvSpPr>
+          <p:spPr>
+            <a:xfrm>
+              <a:off x="2172586" y="1789732"/>
+              <a:ext cx="2286000" cy="925157"/>
+            </a:xfrm>
+            <a:prstGeom prst="flowChartDecision">
+              <a:avLst/>
+            </a:prstGeom>
+          </p:spPr>
+          <p:style>
+            <a:lnRef idx="2">
+              <a:schemeClr val="accent1">
+                <a:shade val="15000"/>
+              </a:schemeClr>
+            </a:lnRef>
+            <a:fillRef idx="1">
+              <a:schemeClr val="accent1"/>
+            </a:fillRef>
+            <a:effectRef idx="0">
+              <a:schemeClr val="accent1"/>
+            </a:effectRef>
+            <a:fontRef idx="minor">
+              <a:schemeClr val="lt1"/>
+            </a:fontRef>
+          </p:style>
+          <p:txBody>
+            <a:bodyPr rtlCol="0" anchor="ctr"/>
+            <a:lstStyle/>
+            <a:p>
+              <a:pPr algn="ctr"/>
+              <a:r>
+                <a:rPr lang="en-US" altLang="zh-CN" sz="1400" dirty="0"/>
+                <a:t>PREADY==1 &amp;&amp;</a:t>
+              </a:r>
+            </a:p>
+            <a:p>
+              <a:pPr algn="ctr"/>
+              <a:r>
+                <a:rPr lang="en-US" altLang="zh-CN" sz="1400" dirty="0"/>
+                <a:t>INT_N ==1</a:t>
+              </a:r>
+              <a:endParaRPr lang="zh-CN" altLang="en-US" sz="1400" dirty="0"/>
+            </a:p>
+          </p:txBody>
+        </p:sp>
+        <p:sp>
+          <p:nvSpPr>
+            <p:cNvPr id="6" name="流程图: 可选过程 5">
+              <a:extLst>
+                <a:ext uri="{FF2B5EF4-FFF2-40B4-BE49-F238E27FC236}">
+                  <a16:creationId xmlns:a16="http://schemas.microsoft.com/office/drawing/2014/main" id="{83CADF3B-09A8-B547-668D-4B4501C46D63}"/>
+                </a:ext>
+              </a:extLst>
+            </p:cNvPr>
+            <p:cNvSpPr/>
+            <p:nvPr/>
+          </p:nvSpPr>
+          <p:spPr>
+            <a:xfrm>
+              <a:off x="2102661" y="4640508"/>
+              <a:ext cx="2425851" cy="505609"/>
+            </a:xfrm>
+            <a:prstGeom prst="flowChartAlternateProcess">
+              <a:avLst/>
+            </a:prstGeom>
+          </p:spPr>
+          <p:style>
+            <a:lnRef idx="2">
+              <a:schemeClr val="accent1">
+                <a:shade val="15000"/>
+              </a:schemeClr>
+            </a:lnRef>
+            <a:fillRef idx="1">
+              <a:schemeClr val="accent1"/>
+            </a:fillRef>
+            <a:effectRef idx="0">
+              <a:schemeClr val="accent1"/>
+            </a:effectRef>
+            <a:fontRef idx="minor">
+              <a:schemeClr val="lt1"/>
+            </a:fontRef>
+          </p:style>
+          <p:txBody>
+            <a:bodyPr rtlCol="0" anchor="ctr"/>
+            <a:lstStyle/>
+            <a:p>
+              <a:pPr algn="ctr"/>
+              <a:r>
+                <a:rPr lang="zh-CN" altLang="en-US" sz="1400" dirty="0"/>
+                <a:t>写</a:t>
+              </a:r>
+              <a:r>
+                <a:rPr lang="en-US" altLang="zh-CN" sz="1400" dirty="0"/>
+                <a:t>TX_MSG_CTRL</a:t>
+              </a:r>
+              <a:r>
+                <a:rPr lang="zh-CN" altLang="en-US" sz="1400" dirty="0"/>
+                <a:t>发送消息</a:t>
+              </a:r>
+            </a:p>
+          </p:txBody>
+        </p:sp>
+        <p:sp>
+          <p:nvSpPr>
+            <p:cNvPr id="7" name="流程图: 可选过程 6">
+              <a:extLst>
+                <a:ext uri="{FF2B5EF4-FFF2-40B4-BE49-F238E27FC236}">
+                  <a16:creationId xmlns:a16="http://schemas.microsoft.com/office/drawing/2014/main" id="{42CC5EB9-A8F4-243B-6A9C-89831F4AF5FD}"/>
+                </a:ext>
+              </a:extLst>
+            </p:cNvPr>
+            <p:cNvSpPr/>
+            <p:nvPr/>
+          </p:nvSpPr>
+          <p:spPr>
+            <a:xfrm>
+              <a:off x="6762960" y="789271"/>
+              <a:ext cx="2425851" cy="505609"/>
+            </a:xfrm>
+            <a:prstGeom prst="flowChartAlternateProcess">
+              <a:avLst/>
+            </a:prstGeom>
+          </p:spPr>
+          <p:style>
+            <a:lnRef idx="2">
+              <a:schemeClr val="accent1">
+                <a:shade val="15000"/>
+              </a:schemeClr>
+            </a:lnRef>
+            <a:fillRef idx="1">
+              <a:schemeClr val="accent1"/>
+            </a:fillRef>
+            <a:effectRef idx="0">
+              <a:schemeClr val="accent1"/>
+            </a:effectRef>
+            <a:fontRef idx="minor">
+              <a:schemeClr val="lt1"/>
+            </a:fontRef>
+          </p:style>
+          <p:txBody>
+            <a:bodyPr rtlCol="0" anchor="ctr"/>
+            <a:lstStyle/>
+            <a:p>
+              <a:pPr algn="ctr"/>
+              <a:r>
+                <a:rPr lang="zh-CN" altLang="en-US" sz="1400" dirty="0"/>
+                <a:t>读</a:t>
+              </a:r>
+              <a:r>
+                <a:rPr lang="en-US" altLang="zh-CN" sz="1400" dirty="0"/>
+                <a:t>RX_BUF Status</a:t>
+              </a:r>
+              <a:endParaRPr lang="zh-CN" altLang="en-US" sz="1400" dirty="0"/>
+            </a:p>
+          </p:txBody>
+        </p:sp>
+        <p:sp>
+          <p:nvSpPr>
+            <p:cNvPr id="8" name="流程图: 决策 7">
+              <a:extLst>
+                <a:ext uri="{FF2B5EF4-FFF2-40B4-BE49-F238E27FC236}">
+                  <a16:creationId xmlns:a16="http://schemas.microsoft.com/office/drawing/2014/main" id="{C244B802-4886-CB67-CC37-FEE1C8DB3CC9}"/>
+                </a:ext>
+              </a:extLst>
+            </p:cNvPr>
+            <p:cNvSpPr/>
+            <p:nvPr/>
+          </p:nvSpPr>
+          <p:spPr>
+            <a:xfrm>
+              <a:off x="6832885" y="1703447"/>
+              <a:ext cx="2286000" cy="925157"/>
+            </a:xfrm>
+            <a:prstGeom prst="flowChartDecision">
+              <a:avLst/>
+            </a:prstGeom>
+          </p:spPr>
+          <p:style>
+            <a:lnRef idx="2">
+              <a:schemeClr val="accent1">
+                <a:shade val="15000"/>
+              </a:schemeClr>
+            </a:lnRef>
+            <a:fillRef idx="1">
+              <a:schemeClr val="accent1"/>
+            </a:fillRef>
+            <a:effectRef idx="0">
+              <a:schemeClr val="accent1"/>
+            </a:effectRef>
+            <a:fontRef idx="minor">
+              <a:schemeClr val="lt1"/>
+            </a:fontRef>
+          </p:style>
+          <p:txBody>
+            <a:bodyPr rtlCol="0" anchor="ctr"/>
+            <a:lstStyle/>
+            <a:p>
+              <a:pPr algn="ctr"/>
+              <a:r>
+                <a:rPr lang="en-US" altLang="zh-CN" sz="1400" dirty="0"/>
+                <a:t>Status != 0</a:t>
+              </a:r>
+              <a:endParaRPr lang="zh-CN" altLang="en-US" sz="1400" dirty="0"/>
+            </a:p>
+          </p:txBody>
+        </p:sp>
+        <p:sp>
+          <p:nvSpPr>
+            <p:cNvPr id="9" name="流程图: 过程 8">
+              <a:extLst>
+                <a:ext uri="{FF2B5EF4-FFF2-40B4-BE49-F238E27FC236}">
+                  <a16:creationId xmlns:a16="http://schemas.microsoft.com/office/drawing/2014/main" id="{546954CC-F487-9034-4FF6-3F33655EDCD7}"/>
+                </a:ext>
+              </a:extLst>
+            </p:cNvPr>
+            <p:cNvSpPr/>
+            <p:nvPr/>
+          </p:nvSpPr>
+          <p:spPr>
+            <a:xfrm>
+              <a:off x="6762960" y="3037171"/>
+              <a:ext cx="2425851" cy="1054247"/>
+            </a:xfrm>
+            <a:prstGeom prst="flowChartProcess">
+              <a:avLst/>
+            </a:prstGeom>
+          </p:spPr>
+          <p:style>
+            <a:lnRef idx="2">
+              <a:schemeClr val="accent1">
+                <a:shade val="15000"/>
+              </a:schemeClr>
+            </a:lnRef>
+            <a:fillRef idx="1">
+              <a:schemeClr val="accent1"/>
+            </a:fillRef>
+            <a:effectRef idx="0">
+              <a:schemeClr val="accent1"/>
+            </a:effectRef>
+            <a:fontRef idx="minor">
+              <a:schemeClr val="lt1"/>
+            </a:fontRef>
+          </p:style>
+          <p:txBody>
+            <a:bodyPr rtlCol="0" anchor="ctr"/>
+            <a:lstStyle/>
+            <a:p>
+              <a:pPr algn="ctr"/>
+              <a:r>
+                <a:rPr lang="zh-CN" altLang="en-US" sz="1400" dirty="0"/>
+                <a:t>读</a:t>
+              </a:r>
+              <a:r>
+                <a:rPr lang="en-US" altLang="zh-CN" sz="1400" dirty="0"/>
+                <a:t>RX_MSG_ID</a:t>
+              </a:r>
+            </a:p>
+            <a:p>
+              <a:pPr algn="ctr"/>
+              <a:r>
+                <a:rPr lang="zh-CN" altLang="en-US" sz="1400" dirty="0"/>
+                <a:t>读</a:t>
+              </a:r>
+              <a:r>
+                <a:rPr lang="en-US" altLang="zh-CN" sz="1400" dirty="0"/>
+                <a:t>RX_MSG_WORD1</a:t>
+              </a:r>
+            </a:p>
+            <a:p>
+              <a:pPr algn="ctr"/>
+              <a:r>
+                <a:rPr lang="zh-CN" altLang="en-US" sz="1400" dirty="0"/>
+                <a:t>读</a:t>
+              </a:r>
+              <a:r>
+                <a:rPr lang="en-US" altLang="zh-CN" sz="1400" dirty="0"/>
+                <a:t>RX_MSG_WORD0</a:t>
+              </a:r>
+            </a:p>
+            <a:p>
+              <a:pPr algn="ctr"/>
+              <a:r>
+                <a:rPr lang="zh-CN" altLang="en-US" sz="1400" dirty="0"/>
+                <a:t>并和</a:t>
+              </a:r>
+              <a:r>
+                <a:rPr lang="en-US" altLang="zh-CN" sz="1400" dirty="0"/>
+                <a:t>TX_MSG</a:t>
+              </a:r>
+              <a:r>
+                <a:rPr lang="zh-CN" altLang="en-US" sz="1400" dirty="0"/>
+                <a:t>比较</a:t>
+              </a:r>
+              <a:endParaRPr lang="en-US" altLang="zh-CN" sz="1400" dirty="0"/>
+            </a:p>
+          </p:txBody>
+        </p:sp>
+        <p:sp>
+          <p:nvSpPr>
+            <p:cNvPr id="11" name="流程图: 决策 10">
+              <a:extLst>
+                <a:ext uri="{FF2B5EF4-FFF2-40B4-BE49-F238E27FC236}">
+                  <a16:creationId xmlns:a16="http://schemas.microsoft.com/office/drawing/2014/main" id="{8D0A2266-EF0D-04D6-0D3B-39D274765CB7}"/>
+                </a:ext>
+              </a:extLst>
+            </p:cNvPr>
+            <p:cNvSpPr/>
+            <p:nvPr/>
+          </p:nvSpPr>
+          <p:spPr>
+            <a:xfrm>
+              <a:off x="6832885" y="4499985"/>
+              <a:ext cx="2286000" cy="925157"/>
+            </a:xfrm>
+            <a:prstGeom prst="flowChartDecision">
+              <a:avLst/>
+            </a:prstGeom>
+          </p:spPr>
+          <p:style>
+            <a:lnRef idx="2">
+              <a:schemeClr val="accent1">
+                <a:shade val="15000"/>
+              </a:schemeClr>
+            </a:lnRef>
+            <a:fillRef idx="1">
+              <a:schemeClr val="accent1"/>
+            </a:fillRef>
+            <a:effectRef idx="0">
+              <a:schemeClr val="accent1"/>
+            </a:effectRef>
+            <a:fontRef idx="minor">
+              <a:schemeClr val="lt1"/>
+            </a:fontRef>
+          </p:style>
+          <p:txBody>
+            <a:bodyPr rtlCol="0" anchor="ctr"/>
+            <a:lstStyle/>
+            <a:p>
+              <a:pPr algn="ctr"/>
+              <a:r>
+                <a:rPr lang="en-US" altLang="zh-CN" sz="1400" dirty="0"/>
+                <a:t>RX_MSG==TX_MSG</a:t>
+              </a:r>
+              <a:endParaRPr lang="zh-CN" altLang="en-US" sz="1400" dirty="0"/>
+            </a:p>
+          </p:txBody>
+        </p:sp>
+        <p:sp>
+          <p:nvSpPr>
+            <p:cNvPr id="12" name="流程图: 可选过程 11">
+              <a:extLst>
+                <a:ext uri="{FF2B5EF4-FFF2-40B4-BE49-F238E27FC236}">
+                  <a16:creationId xmlns:a16="http://schemas.microsoft.com/office/drawing/2014/main" id="{6D1831DF-C970-E48B-E7E5-B6B0E216190B}"/>
+                </a:ext>
+              </a:extLst>
+            </p:cNvPr>
+            <p:cNvSpPr/>
+            <p:nvPr/>
+          </p:nvSpPr>
+          <p:spPr>
+            <a:xfrm>
+              <a:off x="7484618" y="5833710"/>
+              <a:ext cx="982535" cy="505609"/>
+            </a:xfrm>
+            <a:prstGeom prst="flowChartAlternateProcess">
+              <a:avLst/>
+            </a:prstGeom>
+          </p:spPr>
+          <p:style>
+            <a:lnRef idx="2">
+              <a:schemeClr val="accent1">
+                <a:shade val="15000"/>
+              </a:schemeClr>
+            </a:lnRef>
+            <a:fillRef idx="1">
+              <a:schemeClr val="accent1"/>
+            </a:fillRef>
+            <a:effectRef idx="0">
+              <a:schemeClr val="accent1"/>
+            </a:effectRef>
+            <a:fontRef idx="minor">
+              <a:schemeClr val="lt1"/>
+            </a:fontRef>
+          </p:style>
+          <p:txBody>
+            <a:bodyPr rtlCol="0" anchor="ctr"/>
+            <a:lstStyle/>
+            <a:p>
+              <a:pPr algn="ctr"/>
+              <a:r>
+                <a:rPr lang="zh-CN" altLang="en-US" sz="1400" dirty="0"/>
+                <a:t>测试通过</a:t>
+              </a:r>
+            </a:p>
+          </p:txBody>
+        </p:sp>
+        <p:sp>
+          <p:nvSpPr>
+            <p:cNvPr id="14" name="流程图: 可选过程 13">
+              <a:extLst>
+                <a:ext uri="{FF2B5EF4-FFF2-40B4-BE49-F238E27FC236}">
+                  <a16:creationId xmlns:a16="http://schemas.microsoft.com/office/drawing/2014/main" id="{BB7D6C8C-0105-9B95-7914-667A4AF3F41F}"/>
+                </a:ext>
+              </a:extLst>
+            </p:cNvPr>
+            <p:cNvSpPr/>
+            <p:nvPr/>
+          </p:nvSpPr>
+          <p:spPr>
+            <a:xfrm>
+              <a:off x="4752620" y="1999505"/>
+              <a:ext cx="982535" cy="505609"/>
+            </a:xfrm>
+            <a:prstGeom prst="flowChartAlternateProcess">
+              <a:avLst/>
+            </a:prstGeom>
+          </p:spPr>
+          <p:style>
+            <a:lnRef idx="2">
+              <a:schemeClr val="accent1">
+                <a:shade val="15000"/>
+              </a:schemeClr>
+            </a:lnRef>
+            <a:fillRef idx="1">
+              <a:schemeClr val="accent1"/>
+            </a:fillRef>
+            <a:effectRef idx="0">
+              <a:schemeClr val="accent1"/>
+            </a:effectRef>
+            <a:fontRef idx="minor">
+              <a:schemeClr val="lt1"/>
+            </a:fontRef>
+          </p:style>
+          <p:txBody>
+            <a:bodyPr rtlCol="0" anchor="ctr"/>
+            <a:lstStyle/>
+            <a:p>
+              <a:pPr algn="ctr"/>
+              <a:r>
+                <a:rPr lang="zh-CN" altLang="en-US" sz="1400" dirty="0"/>
+                <a:t>测试失败</a:t>
+              </a:r>
+            </a:p>
+          </p:txBody>
+        </p:sp>
+        <p:sp>
+          <p:nvSpPr>
+            <p:cNvPr id="15" name="流程图: 可选过程 14">
+              <a:extLst>
+                <a:ext uri="{FF2B5EF4-FFF2-40B4-BE49-F238E27FC236}">
+                  <a16:creationId xmlns:a16="http://schemas.microsoft.com/office/drawing/2014/main" id="{FBA409A6-BEE9-3D2A-E5B9-DA774CA4567C}"/>
+                </a:ext>
+              </a:extLst>
+            </p:cNvPr>
+            <p:cNvSpPr/>
+            <p:nvPr/>
+          </p:nvSpPr>
+          <p:spPr>
+            <a:xfrm>
+              <a:off x="9477921" y="4709758"/>
+              <a:ext cx="982535" cy="505609"/>
+            </a:xfrm>
+            <a:prstGeom prst="flowChartAlternateProcess">
+              <a:avLst/>
+            </a:prstGeom>
+          </p:spPr>
+          <p:style>
+            <a:lnRef idx="2">
+              <a:schemeClr val="accent1">
+                <a:shade val="15000"/>
+              </a:schemeClr>
+            </a:lnRef>
+            <a:fillRef idx="1">
+              <a:schemeClr val="accent1"/>
+            </a:fillRef>
+            <a:effectRef idx="0">
+              <a:schemeClr val="accent1"/>
+            </a:effectRef>
+            <a:fontRef idx="minor">
+              <a:schemeClr val="lt1"/>
+            </a:fontRef>
+          </p:style>
+          <p:txBody>
+            <a:bodyPr rtlCol="0" anchor="ctr"/>
+            <a:lstStyle/>
+            <a:p>
+              <a:pPr algn="ctr"/>
+              <a:r>
+                <a:rPr lang="zh-CN" altLang="en-US" sz="1400" dirty="0"/>
+                <a:t>测试失败</a:t>
+              </a:r>
+            </a:p>
+          </p:txBody>
+        </p:sp>
+        <p:sp>
+          <p:nvSpPr>
+            <p:cNvPr id="16" name="流程图: 可选过程 15">
+              <a:extLst>
+                <a:ext uri="{FF2B5EF4-FFF2-40B4-BE49-F238E27FC236}">
+                  <a16:creationId xmlns:a16="http://schemas.microsoft.com/office/drawing/2014/main" id="{70EB19AE-2573-2F78-FB3A-138C9B65F0DC}"/>
+                </a:ext>
+              </a:extLst>
+            </p:cNvPr>
+            <p:cNvSpPr/>
+            <p:nvPr/>
+          </p:nvSpPr>
+          <p:spPr>
+            <a:xfrm>
+              <a:off x="9477921" y="1913220"/>
+              <a:ext cx="982535" cy="505609"/>
+            </a:xfrm>
+            <a:prstGeom prst="flowChartAlternateProcess">
+              <a:avLst/>
+            </a:prstGeom>
+          </p:spPr>
+          <p:style>
+            <a:lnRef idx="2">
+              <a:schemeClr val="accent1">
+                <a:shade val="15000"/>
+              </a:schemeClr>
+            </a:lnRef>
+            <a:fillRef idx="1">
+              <a:schemeClr val="accent1"/>
+            </a:fillRef>
+            <a:effectRef idx="0">
+              <a:schemeClr val="accent1"/>
+            </a:effectRef>
+            <a:fontRef idx="minor">
+              <a:schemeClr val="lt1"/>
+            </a:fontRef>
+          </p:style>
+          <p:txBody>
+            <a:bodyPr rtlCol="0" anchor="ctr"/>
+            <a:lstStyle/>
+            <a:p>
+              <a:pPr algn="ctr"/>
+              <a:r>
+                <a:rPr lang="zh-CN" altLang="en-US" sz="1400" dirty="0"/>
+                <a:t>测试失败</a:t>
+              </a:r>
+            </a:p>
+          </p:txBody>
+        </p:sp>
+        <p:cxnSp>
+          <p:nvCxnSpPr>
+            <p:cNvPr id="18" name="直接箭头连接符 17">
+              <a:extLst>
+                <a:ext uri="{FF2B5EF4-FFF2-40B4-BE49-F238E27FC236}">
+                  <a16:creationId xmlns:a16="http://schemas.microsoft.com/office/drawing/2014/main" id="{13E746B9-B7F0-B48E-6F6E-5713A502CC22}"/>
+                </a:ext>
+              </a:extLst>
+            </p:cNvPr>
+            <p:cNvCxnSpPr>
+              <a:stCxn id="3" idx="2"/>
+              <a:endCxn id="4" idx="0"/>
+            </p:cNvCxnSpPr>
+            <p:nvPr/>
+          </p:nvCxnSpPr>
+          <p:spPr>
+            <a:xfrm flipH="1">
+              <a:off x="3315586" y="1354046"/>
+              <a:ext cx="1" cy="435686"/>
+            </a:xfrm>
+            <a:prstGeom prst="straightConnector1">
+              <a:avLst/>
+            </a:prstGeom>
+            <a:ln>
+              <a:tailEnd type="triangle"/>
+            </a:ln>
+          </p:spPr>
+          <p:style>
+            <a:lnRef idx="1">
+              <a:schemeClr val="accent1"/>
+            </a:lnRef>
+            <a:fillRef idx="0">
+              <a:schemeClr val="accent1"/>
+            </a:fillRef>
+            <a:effectRef idx="0">
+              <a:schemeClr val="accent1"/>
+            </a:effectRef>
+            <a:fontRef idx="minor">
+              <a:schemeClr val="tx1"/>
+            </a:fontRef>
+          </p:style>
+        </p:cxnSp>
+        <p:cxnSp>
+          <p:nvCxnSpPr>
+            <p:cNvPr id="22" name="直接箭头连接符 21">
+              <a:extLst>
+                <a:ext uri="{FF2B5EF4-FFF2-40B4-BE49-F238E27FC236}">
+                  <a16:creationId xmlns:a16="http://schemas.microsoft.com/office/drawing/2014/main" id="{AEE7DBA9-26FF-18B0-A1EF-4241F45F5AF6}"/>
+                </a:ext>
+              </a:extLst>
+            </p:cNvPr>
+            <p:cNvCxnSpPr>
+              <a:stCxn id="4" idx="2"/>
+              <a:endCxn id="2" idx="0"/>
+            </p:cNvCxnSpPr>
+            <p:nvPr/>
+          </p:nvCxnSpPr>
+          <p:spPr>
+            <a:xfrm>
+              <a:off x="3315586" y="2714889"/>
+              <a:ext cx="1" cy="435686"/>
+            </a:xfrm>
+            <a:prstGeom prst="straightConnector1">
+              <a:avLst/>
+            </a:prstGeom>
+            <a:ln>
+              <a:tailEnd type="triangle"/>
+            </a:ln>
+          </p:spPr>
+          <p:style>
+            <a:lnRef idx="1">
+              <a:schemeClr val="accent1"/>
+            </a:lnRef>
+            <a:fillRef idx="0">
+              <a:schemeClr val="accent1"/>
+            </a:fillRef>
+            <a:effectRef idx="0">
+              <a:schemeClr val="accent1"/>
+            </a:effectRef>
+            <a:fontRef idx="minor">
+              <a:schemeClr val="tx1"/>
+            </a:fontRef>
+          </p:style>
+        </p:cxnSp>
+        <p:cxnSp>
+          <p:nvCxnSpPr>
+            <p:cNvPr id="24" name="直接箭头连接符 23">
+              <a:extLst>
+                <a:ext uri="{FF2B5EF4-FFF2-40B4-BE49-F238E27FC236}">
+                  <a16:creationId xmlns:a16="http://schemas.microsoft.com/office/drawing/2014/main" id="{9E86017F-37A9-D0DA-A39C-76EAE1E4806B}"/>
+                </a:ext>
+              </a:extLst>
+            </p:cNvPr>
+            <p:cNvCxnSpPr>
+              <a:stCxn id="2" idx="2"/>
+              <a:endCxn id="6" idx="0"/>
+            </p:cNvCxnSpPr>
+            <p:nvPr/>
+          </p:nvCxnSpPr>
+          <p:spPr>
+            <a:xfrm>
+              <a:off x="3315587" y="4204823"/>
+              <a:ext cx="0" cy="435685"/>
+            </a:xfrm>
+            <a:prstGeom prst="straightConnector1">
+              <a:avLst/>
+            </a:prstGeom>
+            <a:ln>
+              <a:tailEnd type="triangle"/>
+            </a:ln>
+          </p:spPr>
+          <p:style>
+            <a:lnRef idx="1">
+              <a:schemeClr val="accent1"/>
+            </a:lnRef>
+            <a:fillRef idx="0">
+              <a:schemeClr val="accent1"/>
+            </a:fillRef>
+            <a:effectRef idx="0">
+              <a:schemeClr val="accent1"/>
+            </a:effectRef>
+            <a:fontRef idx="minor">
+              <a:schemeClr val="tx1"/>
+            </a:fontRef>
+          </p:style>
+        </p:cxnSp>
+        <p:cxnSp>
+          <p:nvCxnSpPr>
+            <p:cNvPr id="26" name="连接符: 肘形 25">
+              <a:extLst>
+                <a:ext uri="{FF2B5EF4-FFF2-40B4-BE49-F238E27FC236}">
+                  <a16:creationId xmlns:a16="http://schemas.microsoft.com/office/drawing/2014/main" id="{C7CCE7A7-B160-8791-D6A7-62A8F1CA95BA}"/>
+                </a:ext>
+              </a:extLst>
+            </p:cNvPr>
+            <p:cNvCxnSpPr>
+              <a:cxnSpLocks/>
+              <a:stCxn id="6" idx="3"/>
+              <a:endCxn id="7" idx="0"/>
+            </p:cNvCxnSpPr>
+            <p:nvPr/>
+          </p:nvCxnSpPr>
+          <p:spPr>
+            <a:xfrm flipV="1">
+              <a:off x="4528512" y="789271"/>
+              <a:ext cx="3447374" cy="4104042"/>
+            </a:xfrm>
+            <a:prstGeom prst="bentConnector4">
+              <a:avLst>
+                <a:gd name="adj1" fmla="val 42751"/>
+                <a:gd name="adj2" fmla="val 105570"/>
+              </a:avLst>
+            </a:prstGeom>
+            <a:ln>
+              <a:tailEnd type="triangle"/>
+            </a:ln>
+          </p:spPr>
+          <p:style>
+            <a:lnRef idx="1">
+              <a:schemeClr val="accent1"/>
+            </a:lnRef>
+            <a:fillRef idx="0">
+              <a:schemeClr val="accent1"/>
+            </a:fillRef>
+            <a:effectRef idx="0">
+              <a:schemeClr val="accent1"/>
+            </a:effectRef>
+            <a:fontRef idx="minor">
+              <a:schemeClr val="tx1"/>
+            </a:fontRef>
+          </p:style>
+        </p:cxnSp>
+        <p:cxnSp>
+          <p:nvCxnSpPr>
+            <p:cNvPr id="35" name="直接箭头连接符 34">
+              <a:extLst>
+                <a:ext uri="{FF2B5EF4-FFF2-40B4-BE49-F238E27FC236}">
+                  <a16:creationId xmlns:a16="http://schemas.microsoft.com/office/drawing/2014/main" id="{E1D6AC2C-30D4-2839-EEB4-4FDED941C024}"/>
+                </a:ext>
+              </a:extLst>
+            </p:cNvPr>
+            <p:cNvCxnSpPr>
+              <a:stCxn id="4" idx="3"/>
+              <a:endCxn id="14" idx="1"/>
+            </p:cNvCxnSpPr>
+            <p:nvPr/>
+          </p:nvCxnSpPr>
+          <p:spPr>
+            <a:xfrm flipV="1">
+              <a:off x="4458586" y="2252310"/>
+              <a:ext cx="294034" cy="1"/>
+            </a:xfrm>
+            <a:prstGeom prst="straightConnector1">
+              <a:avLst/>
+            </a:prstGeom>
+            <a:ln>
+              <a:tailEnd type="triangle"/>
+            </a:ln>
+          </p:spPr>
+          <p:style>
+            <a:lnRef idx="1">
+              <a:schemeClr val="accent1"/>
+            </a:lnRef>
+            <a:fillRef idx="0">
+              <a:schemeClr val="accent1"/>
+            </a:fillRef>
+            <a:effectRef idx="0">
+              <a:schemeClr val="accent1"/>
+            </a:effectRef>
+            <a:fontRef idx="minor">
+              <a:schemeClr val="tx1"/>
+            </a:fontRef>
+          </p:style>
+        </p:cxnSp>
+        <p:sp>
+          <p:nvSpPr>
+            <p:cNvPr id="37" name="文本框 36">
+              <a:extLst>
+                <a:ext uri="{FF2B5EF4-FFF2-40B4-BE49-F238E27FC236}">
+                  <a16:creationId xmlns:a16="http://schemas.microsoft.com/office/drawing/2014/main" id="{361852C4-8D9E-C88F-DBAA-5039F69DD6DE}"/>
+                </a:ext>
+              </a:extLst>
+            </p:cNvPr>
+            <p:cNvSpPr txBox="1"/>
+            <p:nvPr/>
+          </p:nvSpPr>
+          <p:spPr>
+            <a:xfrm>
+              <a:off x="586815" y="1466566"/>
+              <a:ext cx="1183337" cy="646331"/>
+            </a:xfrm>
+            <a:prstGeom prst="rect">
+              <a:avLst/>
+            </a:prstGeom>
+            <a:noFill/>
+          </p:spPr>
+          <p:txBody>
+            <a:bodyPr wrap="none" rtlCol="0">
+              <a:spAutoFit/>
+            </a:bodyPr>
+            <a:lstStyle/>
+            <a:p>
+              <a:r>
+                <a:rPr lang="en-US" altLang="zh-CN" dirty="0"/>
+                <a:t>4-Iters:</a:t>
+              </a:r>
+            </a:p>
+            <a:p>
+              <a:r>
+                <a:rPr lang="en-US" altLang="zh-CN" dirty="0"/>
+                <a:t>CAN[1…4]</a:t>
+              </a:r>
+              <a:endParaRPr lang="zh-CN" altLang="en-US" dirty="0"/>
+            </a:p>
+          </p:txBody>
+        </p:sp>
+        <p:sp>
+          <p:nvSpPr>
+            <p:cNvPr id="38" name="左大括号 37">
+              <a:extLst>
+                <a:ext uri="{FF2B5EF4-FFF2-40B4-BE49-F238E27FC236}">
+                  <a16:creationId xmlns:a16="http://schemas.microsoft.com/office/drawing/2014/main" id="{17DBD6DE-BF8B-A33A-6E79-E335B35FB462}"/>
+                </a:ext>
+              </a:extLst>
+            </p:cNvPr>
+            <p:cNvSpPr/>
+            <p:nvPr/>
+          </p:nvSpPr>
+          <p:spPr>
+            <a:xfrm>
+              <a:off x="1403808" y="870849"/>
+              <a:ext cx="572616" cy="1844040"/>
+            </a:xfrm>
+            <a:prstGeom prst="leftBrace">
+              <a:avLst/>
+            </a:prstGeom>
+          </p:spPr>
+          <p:style>
+            <a:lnRef idx="1">
+              <a:schemeClr val="accent1"/>
+            </a:lnRef>
+            <a:fillRef idx="0">
+              <a:schemeClr val="accent1"/>
+            </a:fillRef>
+            <a:effectRef idx="0">
+              <a:schemeClr val="accent1"/>
+            </a:effectRef>
+            <a:fontRef idx="minor">
+              <a:schemeClr val="tx1"/>
+            </a:fontRef>
+          </p:style>
+          <p:txBody>
+            <a:bodyPr rtlCol="0" anchor="ctr"/>
+            <a:lstStyle/>
+            <a:p>
+              <a:pPr algn="ctr"/>
+              <a:endParaRPr lang="zh-CN" altLang="en-US"/>
+            </a:p>
+          </p:txBody>
+        </p:sp>
+        <p:sp>
+          <p:nvSpPr>
+            <p:cNvPr id="39" name="左大括号 38">
+              <a:extLst>
+                <a:ext uri="{FF2B5EF4-FFF2-40B4-BE49-F238E27FC236}">
+                  <a16:creationId xmlns:a16="http://schemas.microsoft.com/office/drawing/2014/main" id="{AACCFB20-3CC0-A5F5-CEAA-B4C8A5EB691D}"/>
+                </a:ext>
+              </a:extLst>
+            </p:cNvPr>
+            <p:cNvSpPr/>
+            <p:nvPr/>
+          </p:nvSpPr>
+          <p:spPr>
+            <a:xfrm>
+              <a:off x="1403808" y="3086105"/>
+              <a:ext cx="572616" cy="1183187"/>
+            </a:xfrm>
+            <a:prstGeom prst="leftBrace">
+              <a:avLst/>
+            </a:prstGeom>
+          </p:spPr>
+          <p:style>
+            <a:lnRef idx="1">
+              <a:schemeClr val="accent1"/>
+            </a:lnRef>
+            <a:fillRef idx="0">
+              <a:schemeClr val="accent1"/>
+            </a:fillRef>
+            <a:effectRef idx="0">
+              <a:schemeClr val="accent1"/>
+            </a:effectRef>
+            <a:fontRef idx="minor">
+              <a:schemeClr val="tx1"/>
+            </a:fontRef>
+          </p:style>
+          <p:txBody>
+            <a:bodyPr rtlCol="0" anchor="ctr"/>
+            <a:lstStyle/>
+            <a:p>
+              <a:pPr algn="ctr"/>
+              <a:endParaRPr lang="zh-CN" altLang="en-US"/>
+            </a:p>
+          </p:txBody>
+        </p:sp>
+        <p:sp>
+          <p:nvSpPr>
+            <p:cNvPr id="42" name="文本框 41">
+              <a:extLst>
+                <a:ext uri="{FF2B5EF4-FFF2-40B4-BE49-F238E27FC236}">
+                  <a16:creationId xmlns:a16="http://schemas.microsoft.com/office/drawing/2014/main" id="{1DEC62CB-F693-9F33-BE12-084ED5755AF9}"/>
+                </a:ext>
+              </a:extLst>
+            </p:cNvPr>
+            <p:cNvSpPr txBox="1"/>
+            <p:nvPr/>
+          </p:nvSpPr>
+          <p:spPr>
+            <a:xfrm>
+              <a:off x="755933" y="3335241"/>
+              <a:ext cx="845103" cy="369332"/>
+            </a:xfrm>
+            <a:prstGeom prst="rect">
+              <a:avLst/>
+            </a:prstGeom>
+            <a:noFill/>
+          </p:spPr>
+          <p:txBody>
+            <a:bodyPr wrap="none" rtlCol="0">
+              <a:spAutoFit/>
+            </a:bodyPr>
+            <a:lstStyle/>
+            <a:p>
+              <a:r>
+                <a:rPr lang="en-US" altLang="zh-CN" dirty="0"/>
+                <a:t>4-Iters</a:t>
+              </a:r>
+            </a:p>
+          </p:txBody>
+        </p:sp>
+        <p:sp>
+          <p:nvSpPr>
+            <p:cNvPr id="43" name="左大括号 42">
+              <a:extLst>
+                <a:ext uri="{FF2B5EF4-FFF2-40B4-BE49-F238E27FC236}">
+                  <a16:creationId xmlns:a16="http://schemas.microsoft.com/office/drawing/2014/main" id="{C9257AB1-AAD6-607A-9164-74C5C9C728D9}"/>
+                </a:ext>
+              </a:extLst>
+            </p:cNvPr>
+            <p:cNvSpPr/>
+            <p:nvPr/>
+          </p:nvSpPr>
+          <p:spPr>
+            <a:xfrm>
+              <a:off x="1403808" y="4623774"/>
+              <a:ext cx="572616" cy="522344"/>
+            </a:xfrm>
+            <a:prstGeom prst="leftBrace">
+              <a:avLst/>
+            </a:prstGeom>
+          </p:spPr>
+          <p:style>
+            <a:lnRef idx="1">
+              <a:schemeClr val="accent1"/>
+            </a:lnRef>
+            <a:fillRef idx="0">
+              <a:schemeClr val="accent1"/>
+            </a:fillRef>
+            <a:effectRef idx="0">
+              <a:schemeClr val="accent1"/>
+            </a:effectRef>
+            <a:fontRef idx="minor">
+              <a:schemeClr val="tx1"/>
+            </a:fontRef>
+          </p:style>
+          <p:txBody>
+            <a:bodyPr rtlCol="0" anchor="ctr"/>
+            <a:lstStyle/>
+            <a:p>
+              <a:pPr algn="ctr"/>
+              <a:endParaRPr lang="zh-CN" altLang="en-US"/>
+            </a:p>
+          </p:txBody>
+        </p:sp>
+        <p:sp>
+          <p:nvSpPr>
+            <p:cNvPr id="44" name="文本框 43">
+              <a:extLst>
+                <a:ext uri="{FF2B5EF4-FFF2-40B4-BE49-F238E27FC236}">
+                  <a16:creationId xmlns:a16="http://schemas.microsoft.com/office/drawing/2014/main" id="{FAFBC812-8E16-9E0A-21BA-171B50647569}"/>
+                </a:ext>
+              </a:extLst>
+            </p:cNvPr>
+            <p:cNvSpPr txBox="1"/>
+            <p:nvPr/>
+          </p:nvSpPr>
+          <p:spPr>
+            <a:xfrm>
+              <a:off x="845013" y="4526709"/>
+              <a:ext cx="845103" cy="369332"/>
+            </a:xfrm>
+            <a:prstGeom prst="rect">
+              <a:avLst/>
+            </a:prstGeom>
+            <a:noFill/>
+          </p:spPr>
+          <p:txBody>
+            <a:bodyPr wrap="none" rtlCol="0">
+              <a:spAutoFit/>
+            </a:bodyPr>
+            <a:lstStyle/>
+            <a:p>
+              <a:r>
+                <a:rPr lang="en-US" altLang="zh-CN" dirty="0"/>
+                <a:t>4-Iters</a:t>
+              </a:r>
+            </a:p>
+          </p:txBody>
+        </p:sp>
+        <p:cxnSp>
+          <p:nvCxnSpPr>
+            <p:cNvPr id="46" name="直接箭头连接符 45">
+              <a:extLst>
+                <a:ext uri="{FF2B5EF4-FFF2-40B4-BE49-F238E27FC236}">
+                  <a16:creationId xmlns:a16="http://schemas.microsoft.com/office/drawing/2014/main" id="{B9733E5B-EA7B-EE47-4640-80A9B045C495}"/>
+                </a:ext>
+              </a:extLst>
+            </p:cNvPr>
+            <p:cNvCxnSpPr>
+              <a:stCxn id="7" idx="2"/>
+              <a:endCxn id="8" idx="0"/>
+            </p:cNvCxnSpPr>
+            <p:nvPr/>
+          </p:nvCxnSpPr>
+          <p:spPr>
+            <a:xfrm flipH="1">
+              <a:off x="7975885" y="1294880"/>
+              <a:ext cx="1" cy="408567"/>
+            </a:xfrm>
+            <a:prstGeom prst="straightConnector1">
+              <a:avLst/>
+            </a:prstGeom>
+            <a:ln>
+              <a:tailEnd type="triangle"/>
+            </a:ln>
+          </p:spPr>
+          <p:style>
+            <a:lnRef idx="1">
+              <a:schemeClr val="accent1"/>
+            </a:lnRef>
+            <a:fillRef idx="0">
+              <a:schemeClr val="accent1"/>
+            </a:fillRef>
+            <a:effectRef idx="0">
+              <a:schemeClr val="accent1"/>
+            </a:effectRef>
+            <a:fontRef idx="minor">
+              <a:schemeClr val="tx1"/>
+            </a:fontRef>
+          </p:style>
+        </p:cxnSp>
+        <p:cxnSp>
+          <p:nvCxnSpPr>
+            <p:cNvPr id="48" name="直接箭头连接符 47">
+              <a:extLst>
+                <a:ext uri="{FF2B5EF4-FFF2-40B4-BE49-F238E27FC236}">
+                  <a16:creationId xmlns:a16="http://schemas.microsoft.com/office/drawing/2014/main" id="{FA9208A4-3C9A-2A15-449E-4B2CEF3D387F}"/>
+                </a:ext>
+              </a:extLst>
+            </p:cNvPr>
+            <p:cNvCxnSpPr>
+              <a:stCxn id="8" idx="2"/>
+              <a:endCxn id="9" idx="0"/>
+            </p:cNvCxnSpPr>
+            <p:nvPr/>
+          </p:nvCxnSpPr>
+          <p:spPr>
+            <a:xfrm>
+              <a:off x="7975885" y="2628604"/>
+              <a:ext cx="1" cy="408567"/>
+            </a:xfrm>
+            <a:prstGeom prst="straightConnector1">
+              <a:avLst/>
+            </a:prstGeom>
+            <a:ln>
+              <a:tailEnd type="triangle"/>
+            </a:ln>
+          </p:spPr>
+          <p:style>
+            <a:lnRef idx="1">
+              <a:schemeClr val="accent1"/>
+            </a:lnRef>
+            <a:fillRef idx="0">
+              <a:schemeClr val="accent1"/>
+            </a:fillRef>
+            <a:effectRef idx="0">
+              <a:schemeClr val="accent1"/>
+            </a:effectRef>
+            <a:fontRef idx="minor">
+              <a:schemeClr val="tx1"/>
+            </a:fontRef>
+          </p:style>
+        </p:cxnSp>
+        <p:cxnSp>
+          <p:nvCxnSpPr>
+            <p:cNvPr id="50" name="直接箭头连接符 49">
+              <a:extLst>
+                <a:ext uri="{FF2B5EF4-FFF2-40B4-BE49-F238E27FC236}">
+                  <a16:creationId xmlns:a16="http://schemas.microsoft.com/office/drawing/2014/main" id="{B83B7D89-2D6B-FD0B-EF89-280BA952710A}"/>
+                </a:ext>
+              </a:extLst>
+            </p:cNvPr>
+            <p:cNvCxnSpPr>
+              <a:stCxn id="9" idx="2"/>
+              <a:endCxn id="11" idx="0"/>
+            </p:cNvCxnSpPr>
+            <p:nvPr/>
+          </p:nvCxnSpPr>
+          <p:spPr>
+            <a:xfrm flipH="1">
+              <a:off x="7975885" y="4091418"/>
+              <a:ext cx="1" cy="408567"/>
+            </a:xfrm>
+            <a:prstGeom prst="straightConnector1">
+              <a:avLst/>
+            </a:prstGeom>
+            <a:ln>
+              <a:tailEnd type="triangle"/>
+            </a:ln>
+          </p:spPr>
+          <p:style>
+            <a:lnRef idx="1">
+              <a:schemeClr val="accent1"/>
+            </a:lnRef>
+            <a:fillRef idx="0">
+              <a:schemeClr val="accent1"/>
+            </a:fillRef>
+            <a:effectRef idx="0">
+              <a:schemeClr val="accent1"/>
+            </a:effectRef>
+            <a:fontRef idx="minor">
+              <a:schemeClr val="tx1"/>
+            </a:fontRef>
+          </p:style>
+        </p:cxnSp>
+        <p:cxnSp>
+          <p:nvCxnSpPr>
+            <p:cNvPr id="52" name="直接箭头连接符 51">
+              <a:extLst>
+                <a:ext uri="{FF2B5EF4-FFF2-40B4-BE49-F238E27FC236}">
+                  <a16:creationId xmlns:a16="http://schemas.microsoft.com/office/drawing/2014/main" id="{0A6E8ED0-E63F-8BB3-8187-BEA37483319C}"/>
+                </a:ext>
+              </a:extLst>
+            </p:cNvPr>
+            <p:cNvCxnSpPr>
+              <a:stCxn id="11" idx="2"/>
+              <a:endCxn id="12" idx="0"/>
+            </p:cNvCxnSpPr>
+            <p:nvPr/>
+          </p:nvCxnSpPr>
+          <p:spPr>
+            <a:xfrm>
+              <a:off x="7975885" y="5425142"/>
+              <a:ext cx="1" cy="408568"/>
+            </a:xfrm>
+            <a:prstGeom prst="straightConnector1">
+              <a:avLst/>
+            </a:prstGeom>
+            <a:ln>
+              <a:tailEnd type="triangle"/>
+            </a:ln>
+          </p:spPr>
+          <p:style>
+            <a:lnRef idx="1">
+              <a:schemeClr val="accent1"/>
+            </a:lnRef>
+            <a:fillRef idx="0">
+              <a:schemeClr val="accent1"/>
+            </a:fillRef>
+            <a:effectRef idx="0">
+              <a:schemeClr val="accent1"/>
+            </a:effectRef>
+            <a:fontRef idx="minor">
+              <a:schemeClr val="tx1"/>
+            </a:fontRef>
+          </p:style>
+        </p:cxnSp>
+        <p:cxnSp>
+          <p:nvCxnSpPr>
+            <p:cNvPr id="54" name="直接箭头连接符 53">
+              <a:extLst>
+                <a:ext uri="{FF2B5EF4-FFF2-40B4-BE49-F238E27FC236}">
+                  <a16:creationId xmlns:a16="http://schemas.microsoft.com/office/drawing/2014/main" id="{335E9F48-8385-65A5-89B8-72B5547A6EE0}"/>
+                </a:ext>
+              </a:extLst>
+            </p:cNvPr>
+            <p:cNvCxnSpPr>
+              <a:stCxn id="8" idx="3"/>
+              <a:endCxn id="16" idx="1"/>
+            </p:cNvCxnSpPr>
+            <p:nvPr/>
+          </p:nvCxnSpPr>
+          <p:spPr>
+            <a:xfrm flipV="1">
+              <a:off x="9118885" y="2166025"/>
+              <a:ext cx="359036" cy="1"/>
+            </a:xfrm>
+            <a:prstGeom prst="straightConnector1">
+              <a:avLst/>
+            </a:prstGeom>
+            <a:ln>
+              <a:tailEnd type="triangle"/>
+            </a:ln>
+          </p:spPr>
+          <p:style>
+            <a:lnRef idx="1">
+              <a:schemeClr val="accent1"/>
+            </a:lnRef>
+            <a:fillRef idx="0">
+              <a:schemeClr val="accent1"/>
+            </a:fillRef>
+            <a:effectRef idx="0">
+              <a:schemeClr val="accent1"/>
+            </a:effectRef>
+            <a:fontRef idx="minor">
+              <a:schemeClr val="tx1"/>
+            </a:fontRef>
+          </p:style>
+        </p:cxnSp>
+        <p:cxnSp>
+          <p:nvCxnSpPr>
+            <p:cNvPr id="56" name="直接箭头连接符 55">
+              <a:extLst>
+                <a:ext uri="{FF2B5EF4-FFF2-40B4-BE49-F238E27FC236}">
+                  <a16:creationId xmlns:a16="http://schemas.microsoft.com/office/drawing/2014/main" id="{E1EBD58A-C64A-90FB-8E10-D7103BFC3541}"/>
+                </a:ext>
+              </a:extLst>
+            </p:cNvPr>
+            <p:cNvCxnSpPr>
+              <a:stCxn id="11" idx="3"/>
+              <a:endCxn id="15" idx="1"/>
+            </p:cNvCxnSpPr>
+            <p:nvPr/>
+          </p:nvCxnSpPr>
+          <p:spPr>
+            <a:xfrm flipV="1">
+              <a:off x="9118885" y="4962563"/>
+              <a:ext cx="359036" cy="1"/>
+            </a:xfrm>
+            <a:prstGeom prst="straightConnector1">
+              <a:avLst/>
+            </a:prstGeom>
+            <a:ln>
+              <a:tailEnd type="triangle"/>
+            </a:ln>
+          </p:spPr>
+          <p:style>
+            <a:lnRef idx="1">
+              <a:schemeClr val="accent1"/>
+            </a:lnRef>
+            <a:fillRef idx="0">
+              <a:schemeClr val="accent1"/>
+            </a:fillRef>
+            <a:effectRef idx="0">
+              <a:schemeClr val="accent1"/>
+            </a:effectRef>
+            <a:fontRef idx="minor">
+              <a:schemeClr val="tx1"/>
+            </a:fontRef>
+          </p:style>
+        </p:cxnSp>
+        <p:sp>
+          <p:nvSpPr>
+            <p:cNvPr id="58" name="文本框 57">
+              <a:extLst>
+                <a:ext uri="{FF2B5EF4-FFF2-40B4-BE49-F238E27FC236}">
+                  <a16:creationId xmlns:a16="http://schemas.microsoft.com/office/drawing/2014/main" id="{DEED5D08-8CAB-D372-EA6D-D1819A552DC5}"/>
+                </a:ext>
+              </a:extLst>
+            </p:cNvPr>
+            <p:cNvSpPr txBox="1"/>
+            <p:nvPr/>
+          </p:nvSpPr>
+          <p:spPr>
+            <a:xfrm>
+              <a:off x="3315586" y="2761398"/>
+              <a:ext cx="359264" cy="307777"/>
+            </a:xfrm>
+            <a:prstGeom prst="rect">
+              <a:avLst/>
+            </a:prstGeom>
+            <a:noFill/>
+          </p:spPr>
+          <p:txBody>
+            <a:bodyPr wrap="square" rtlCol="0">
+              <a:spAutoFit/>
+            </a:bodyPr>
+            <a:lstStyle/>
+            <a:p>
+              <a:r>
+                <a:rPr lang="en-US" altLang="zh-CN" sz="1400" dirty="0"/>
+                <a:t>Y</a:t>
+              </a:r>
+              <a:endParaRPr lang="zh-CN" altLang="en-US" dirty="0"/>
+            </a:p>
+          </p:txBody>
+        </p:sp>
+        <p:sp>
+          <p:nvSpPr>
+            <p:cNvPr id="59" name="文本框 58">
+              <a:extLst>
+                <a:ext uri="{FF2B5EF4-FFF2-40B4-BE49-F238E27FC236}">
+                  <a16:creationId xmlns:a16="http://schemas.microsoft.com/office/drawing/2014/main" id="{7B8B8121-EE31-E76F-9061-105D4CA5D3DD}"/>
+                </a:ext>
+              </a:extLst>
+            </p:cNvPr>
+            <p:cNvSpPr txBox="1"/>
+            <p:nvPr/>
+          </p:nvSpPr>
+          <p:spPr>
+            <a:xfrm>
+              <a:off x="8008489" y="2624955"/>
+              <a:ext cx="359264" cy="307777"/>
+            </a:xfrm>
+            <a:prstGeom prst="rect">
+              <a:avLst/>
+            </a:prstGeom>
+            <a:noFill/>
+          </p:spPr>
+          <p:txBody>
+            <a:bodyPr wrap="square" rtlCol="0">
+              <a:spAutoFit/>
+            </a:bodyPr>
+            <a:lstStyle/>
+            <a:p>
+              <a:r>
+                <a:rPr lang="en-US" altLang="zh-CN" sz="1400" dirty="0"/>
+                <a:t>Y</a:t>
+              </a:r>
+              <a:endParaRPr lang="zh-CN" altLang="en-US" dirty="0"/>
+            </a:p>
+          </p:txBody>
+        </p:sp>
+        <p:sp>
+          <p:nvSpPr>
+            <p:cNvPr id="60" name="文本框 59">
+              <a:extLst>
+                <a:ext uri="{FF2B5EF4-FFF2-40B4-BE49-F238E27FC236}">
+                  <a16:creationId xmlns:a16="http://schemas.microsoft.com/office/drawing/2014/main" id="{0872026A-D90E-1ECA-E3B3-845EADF5E900}"/>
+                </a:ext>
+              </a:extLst>
+            </p:cNvPr>
+            <p:cNvSpPr txBox="1"/>
+            <p:nvPr/>
+          </p:nvSpPr>
+          <p:spPr>
+            <a:xfrm>
+              <a:off x="7975885" y="5467884"/>
+              <a:ext cx="359264" cy="307777"/>
+            </a:xfrm>
+            <a:prstGeom prst="rect">
+              <a:avLst/>
+            </a:prstGeom>
+            <a:noFill/>
+          </p:spPr>
+          <p:txBody>
+            <a:bodyPr wrap="square" rtlCol="0">
+              <a:spAutoFit/>
+            </a:bodyPr>
+            <a:lstStyle/>
+            <a:p>
+              <a:r>
+                <a:rPr lang="en-US" altLang="zh-CN" sz="1400" dirty="0"/>
+                <a:t>Y</a:t>
+              </a:r>
+              <a:endParaRPr lang="zh-CN" altLang="en-US" dirty="0"/>
+            </a:p>
+          </p:txBody>
+        </p:sp>
+        <p:sp>
+          <p:nvSpPr>
+            <p:cNvPr id="61" name="右大括号 60">
+              <a:extLst>
+                <a:ext uri="{FF2B5EF4-FFF2-40B4-BE49-F238E27FC236}">
+                  <a16:creationId xmlns:a16="http://schemas.microsoft.com/office/drawing/2014/main" id="{84D560B0-0826-FD06-CED4-97AA790B2910}"/>
+                </a:ext>
+              </a:extLst>
+            </p:cNvPr>
+            <p:cNvSpPr/>
+            <p:nvPr/>
+          </p:nvSpPr>
+          <p:spPr>
+            <a:xfrm>
+              <a:off x="10547235" y="586599"/>
+              <a:ext cx="316295" cy="5503653"/>
+            </a:xfrm>
+            <a:prstGeom prst="rightBrace">
+              <a:avLst>
+                <a:gd name="adj1" fmla="val 8333"/>
+                <a:gd name="adj2" fmla="val 50105"/>
+              </a:avLst>
+            </a:prstGeom>
+          </p:spPr>
+          <p:style>
+            <a:lnRef idx="1">
+              <a:schemeClr val="accent1"/>
+            </a:lnRef>
+            <a:fillRef idx="0">
+              <a:schemeClr val="accent1"/>
+            </a:fillRef>
+            <a:effectRef idx="0">
+              <a:schemeClr val="accent1"/>
+            </a:effectRef>
+            <a:fontRef idx="minor">
+              <a:schemeClr val="tx1"/>
+            </a:fontRef>
+          </p:style>
+          <p:txBody>
+            <a:bodyPr rtlCol="0" anchor="ctr"/>
+            <a:lstStyle/>
+            <a:p>
+              <a:pPr algn="ctr"/>
+              <a:endParaRPr lang="zh-CN" altLang="en-US"/>
+            </a:p>
+          </p:txBody>
+        </p:sp>
+        <p:sp>
+          <p:nvSpPr>
+            <p:cNvPr id="62" name="文本框 61">
+              <a:extLst>
+                <a:ext uri="{FF2B5EF4-FFF2-40B4-BE49-F238E27FC236}">
+                  <a16:creationId xmlns:a16="http://schemas.microsoft.com/office/drawing/2014/main" id="{8358B385-10B2-1BEA-9817-F55AA905BE34}"/>
+                </a:ext>
+              </a:extLst>
+            </p:cNvPr>
+            <p:cNvSpPr txBox="1"/>
+            <p:nvPr/>
+          </p:nvSpPr>
+          <p:spPr>
+            <a:xfrm>
+              <a:off x="10705382" y="2965909"/>
+              <a:ext cx="845103" cy="369332"/>
+            </a:xfrm>
+            <a:prstGeom prst="rect">
+              <a:avLst/>
+            </a:prstGeom>
+            <a:noFill/>
+          </p:spPr>
+          <p:txBody>
+            <a:bodyPr wrap="none" rtlCol="0">
+              <a:spAutoFit/>
+            </a:bodyPr>
+            <a:lstStyle/>
+            <a:p>
+              <a:r>
+                <a:rPr lang="en-US" altLang="zh-CN" dirty="0"/>
+                <a:t>4-Iters</a:t>
+              </a:r>
+            </a:p>
+          </p:txBody>
+        </p:sp>
+      </p:grpSp>
     </p:spTree>
     <p:extLst>
       <p:ext uri="{BB962C8B-B14F-4D97-AF65-F5344CB8AC3E}">

</xml_diff>

<commit_message>
tiny updates on doc
</commit_message>
<xml_diff>
--- a/stn/stn_test_fw_solution.pptx
+++ b/stn/stn_test_fw_solution.pptx
@@ -11,6 +11,7 @@
     <p:sldId id="259" r:id="rId5"/>
     <p:sldId id="261" r:id="rId6"/>
     <p:sldId id="264" r:id="rId7"/>
+    <p:sldId id="265" r:id="rId8"/>
   </p:sldIdLst>
   <p:sldSz cx="12192000" cy="6858000"/>
   <p:notesSz cx="6858000" cy="9144000"/>
@@ -264,7 +265,7 @@
           <a:p>
             <a:fld id="{AA100CEF-43AD-4927-89A2-F66B823BF21E}" type="datetimeFigureOut">
               <a:rPr lang="zh-CN" altLang="en-US" smtClean="0"/>
-              <a:t>2025/8/13</a:t>
+              <a:t>2025/8/19</a:t>
             </a:fld>
             <a:endParaRPr lang="zh-CN" altLang="en-US"/>
           </a:p>
@@ -462,7 +463,7 @@
           <a:p>
             <a:fld id="{AA100CEF-43AD-4927-89A2-F66B823BF21E}" type="datetimeFigureOut">
               <a:rPr lang="zh-CN" altLang="en-US" smtClean="0"/>
-              <a:t>2025/8/13</a:t>
+              <a:t>2025/8/19</a:t>
             </a:fld>
             <a:endParaRPr lang="zh-CN" altLang="en-US"/>
           </a:p>
@@ -670,7 +671,7 @@
           <a:p>
             <a:fld id="{AA100CEF-43AD-4927-89A2-F66B823BF21E}" type="datetimeFigureOut">
               <a:rPr lang="zh-CN" altLang="en-US" smtClean="0"/>
-              <a:t>2025/8/13</a:t>
+              <a:t>2025/8/19</a:t>
             </a:fld>
             <a:endParaRPr lang="zh-CN" altLang="en-US"/>
           </a:p>
@@ -868,7 +869,7 @@
           <a:p>
             <a:fld id="{AA100CEF-43AD-4927-89A2-F66B823BF21E}" type="datetimeFigureOut">
               <a:rPr lang="zh-CN" altLang="en-US" smtClean="0"/>
-              <a:t>2025/8/13</a:t>
+              <a:t>2025/8/19</a:t>
             </a:fld>
             <a:endParaRPr lang="zh-CN" altLang="en-US"/>
           </a:p>
@@ -1143,7 +1144,7 @@
           <a:p>
             <a:fld id="{AA100CEF-43AD-4927-89A2-F66B823BF21E}" type="datetimeFigureOut">
               <a:rPr lang="zh-CN" altLang="en-US" smtClean="0"/>
-              <a:t>2025/8/13</a:t>
+              <a:t>2025/8/19</a:t>
             </a:fld>
             <a:endParaRPr lang="zh-CN" altLang="en-US"/>
           </a:p>
@@ -1408,7 +1409,7 @@
           <a:p>
             <a:fld id="{AA100CEF-43AD-4927-89A2-F66B823BF21E}" type="datetimeFigureOut">
               <a:rPr lang="zh-CN" altLang="en-US" smtClean="0"/>
-              <a:t>2025/8/13</a:t>
+              <a:t>2025/8/19</a:t>
             </a:fld>
             <a:endParaRPr lang="zh-CN" altLang="en-US"/>
           </a:p>
@@ -1820,7 +1821,7 @@
           <a:p>
             <a:fld id="{AA100CEF-43AD-4927-89A2-F66B823BF21E}" type="datetimeFigureOut">
               <a:rPr lang="zh-CN" altLang="en-US" smtClean="0"/>
-              <a:t>2025/8/13</a:t>
+              <a:t>2025/8/19</a:t>
             </a:fld>
             <a:endParaRPr lang="zh-CN" altLang="en-US"/>
           </a:p>
@@ -1961,7 +1962,7 @@
           <a:p>
             <a:fld id="{AA100CEF-43AD-4927-89A2-F66B823BF21E}" type="datetimeFigureOut">
               <a:rPr lang="zh-CN" altLang="en-US" smtClean="0"/>
-              <a:t>2025/8/13</a:t>
+              <a:t>2025/8/19</a:t>
             </a:fld>
             <a:endParaRPr lang="zh-CN" altLang="en-US"/>
           </a:p>
@@ -2074,7 +2075,7 @@
           <a:p>
             <a:fld id="{AA100CEF-43AD-4927-89A2-F66B823BF21E}" type="datetimeFigureOut">
               <a:rPr lang="zh-CN" altLang="en-US" smtClean="0"/>
-              <a:t>2025/8/13</a:t>
+              <a:t>2025/8/19</a:t>
             </a:fld>
             <a:endParaRPr lang="zh-CN" altLang="en-US"/>
           </a:p>
@@ -2385,7 +2386,7 @@
           <a:p>
             <a:fld id="{AA100CEF-43AD-4927-89A2-F66B823BF21E}" type="datetimeFigureOut">
               <a:rPr lang="zh-CN" altLang="en-US" smtClean="0"/>
-              <a:t>2025/8/13</a:t>
+              <a:t>2025/8/19</a:t>
             </a:fld>
             <a:endParaRPr lang="zh-CN" altLang="en-US"/>
           </a:p>
@@ -2673,7 +2674,7 @@
           <a:p>
             <a:fld id="{AA100CEF-43AD-4927-89A2-F66B823BF21E}" type="datetimeFigureOut">
               <a:rPr lang="zh-CN" altLang="en-US" smtClean="0"/>
-              <a:t>2025/8/13</a:t>
+              <a:t>2025/8/19</a:t>
             </a:fld>
             <a:endParaRPr lang="zh-CN" altLang="en-US"/>
           </a:p>
@@ -2914,7 +2915,7 @@
           <a:p>
             <a:fld id="{AA100CEF-43AD-4927-89A2-F66B823BF21E}" type="datetimeFigureOut">
               <a:rPr lang="zh-CN" altLang="en-US" smtClean="0"/>
-              <a:t>2025/8/13</a:t>
+              <a:t>2025/8/19</a:t>
             </a:fld>
             <a:endParaRPr lang="zh-CN" altLang="en-US"/>
           </a:p>
@@ -11032,6 +11033,695 @@
 </p:sld>
 </file>
 
+<file path=ppt/slides/slide7.xml><?xml version="1.0" encoding="utf-8"?>
+<p:sld xmlns:a="http://schemas.openxmlformats.org/drawingml/2006/main" xmlns:r="http://schemas.openxmlformats.org/officeDocument/2006/relationships" xmlns:p="http://schemas.openxmlformats.org/presentationml/2006/main">
+  <p:cSld>
+    <p:spTree>
+      <p:nvGrpSpPr>
+        <p:cNvPr id="1" name=""/>
+        <p:cNvGrpSpPr/>
+        <p:nvPr/>
+      </p:nvGrpSpPr>
+      <p:grpSpPr>
+        <a:xfrm>
+          <a:off x="0" y="0"/>
+          <a:ext cx="0" cy="0"/>
+          <a:chOff x="0" y="0"/>
+          <a:chExt cx="0" cy="0"/>
+        </a:xfrm>
+      </p:grpSpPr>
+      <p:grpSp>
+        <p:nvGrpSpPr>
+          <p:cNvPr id="21" name="组合 20">
+            <a:extLst>
+              <a:ext uri="{FF2B5EF4-FFF2-40B4-BE49-F238E27FC236}">
+                <a16:creationId xmlns:a16="http://schemas.microsoft.com/office/drawing/2014/main" id="{1E9912D7-C6A2-AAA6-FAF4-701ECA528C29}"/>
+              </a:ext>
+            </a:extLst>
+          </p:cNvPr>
+          <p:cNvGrpSpPr/>
+          <p:nvPr/>
+        </p:nvGrpSpPr>
+        <p:grpSpPr>
+          <a:xfrm>
+            <a:off x="2884096" y="1052423"/>
+            <a:ext cx="3551208" cy="3118945"/>
+            <a:chOff x="2884096" y="1052423"/>
+            <a:chExt cx="3551208" cy="3118945"/>
+          </a:xfrm>
+        </p:grpSpPr>
+        <p:sp>
+          <p:nvSpPr>
+            <p:cNvPr id="2" name="文本框 1">
+              <a:extLst>
+                <a:ext uri="{FF2B5EF4-FFF2-40B4-BE49-F238E27FC236}">
+                  <a16:creationId xmlns:a16="http://schemas.microsoft.com/office/drawing/2014/main" id="{BA96B2EB-40FD-ABD4-7B45-986AC4D677AB}"/>
+                </a:ext>
+              </a:extLst>
+            </p:cNvPr>
+            <p:cNvSpPr txBox="1"/>
+            <p:nvPr/>
+          </p:nvSpPr>
+          <p:spPr>
+            <a:xfrm>
+              <a:off x="2884096" y="1052423"/>
+              <a:ext cx="1207698" cy="369332"/>
+            </a:xfrm>
+            <a:prstGeom prst="rect">
+              <a:avLst/>
+            </a:prstGeom>
+            <a:noFill/>
+          </p:spPr>
+          <p:txBody>
+            <a:bodyPr wrap="square" rtlCol="0">
+              <a:spAutoFit/>
+            </a:bodyPr>
+            <a:lstStyle/>
+            <a:p>
+              <a:r>
+                <a:rPr lang="en-US" altLang="zh-CN" b="1" dirty="0"/>
+                <a:t>CAN TX</a:t>
+              </a:r>
+            </a:p>
+          </p:txBody>
+        </p:sp>
+        <p:sp>
+          <p:nvSpPr>
+            <p:cNvPr id="4" name="流程图: 过程 3">
+              <a:extLst>
+                <a:ext uri="{FF2B5EF4-FFF2-40B4-BE49-F238E27FC236}">
+                  <a16:creationId xmlns:a16="http://schemas.microsoft.com/office/drawing/2014/main" id="{2F45A042-8408-52C7-F15A-0AF39581AC69}"/>
+                </a:ext>
+              </a:extLst>
+            </p:cNvPr>
+            <p:cNvSpPr/>
+            <p:nvPr/>
+          </p:nvSpPr>
+          <p:spPr>
+            <a:xfrm>
+              <a:off x="2930104" y="1654834"/>
+              <a:ext cx="1115683" cy="454324"/>
+            </a:xfrm>
+            <a:prstGeom prst="flowChartProcess">
+              <a:avLst/>
+            </a:prstGeom>
+          </p:spPr>
+          <p:style>
+            <a:lnRef idx="2">
+              <a:schemeClr val="accent1">
+                <a:shade val="15000"/>
+              </a:schemeClr>
+            </a:lnRef>
+            <a:fillRef idx="1">
+              <a:schemeClr val="accent1"/>
+            </a:fillRef>
+            <a:effectRef idx="0">
+              <a:schemeClr val="accent1"/>
+            </a:effectRef>
+            <a:fontRef idx="minor">
+              <a:schemeClr val="lt1"/>
+            </a:fontRef>
+          </p:style>
+          <p:txBody>
+            <a:bodyPr rtlCol="0" anchor="ctr"/>
+            <a:lstStyle/>
+            <a:p>
+              <a:pPr algn="ctr"/>
+              <a:r>
+                <a:rPr lang="en-US" altLang="zh-CN" dirty="0"/>
+                <a:t>TX1</a:t>
+              </a:r>
+              <a:endParaRPr lang="zh-CN" altLang="en-US" dirty="0"/>
+            </a:p>
+          </p:txBody>
+        </p:sp>
+        <p:sp>
+          <p:nvSpPr>
+            <p:cNvPr id="5" name="流程图: 过程 4">
+              <a:extLst>
+                <a:ext uri="{FF2B5EF4-FFF2-40B4-BE49-F238E27FC236}">
+                  <a16:creationId xmlns:a16="http://schemas.microsoft.com/office/drawing/2014/main" id="{42E477C3-0702-857E-6FE0-F45330447F1C}"/>
+                </a:ext>
+              </a:extLst>
+            </p:cNvPr>
+            <p:cNvSpPr/>
+            <p:nvPr/>
+          </p:nvSpPr>
+          <p:spPr>
+            <a:xfrm>
+              <a:off x="2930104" y="2342237"/>
+              <a:ext cx="1115683" cy="454324"/>
+            </a:xfrm>
+            <a:prstGeom prst="flowChartProcess">
+              <a:avLst/>
+            </a:prstGeom>
+          </p:spPr>
+          <p:style>
+            <a:lnRef idx="2">
+              <a:schemeClr val="accent1">
+                <a:shade val="15000"/>
+              </a:schemeClr>
+            </a:lnRef>
+            <a:fillRef idx="1">
+              <a:schemeClr val="accent1"/>
+            </a:fillRef>
+            <a:effectRef idx="0">
+              <a:schemeClr val="accent1"/>
+            </a:effectRef>
+            <a:fontRef idx="minor">
+              <a:schemeClr val="lt1"/>
+            </a:fontRef>
+          </p:style>
+          <p:txBody>
+            <a:bodyPr rtlCol="0" anchor="ctr"/>
+            <a:lstStyle/>
+            <a:p>
+              <a:pPr algn="ctr"/>
+              <a:r>
+                <a:rPr lang="en-US" altLang="zh-CN" dirty="0"/>
+                <a:t>TX2</a:t>
+              </a:r>
+              <a:endParaRPr lang="zh-CN" altLang="en-US" dirty="0"/>
+            </a:p>
+          </p:txBody>
+        </p:sp>
+        <p:sp>
+          <p:nvSpPr>
+            <p:cNvPr id="6" name="流程图: 过程 5">
+              <a:extLst>
+                <a:ext uri="{FF2B5EF4-FFF2-40B4-BE49-F238E27FC236}">
+                  <a16:creationId xmlns:a16="http://schemas.microsoft.com/office/drawing/2014/main" id="{BF6BC6C2-65C4-4BFE-6E91-75D56D6125AA}"/>
+                </a:ext>
+              </a:extLst>
+            </p:cNvPr>
+            <p:cNvSpPr/>
+            <p:nvPr/>
+          </p:nvSpPr>
+          <p:spPr>
+            <a:xfrm>
+              <a:off x="2930104" y="3029640"/>
+              <a:ext cx="1115683" cy="454324"/>
+            </a:xfrm>
+            <a:prstGeom prst="flowChartProcess">
+              <a:avLst/>
+            </a:prstGeom>
+          </p:spPr>
+          <p:style>
+            <a:lnRef idx="2">
+              <a:schemeClr val="accent1">
+                <a:shade val="15000"/>
+              </a:schemeClr>
+            </a:lnRef>
+            <a:fillRef idx="1">
+              <a:schemeClr val="accent1"/>
+            </a:fillRef>
+            <a:effectRef idx="0">
+              <a:schemeClr val="accent1"/>
+            </a:effectRef>
+            <a:fontRef idx="minor">
+              <a:schemeClr val="lt1"/>
+            </a:fontRef>
+          </p:style>
+          <p:txBody>
+            <a:bodyPr rtlCol="0" anchor="ctr"/>
+            <a:lstStyle/>
+            <a:p>
+              <a:pPr algn="ctr"/>
+              <a:r>
+                <a:rPr lang="en-US" altLang="zh-CN" dirty="0"/>
+                <a:t>TX3</a:t>
+              </a:r>
+              <a:endParaRPr lang="zh-CN" altLang="en-US" dirty="0"/>
+            </a:p>
+          </p:txBody>
+        </p:sp>
+        <p:sp>
+          <p:nvSpPr>
+            <p:cNvPr id="7" name="流程图: 过程 6">
+              <a:extLst>
+                <a:ext uri="{FF2B5EF4-FFF2-40B4-BE49-F238E27FC236}">
+                  <a16:creationId xmlns:a16="http://schemas.microsoft.com/office/drawing/2014/main" id="{FBAC639A-A659-2591-86CE-114175BBE33A}"/>
+                </a:ext>
+              </a:extLst>
+            </p:cNvPr>
+            <p:cNvSpPr/>
+            <p:nvPr/>
+          </p:nvSpPr>
+          <p:spPr>
+            <a:xfrm>
+              <a:off x="2930104" y="3717044"/>
+              <a:ext cx="1115683" cy="454324"/>
+            </a:xfrm>
+            <a:prstGeom prst="flowChartProcess">
+              <a:avLst/>
+            </a:prstGeom>
+          </p:spPr>
+          <p:style>
+            <a:lnRef idx="2">
+              <a:schemeClr val="accent1">
+                <a:shade val="15000"/>
+              </a:schemeClr>
+            </a:lnRef>
+            <a:fillRef idx="1">
+              <a:schemeClr val="accent1"/>
+            </a:fillRef>
+            <a:effectRef idx="0">
+              <a:schemeClr val="accent1"/>
+            </a:effectRef>
+            <a:fontRef idx="minor">
+              <a:schemeClr val="lt1"/>
+            </a:fontRef>
+          </p:style>
+          <p:txBody>
+            <a:bodyPr rtlCol="0" anchor="ctr"/>
+            <a:lstStyle/>
+            <a:p>
+              <a:pPr algn="ctr"/>
+              <a:r>
+                <a:rPr lang="en-US" altLang="zh-CN" dirty="0"/>
+                <a:t>TX4</a:t>
+              </a:r>
+              <a:endParaRPr lang="zh-CN" altLang="en-US" dirty="0"/>
+            </a:p>
+          </p:txBody>
+        </p:sp>
+        <p:sp>
+          <p:nvSpPr>
+            <p:cNvPr id="8" name="文本框 7">
+              <a:extLst>
+                <a:ext uri="{FF2B5EF4-FFF2-40B4-BE49-F238E27FC236}">
+                  <a16:creationId xmlns:a16="http://schemas.microsoft.com/office/drawing/2014/main" id="{E94BD05A-1A04-2905-948A-F1AC007D0A91}"/>
+                </a:ext>
+              </a:extLst>
+            </p:cNvPr>
+            <p:cNvSpPr txBox="1"/>
+            <p:nvPr/>
+          </p:nvSpPr>
+          <p:spPr>
+            <a:xfrm>
+              <a:off x="5227606" y="1052423"/>
+              <a:ext cx="1207698" cy="369332"/>
+            </a:xfrm>
+            <a:prstGeom prst="rect">
+              <a:avLst/>
+            </a:prstGeom>
+            <a:noFill/>
+          </p:spPr>
+          <p:txBody>
+            <a:bodyPr wrap="square" rtlCol="0">
+              <a:spAutoFit/>
+            </a:bodyPr>
+            <a:lstStyle/>
+            <a:p>
+              <a:r>
+                <a:rPr lang="en-US" altLang="zh-CN" b="1" dirty="0"/>
+                <a:t>CAN RX</a:t>
+              </a:r>
+            </a:p>
+          </p:txBody>
+        </p:sp>
+        <p:sp>
+          <p:nvSpPr>
+            <p:cNvPr id="9" name="流程图: 过程 8">
+              <a:extLst>
+                <a:ext uri="{FF2B5EF4-FFF2-40B4-BE49-F238E27FC236}">
+                  <a16:creationId xmlns:a16="http://schemas.microsoft.com/office/drawing/2014/main" id="{43A0EB98-725C-EB6F-F03D-7D894DC34FF1}"/>
+                </a:ext>
+              </a:extLst>
+            </p:cNvPr>
+            <p:cNvSpPr/>
+            <p:nvPr/>
+          </p:nvSpPr>
+          <p:spPr>
+            <a:xfrm>
+              <a:off x="5273614" y="1654834"/>
+              <a:ext cx="1115683" cy="454324"/>
+            </a:xfrm>
+            <a:prstGeom prst="flowChartProcess">
+              <a:avLst/>
+            </a:prstGeom>
+          </p:spPr>
+          <p:style>
+            <a:lnRef idx="2">
+              <a:schemeClr val="accent1">
+                <a:shade val="15000"/>
+              </a:schemeClr>
+            </a:lnRef>
+            <a:fillRef idx="1">
+              <a:schemeClr val="accent1"/>
+            </a:fillRef>
+            <a:effectRef idx="0">
+              <a:schemeClr val="accent1"/>
+            </a:effectRef>
+            <a:fontRef idx="minor">
+              <a:schemeClr val="lt1"/>
+            </a:fontRef>
+          </p:style>
+          <p:txBody>
+            <a:bodyPr rtlCol="0" anchor="ctr"/>
+            <a:lstStyle/>
+            <a:p>
+              <a:pPr algn="ctr"/>
+              <a:r>
+                <a:rPr lang="en-US" altLang="zh-CN" dirty="0"/>
+                <a:t>RX1</a:t>
+              </a:r>
+              <a:endParaRPr lang="zh-CN" altLang="en-US" dirty="0"/>
+            </a:p>
+          </p:txBody>
+        </p:sp>
+        <p:sp>
+          <p:nvSpPr>
+            <p:cNvPr id="10" name="流程图: 过程 9">
+              <a:extLst>
+                <a:ext uri="{FF2B5EF4-FFF2-40B4-BE49-F238E27FC236}">
+                  <a16:creationId xmlns:a16="http://schemas.microsoft.com/office/drawing/2014/main" id="{161C3CE5-147C-F545-1719-124F3C1B7DC5}"/>
+                </a:ext>
+              </a:extLst>
+            </p:cNvPr>
+            <p:cNvSpPr/>
+            <p:nvPr/>
+          </p:nvSpPr>
+          <p:spPr>
+            <a:xfrm>
+              <a:off x="5273614" y="2342237"/>
+              <a:ext cx="1115683" cy="454324"/>
+            </a:xfrm>
+            <a:prstGeom prst="flowChartProcess">
+              <a:avLst/>
+            </a:prstGeom>
+          </p:spPr>
+          <p:style>
+            <a:lnRef idx="2">
+              <a:schemeClr val="accent1">
+                <a:shade val="15000"/>
+              </a:schemeClr>
+            </a:lnRef>
+            <a:fillRef idx="1">
+              <a:schemeClr val="accent1"/>
+            </a:fillRef>
+            <a:effectRef idx="0">
+              <a:schemeClr val="accent1"/>
+            </a:effectRef>
+            <a:fontRef idx="minor">
+              <a:schemeClr val="lt1"/>
+            </a:fontRef>
+          </p:style>
+          <p:txBody>
+            <a:bodyPr rtlCol="0" anchor="ctr"/>
+            <a:lstStyle/>
+            <a:p>
+              <a:pPr algn="ctr"/>
+              <a:r>
+                <a:rPr lang="en-US" altLang="zh-CN" dirty="0"/>
+                <a:t>RX2</a:t>
+              </a:r>
+              <a:endParaRPr lang="zh-CN" altLang="en-US" dirty="0"/>
+            </a:p>
+          </p:txBody>
+        </p:sp>
+        <p:sp>
+          <p:nvSpPr>
+            <p:cNvPr id="11" name="流程图: 过程 10">
+              <a:extLst>
+                <a:ext uri="{FF2B5EF4-FFF2-40B4-BE49-F238E27FC236}">
+                  <a16:creationId xmlns:a16="http://schemas.microsoft.com/office/drawing/2014/main" id="{0BA6C083-D8B3-1CDA-9A9A-F6846AB821AD}"/>
+                </a:ext>
+              </a:extLst>
+            </p:cNvPr>
+            <p:cNvSpPr/>
+            <p:nvPr/>
+          </p:nvSpPr>
+          <p:spPr>
+            <a:xfrm>
+              <a:off x="5273614" y="3029640"/>
+              <a:ext cx="1115683" cy="454324"/>
+            </a:xfrm>
+            <a:prstGeom prst="flowChartProcess">
+              <a:avLst/>
+            </a:prstGeom>
+          </p:spPr>
+          <p:style>
+            <a:lnRef idx="2">
+              <a:schemeClr val="accent1">
+                <a:shade val="15000"/>
+              </a:schemeClr>
+            </a:lnRef>
+            <a:fillRef idx="1">
+              <a:schemeClr val="accent1"/>
+            </a:fillRef>
+            <a:effectRef idx="0">
+              <a:schemeClr val="accent1"/>
+            </a:effectRef>
+            <a:fontRef idx="minor">
+              <a:schemeClr val="lt1"/>
+            </a:fontRef>
+          </p:style>
+          <p:txBody>
+            <a:bodyPr rtlCol="0" anchor="ctr"/>
+            <a:lstStyle/>
+            <a:p>
+              <a:pPr algn="ctr"/>
+              <a:r>
+                <a:rPr lang="en-US" altLang="zh-CN" dirty="0"/>
+                <a:t>RX3</a:t>
+              </a:r>
+              <a:endParaRPr lang="zh-CN" altLang="en-US" dirty="0"/>
+            </a:p>
+          </p:txBody>
+        </p:sp>
+        <p:sp>
+          <p:nvSpPr>
+            <p:cNvPr id="12" name="流程图: 过程 11">
+              <a:extLst>
+                <a:ext uri="{FF2B5EF4-FFF2-40B4-BE49-F238E27FC236}">
+                  <a16:creationId xmlns:a16="http://schemas.microsoft.com/office/drawing/2014/main" id="{D30F118F-F69D-DA15-D6B4-7082414ACB27}"/>
+                </a:ext>
+              </a:extLst>
+            </p:cNvPr>
+            <p:cNvSpPr/>
+            <p:nvPr/>
+          </p:nvSpPr>
+          <p:spPr>
+            <a:xfrm>
+              <a:off x="5273614" y="3717044"/>
+              <a:ext cx="1115683" cy="454324"/>
+            </a:xfrm>
+            <a:prstGeom prst="flowChartProcess">
+              <a:avLst/>
+            </a:prstGeom>
+          </p:spPr>
+          <p:style>
+            <a:lnRef idx="2">
+              <a:schemeClr val="accent1">
+                <a:shade val="15000"/>
+              </a:schemeClr>
+            </a:lnRef>
+            <a:fillRef idx="1">
+              <a:schemeClr val="accent1"/>
+            </a:fillRef>
+            <a:effectRef idx="0">
+              <a:schemeClr val="accent1"/>
+            </a:effectRef>
+            <a:fontRef idx="minor">
+              <a:schemeClr val="lt1"/>
+            </a:fontRef>
+          </p:style>
+          <p:txBody>
+            <a:bodyPr rtlCol="0" anchor="ctr"/>
+            <a:lstStyle/>
+            <a:p>
+              <a:pPr algn="ctr"/>
+              <a:r>
+                <a:rPr lang="en-US" altLang="zh-CN" dirty="0"/>
+                <a:t>RX4</a:t>
+              </a:r>
+              <a:endParaRPr lang="zh-CN" altLang="en-US" dirty="0"/>
+            </a:p>
+          </p:txBody>
+        </p:sp>
+        <p:cxnSp>
+          <p:nvCxnSpPr>
+            <p:cNvPr id="14" name="直接箭头连接符 13">
+              <a:extLst>
+                <a:ext uri="{FF2B5EF4-FFF2-40B4-BE49-F238E27FC236}">
+                  <a16:creationId xmlns:a16="http://schemas.microsoft.com/office/drawing/2014/main" id="{323C228A-54A3-3FAF-9401-2BC8D34C0A0D}"/>
+                </a:ext>
+              </a:extLst>
+            </p:cNvPr>
+            <p:cNvCxnSpPr>
+              <a:stCxn id="4" idx="3"/>
+              <a:endCxn id="10" idx="1"/>
+            </p:cNvCxnSpPr>
+            <p:nvPr/>
+          </p:nvCxnSpPr>
+          <p:spPr>
+            <a:xfrm>
+              <a:off x="4045787" y="1881996"/>
+              <a:ext cx="1227827" cy="687403"/>
+            </a:xfrm>
+            <a:prstGeom prst="straightConnector1">
+              <a:avLst/>
+            </a:prstGeom>
+            <a:ln>
+              <a:tailEnd type="triangle"/>
+            </a:ln>
+          </p:spPr>
+          <p:style>
+            <a:lnRef idx="1">
+              <a:schemeClr val="accent1"/>
+            </a:lnRef>
+            <a:fillRef idx="0">
+              <a:schemeClr val="accent1"/>
+            </a:fillRef>
+            <a:effectRef idx="0">
+              <a:schemeClr val="accent1"/>
+            </a:effectRef>
+            <a:fontRef idx="minor">
+              <a:schemeClr val="tx1"/>
+            </a:fontRef>
+          </p:style>
+        </p:cxnSp>
+        <p:cxnSp>
+          <p:nvCxnSpPr>
+            <p:cNvPr id="16" name="直接箭头连接符 15">
+              <a:extLst>
+                <a:ext uri="{FF2B5EF4-FFF2-40B4-BE49-F238E27FC236}">
+                  <a16:creationId xmlns:a16="http://schemas.microsoft.com/office/drawing/2014/main" id="{4FFC48FD-969B-FE74-E460-2FBFFA30540B}"/>
+                </a:ext>
+              </a:extLst>
+            </p:cNvPr>
+            <p:cNvCxnSpPr>
+              <a:stCxn id="5" idx="3"/>
+              <a:endCxn id="11" idx="1"/>
+            </p:cNvCxnSpPr>
+            <p:nvPr/>
+          </p:nvCxnSpPr>
+          <p:spPr>
+            <a:xfrm>
+              <a:off x="4045787" y="2569399"/>
+              <a:ext cx="1227827" cy="687403"/>
+            </a:xfrm>
+            <a:prstGeom prst="straightConnector1">
+              <a:avLst/>
+            </a:prstGeom>
+            <a:ln>
+              <a:tailEnd type="triangle"/>
+            </a:ln>
+          </p:spPr>
+          <p:style>
+            <a:lnRef idx="1">
+              <a:schemeClr val="accent1"/>
+            </a:lnRef>
+            <a:fillRef idx="0">
+              <a:schemeClr val="accent1"/>
+            </a:fillRef>
+            <a:effectRef idx="0">
+              <a:schemeClr val="accent1"/>
+            </a:effectRef>
+            <a:fontRef idx="minor">
+              <a:schemeClr val="tx1"/>
+            </a:fontRef>
+          </p:style>
+        </p:cxnSp>
+        <p:cxnSp>
+          <p:nvCxnSpPr>
+            <p:cNvPr id="18" name="直接箭头连接符 17">
+              <a:extLst>
+                <a:ext uri="{FF2B5EF4-FFF2-40B4-BE49-F238E27FC236}">
+                  <a16:creationId xmlns:a16="http://schemas.microsoft.com/office/drawing/2014/main" id="{D24C7462-AE0D-A69C-03F4-1B6019EDDF15}"/>
+                </a:ext>
+              </a:extLst>
+            </p:cNvPr>
+            <p:cNvCxnSpPr>
+              <a:stCxn id="6" idx="3"/>
+              <a:endCxn id="12" idx="1"/>
+            </p:cNvCxnSpPr>
+            <p:nvPr/>
+          </p:nvCxnSpPr>
+          <p:spPr>
+            <a:xfrm>
+              <a:off x="4045787" y="3256802"/>
+              <a:ext cx="1227827" cy="687404"/>
+            </a:xfrm>
+            <a:prstGeom prst="straightConnector1">
+              <a:avLst/>
+            </a:prstGeom>
+            <a:ln>
+              <a:tailEnd type="triangle"/>
+            </a:ln>
+          </p:spPr>
+          <p:style>
+            <a:lnRef idx="1">
+              <a:schemeClr val="accent1"/>
+            </a:lnRef>
+            <a:fillRef idx="0">
+              <a:schemeClr val="accent1"/>
+            </a:fillRef>
+            <a:effectRef idx="0">
+              <a:schemeClr val="accent1"/>
+            </a:effectRef>
+            <a:fontRef idx="minor">
+              <a:schemeClr val="tx1"/>
+            </a:fontRef>
+          </p:style>
+        </p:cxnSp>
+        <p:cxnSp>
+          <p:nvCxnSpPr>
+            <p:cNvPr id="20" name="直接箭头连接符 19">
+              <a:extLst>
+                <a:ext uri="{FF2B5EF4-FFF2-40B4-BE49-F238E27FC236}">
+                  <a16:creationId xmlns:a16="http://schemas.microsoft.com/office/drawing/2014/main" id="{F2B09722-5F61-2AFB-468D-833696803315}"/>
+                </a:ext>
+              </a:extLst>
+            </p:cNvPr>
+            <p:cNvCxnSpPr>
+              <a:stCxn id="7" idx="3"/>
+              <a:endCxn id="9" idx="1"/>
+            </p:cNvCxnSpPr>
+            <p:nvPr/>
+          </p:nvCxnSpPr>
+          <p:spPr>
+            <a:xfrm flipV="1">
+              <a:off x="4045787" y="1881996"/>
+              <a:ext cx="1227827" cy="2062210"/>
+            </a:xfrm>
+            <a:prstGeom prst="straightConnector1">
+              <a:avLst/>
+            </a:prstGeom>
+            <a:ln>
+              <a:tailEnd type="triangle"/>
+            </a:ln>
+          </p:spPr>
+          <p:style>
+            <a:lnRef idx="1">
+              <a:schemeClr val="accent1"/>
+            </a:lnRef>
+            <a:fillRef idx="0">
+              <a:schemeClr val="accent1"/>
+            </a:fillRef>
+            <a:effectRef idx="0">
+              <a:schemeClr val="accent1"/>
+            </a:effectRef>
+            <a:fontRef idx="minor">
+              <a:schemeClr val="tx1"/>
+            </a:fontRef>
+          </p:style>
+        </p:cxnSp>
+      </p:grpSp>
+    </p:spTree>
+    <p:extLst>
+      <p:ext uri="{BB962C8B-B14F-4D97-AF65-F5344CB8AC3E}">
+        <p14:creationId xmlns:p14="http://schemas.microsoft.com/office/powerpoint/2010/main" val="2741515079"/>
+      </p:ext>
+    </p:extLst>
+  </p:cSld>
+  <p:clrMapOvr>
+    <a:masterClrMapping/>
+  </p:clrMapOvr>
+</p:sld>
+</file>
+
 <file path=ppt/theme/theme1.xml><?xml version="1.0" encoding="utf-8"?>
 <a:theme xmlns:a="http://schemas.openxmlformats.org/drawingml/2006/main" name="Office 主题​​">
   <a:themeElements>

</xml_diff>